<commit_message>
[WR_A] Revisione presentazione in seguito ad aggiornamento scaletta
</commit_message>
<xml_diff>
--- a/Presentazione/Atsilo1/Di Palma/[Bozza]Introduzione.pptx
+++ b/Presentazione/Atsilo1/Di Palma/[Bozza]Introduzione.pptx
@@ -5,7 +5,7 @@
     <p:sldMasterId id="2147483684" r:id="rId1"/>
   </p:sldMasterIdLst>
   <p:notesMasterIdLst>
-    <p:notesMasterId r:id="rId12"/>
+    <p:notesMasterId r:id="rId18"/>
   </p:notesMasterIdLst>
   <p:sldIdLst>
     <p:sldId id="259" r:id="rId2"/>
@@ -18,6 +18,12 @@
     <p:sldId id="266" r:id="rId9"/>
     <p:sldId id="263" r:id="rId10"/>
     <p:sldId id="268" r:id="rId11"/>
+    <p:sldId id="272" r:id="rId12"/>
+    <p:sldId id="271" r:id="rId13"/>
+    <p:sldId id="273" r:id="rId14"/>
+    <p:sldId id="274" r:id="rId15"/>
+    <p:sldId id="269" r:id="rId16"/>
+    <p:sldId id="270" r:id="rId17"/>
   </p:sldIdLst>
   <p:sldSz cx="9144000" cy="6858000" type="screen4x3"/>
   <p:notesSz cx="6858000" cy="9144000"/>
@@ -371,7 +377,7 @@
     </p:spTree>
     <p:extLst>
       <p:ext uri="{BB962C8B-B14F-4D97-AF65-F5344CB8AC3E}">
-        <p14:creationId xmlns="" xmlns:p14="http://schemas.microsoft.com/office/powerpoint/2010/main" val="2126419590"/>
+        <p14:creationId xmlns:p14="http://schemas.microsoft.com/office/powerpoint/2010/main" xmlns="" val="2126419590"/>
       </p:ext>
     </p:extLst>
   </p:cSld>
@@ -615,19 +621,13 @@
           <a:p>
             <a:r>
               <a:rPr lang="it-IT" dirty="0" smtClean="0"/>
-              <a:t>-Possibilità di cerchiare attori del sottosistema (spiegazione rapida)</a:t>
-            </a:r>
-          </a:p>
-          <a:p>
+              <a:t>-Possibilità di cerchiare attori del sottosistema (spiegazione rapida</a:t>
+            </a:r>
             <a:r>
               <a:rPr lang="it-IT" dirty="0" smtClean="0"/>
-              <a:t>-passare parola a barba</a:t>
-            </a:r>
-            <a:r>
-              <a:rPr lang="it-IT" baseline="0" dirty="0" smtClean="0"/>
-              <a:t> con collegamento di casi d’uso</a:t>
-            </a:r>
-            <a:endParaRPr lang="it-IT" dirty="0"/>
+              <a:t>)</a:t>
+            </a:r>
+            <a:endParaRPr lang="it-IT" dirty="0" smtClean="0"/>
           </a:p>
         </p:txBody>
       </p:sp>
@@ -650,6 +650,520 @@
               <a:rPr lang="it-IT" smtClean="0"/>
               <a:pPr/>
               <a:t>10</a:t>
+            </a:fld>
+            <a:endParaRPr lang="it-IT"/>
+          </a:p>
+        </p:txBody>
+      </p:sp>
+    </p:spTree>
+  </p:cSld>
+  <p:clrMapOvr>
+    <a:masterClrMapping/>
+  </p:clrMapOvr>
+</p:notes>
+</file>
+
+<file path=ppt/notesSlides/notesSlide11.xml><?xml version="1.0" encoding="utf-8"?>
+<p:notes xmlns:a="http://schemas.openxmlformats.org/drawingml/2006/main" xmlns:r="http://schemas.openxmlformats.org/officeDocument/2006/relationships" xmlns:p="http://schemas.openxmlformats.org/presentationml/2006/main">
+  <p:cSld>
+    <p:spTree>
+      <p:nvGrpSpPr>
+        <p:cNvPr id="1" name=""/>
+        <p:cNvGrpSpPr/>
+        <p:nvPr/>
+      </p:nvGrpSpPr>
+      <p:grpSpPr>
+        <a:xfrm>
+          <a:off x="0" y="0"/>
+          <a:ext cx="0" cy="0"/>
+          <a:chOff x="0" y="0"/>
+          <a:chExt cx="0" cy="0"/>
+        </a:xfrm>
+      </p:grpSpPr>
+      <p:sp>
+        <p:nvSpPr>
+          <p:cNvPr id="2" name="Segnaposto immagine diapositiva 1"/>
+          <p:cNvSpPr>
+            <a:spLocks noGrp="1" noRot="1" noChangeAspect="1"/>
+          </p:cNvSpPr>
+          <p:nvPr>
+            <p:ph type="sldImg"/>
+          </p:nvPr>
+        </p:nvSpPr>
+        <p:spPr/>
+      </p:sp>
+      <p:sp>
+        <p:nvSpPr>
+          <p:cNvPr id="3" name="Segnaposto note 2"/>
+          <p:cNvSpPr>
+            <a:spLocks noGrp="1"/>
+          </p:cNvSpPr>
+          <p:nvPr>
+            <p:ph type="body" idx="1"/>
+          </p:nvPr>
+        </p:nvSpPr>
+        <p:spPr/>
+        <p:txBody>
+          <a:bodyPr>
+            <a:normAutofit/>
+          </a:bodyPr>
+          <a:lstStyle/>
+          <a:p>
+            <a:r>
+              <a:rPr lang="it-IT" dirty="0" smtClean="0"/>
+              <a:t>-Possibilità di cerchiare attori del sottosistema (spiegazione rapida</a:t>
+            </a:r>
+            <a:r>
+              <a:rPr lang="it-IT" dirty="0" smtClean="0"/>
+              <a:t>)</a:t>
+            </a:r>
+            <a:endParaRPr lang="it-IT" dirty="0" smtClean="0"/>
+          </a:p>
+        </p:txBody>
+      </p:sp>
+      <p:sp>
+        <p:nvSpPr>
+          <p:cNvPr id="4" name="Segnaposto numero diapositiva 3"/>
+          <p:cNvSpPr>
+            <a:spLocks noGrp="1"/>
+          </p:cNvSpPr>
+          <p:nvPr>
+            <p:ph type="sldNum" sz="quarter" idx="10"/>
+          </p:nvPr>
+        </p:nvSpPr>
+        <p:spPr/>
+        <p:txBody>
+          <a:bodyPr/>
+          <a:lstStyle/>
+          <a:p>
+            <a:fld id="{D70604CA-7593-4640-8FA1-5523937B8510}" type="slidenum">
+              <a:rPr lang="it-IT" smtClean="0"/>
+              <a:pPr/>
+              <a:t>11</a:t>
+            </a:fld>
+            <a:endParaRPr lang="it-IT"/>
+          </a:p>
+        </p:txBody>
+      </p:sp>
+    </p:spTree>
+  </p:cSld>
+  <p:clrMapOvr>
+    <a:masterClrMapping/>
+  </p:clrMapOvr>
+</p:notes>
+</file>
+
+<file path=ppt/notesSlides/notesSlide12.xml><?xml version="1.0" encoding="utf-8"?>
+<p:notes xmlns:a="http://schemas.openxmlformats.org/drawingml/2006/main" xmlns:r="http://schemas.openxmlformats.org/officeDocument/2006/relationships" xmlns:p="http://schemas.openxmlformats.org/presentationml/2006/main">
+  <p:cSld>
+    <p:spTree>
+      <p:nvGrpSpPr>
+        <p:cNvPr id="1" name=""/>
+        <p:cNvGrpSpPr/>
+        <p:nvPr/>
+      </p:nvGrpSpPr>
+      <p:grpSpPr>
+        <a:xfrm>
+          <a:off x="0" y="0"/>
+          <a:ext cx="0" cy="0"/>
+          <a:chOff x="0" y="0"/>
+          <a:chExt cx="0" cy="0"/>
+        </a:xfrm>
+      </p:grpSpPr>
+      <p:sp>
+        <p:nvSpPr>
+          <p:cNvPr id="2" name="Segnaposto immagine diapositiva 1"/>
+          <p:cNvSpPr>
+            <a:spLocks noGrp="1" noRot="1" noChangeAspect="1"/>
+          </p:cNvSpPr>
+          <p:nvPr>
+            <p:ph type="sldImg"/>
+          </p:nvPr>
+        </p:nvSpPr>
+        <p:spPr/>
+      </p:sp>
+      <p:sp>
+        <p:nvSpPr>
+          <p:cNvPr id="3" name="Segnaposto note 2"/>
+          <p:cNvSpPr>
+            <a:spLocks noGrp="1"/>
+          </p:cNvSpPr>
+          <p:nvPr>
+            <p:ph type="body" idx="1"/>
+          </p:nvPr>
+        </p:nvSpPr>
+        <p:spPr/>
+        <p:txBody>
+          <a:bodyPr>
+            <a:normAutofit/>
+          </a:bodyPr>
+          <a:lstStyle/>
+          <a:p>
+            <a:endParaRPr lang="it-IT" dirty="0" smtClean="0"/>
+          </a:p>
+        </p:txBody>
+      </p:sp>
+      <p:sp>
+        <p:nvSpPr>
+          <p:cNvPr id="4" name="Segnaposto numero diapositiva 3"/>
+          <p:cNvSpPr>
+            <a:spLocks noGrp="1"/>
+          </p:cNvSpPr>
+          <p:nvPr>
+            <p:ph type="sldNum" sz="quarter" idx="10"/>
+          </p:nvPr>
+        </p:nvSpPr>
+        <p:spPr/>
+        <p:txBody>
+          <a:bodyPr/>
+          <a:lstStyle/>
+          <a:p>
+            <a:fld id="{D70604CA-7593-4640-8FA1-5523937B8510}" type="slidenum">
+              <a:rPr lang="it-IT" smtClean="0"/>
+              <a:pPr/>
+              <a:t>12</a:t>
+            </a:fld>
+            <a:endParaRPr lang="it-IT"/>
+          </a:p>
+        </p:txBody>
+      </p:sp>
+    </p:spTree>
+  </p:cSld>
+  <p:clrMapOvr>
+    <a:masterClrMapping/>
+  </p:clrMapOvr>
+</p:notes>
+</file>
+
+<file path=ppt/notesSlides/notesSlide13.xml><?xml version="1.0" encoding="utf-8"?>
+<p:notes xmlns:a="http://schemas.openxmlformats.org/drawingml/2006/main" xmlns:r="http://schemas.openxmlformats.org/officeDocument/2006/relationships" xmlns:p="http://schemas.openxmlformats.org/presentationml/2006/main">
+  <p:cSld>
+    <p:spTree>
+      <p:nvGrpSpPr>
+        <p:cNvPr id="1" name=""/>
+        <p:cNvGrpSpPr/>
+        <p:nvPr/>
+      </p:nvGrpSpPr>
+      <p:grpSpPr>
+        <a:xfrm>
+          <a:off x="0" y="0"/>
+          <a:ext cx="0" cy="0"/>
+          <a:chOff x="0" y="0"/>
+          <a:chExt cx="0" cy="0"/>
+        </a:xfrm>
+      </p:grpSpPr>
+      <p:sp>
+        <p:nvSpPr>
+          <p:cNvPr id="2" name="Segnaposto immagine diapositiva 1"/>
+          <p:cNvSpPr>
+            <a:spLocks noGrp="1" noRot="1" noChangeAspect="1"/>
+          </p:cNvSpPr>
+          <p:nvPr>
+            <p:ph type="sldImg"/>
+          </p:nvPr>
+        </p:nvSpPr>
+        <p:spPr/>
+      </p:sp>
+      <p:sp>
+        <p:nvSpPr>
+          <p:cNvPr id="3" name="Segnaposto note 2"/>
+          <p:cNvSpPr>
+            <a:spLocks noGrp="1"/>
+          </p:cNvSpPr>
+          <p:nvPr>
+            <p:ph type="body" idx="1"/>
+          </p:nvPr>
+        </p:nvSpPr>
+        <p:spPr/>
+        <p:txBody>
+          <a:bodyPr>
+            <a:normAutofit/>
+          </a:bodyPr>
+          <a:lstStyle/>
+          <a:p>
+            <a:endParaRPr lang="it-IT" dirty="0" smtClean="0"/>
+          </a:p>
+        </p:txBody>
+      </p:sp>
+      <p:sp>
+        <p:nvSpPr>
+          <p:cNvPr id="4" name="Segnaposto numero diapositiva 3"/>
+          <p:cNvSpPr>
+            <a:spLocks noGrp="1"/>
+          </p:cNvSpPr>
+          <p:nvPr>
+            <p:ph type="sldNum" sz="quarter" idx="10"/>
+          </p:nvPr>
+        </p:nvSpPr>
+        <p:spPr/>
+        <p:txBody>
+          <a:bodyPr/>
+          <a:lstStyle/>
+          <a:p>
+            <a:fld id="{D70604CA-7593-4640-8FA1-5523937B8510}" type="slidenum">
+              <a:rPr lang="it-IT" smtClean="0"/>
+              <a:pPr/>
+              <a:t>13</a:t>
+            </a:fld>
+            <a:endParaRPr lang="it-IT"/>
+          </a:p>
+        </p:txBody>
+      </p:sp>
+    </p:spTree>
+  </p:cSld>
+  <p:clrMapOvr>
+    <a:masterClrMapping/>
+  </p:clrMapOvr>
+</p:notes>
+</file>
+
+<file path=ppt/notesSlides/notesSlide14.xml><?xml version="1.0" encoding="utf-8"?>
+<p:notes xmlns:a="http://schemas.openxmlformats.org/drawingml/2006/main" xmlns:r="http://schemas.openxmlformats.org/officeDocument/2006/relationships" xmlns:p="http://schemas.openxmlformats.org/presentationml/2006/main">
+  <p:cSld>
+    <p:spTree>
+      <p:nvGrpSpPr>
+        <p:cNvPr id="1" name=""/>
+        <p:cNvGrpSpPr/>
+        <p:nvPr/>
+      </p:nvGrpSpPr>
+      <p:grpSpPr>
+        <a:xfrm>
+          <a:off x="0" y="0"/>
+          <a:ext cx="0" cy="0"/>
+          <a:chOff x="0" y="0"/>
+          <a:chExt cx="0" cy="0"/>
+        </a:xfrm>
+      </p:grpSpPr>
+      <p:sp>
+        <p:nvSpPr>
+          <p:cNvPr id="2" name="Segnaposto immagine diapositiva 1"/>
+          <p:cNvSpPr>
+            <a:spLocks noGrp="1" noRot="1" noChangeAspect="1"/>
+          </p:cNvSpPr>
+          <p:nvPr>
+            <p:ph type="sldImg"/>
+          </p:nvPr>
+        </p:nvSpPr>
+        <p:spPr/>
+      </p:sp>
+      <p:sp>
+        <p:nvSpPr>
+          <p:cNvPr id="3" name="Segnaposto note 2"/>
+          <p:cNvSpPr>
+            <a:spLocks noGrp="1"/>
+          </p:cNvSpPr>
+          <p:nvPr>
+            <p:ph type="body" idx="1"/>
+          </p:nvPr>
+        </p:nvSpPr>
+        <p:spPr/>
+        <p:txBody>
+          <a:bodyPr>
+            <a:normAutofit/>
+          </a:bodyPr>
+          <a:lstStyle/>
+          <a:p>
+            <a:endParaRPr lang="it-IT" dirty="0" smtClean="0"/>
+          </a:p>
+        </p:txBody>
+      </p:sp>
+      <p:sp>
+        <p:nvSpPr>
+          <p:cNvPr id="4" name="Segnaposto numero diapositiva 3"/>
+          <p:cNvSpPr>
+            <a:spLocks noGrp="1"/>
+          </p:cNvSpPr>
+          <p:nvPr>
+            <p:ph type="sldNum" sz="quarter" idx="10"/>
+          </p:nvPr>
+        </p:nvSpPr>
+        <p:spPr/>
+        <p:txBody>
+          <a:bodyPr/>
+          <a:lstStyle/>
+          <a:p>
+            <a:fld id="{D70604CA-7593-4640-8FA1-5523937B8510}" type="slidenum">
+              <a:rPr lang="it-IT" smtClean="0"/>
+              <a:pPr/>
+              <a:t>14</a:t>
+            </a:fld>
+            <a:endParaRPr lang="it-IT"/>
+          </a:p>
+        </p:txBody>
+      </p:sp>
+    </p:spTree>
+  </p:cSld>
+  <p:clrMapOvr>
+    <a:masterClrMapping/>
+  </p:clrMapOvr>
+</p:notes>
+</file>
+
+<file path=ppt/notesSlides/notesSlide15.xml><?xml version="1.0" encoding="utf-8"?>
+<p:notes xmlns:a="http://schemas.openxmlformats.org/drawingml/2006/main" xmlns:r="http://schemas.openxmlformats.org/officeDocument/2006/relationships" xmlns:p="http://schemas.openxmlformats.org/presentationml/2006/main">
+  <p:cSld>
+    <p:spTree>
+      <p:nvGrpSpPr>
+        <p:cNvPr id="1" name=""/>
+        <p:cNvGrpSpPr/>
+        <p:nvPr/>
+      </p:nvGrpSpPr>
+      <p:grpSpPr>
+        <a:xfrm>
+          <a:off x="0" y="0"/>
+          <a:ext cx="0" cy="0"/>
+          <a:chOff x="0" y="0"/>
+          <a:chExt cx="0" cy="0"/>
+        </a:xfrm>
+      </p:grpSpPr>
+      <p:sp>
+        <p:nvSpPr>
+          <p:cNvPr id="2" name="Segnaposto immagine diapositiva 1"/>
+          <p:cNvSpPr>
+            <a:spLocks noGrp="1" noRot="1" noChangeAspect="1"/>
+          </p:cNvSpPr>
+          <p:nvPr>
+            <p:ph type="sldImg"/>
+          </p:nvPr>
+        </p:nvSpPr>
+        <p:spPr/>
+      </p:sp>
+      <p:sp>
+        <p:nvSpPr>
+          <p:cNvPr id="3" name="Segnaposto note 2"/>
+          <p:cNvSpPr>
+            <a:spLocks noGrp="1"/>
+          </p:cNvSpPr>
+          <p:nvPr>
+            <p:ph type="body" idx="1"/>
+          </p:nvPr>
+        </p:nvSpPr>
+        <p:spPr/>
+        <p:txBody>
+          <a:bodyPr>
+            <a:normAutofit/>
+          </a:bodyPr>
+          <a:lstStyle/>
+          <a:p>
+            <a:endParaRPr lang="it-IT" dirty="0"/>
+          </a:p>
+        </p:txBody>
+      </p:sp>
+      <p:sp>
+        <p:nvSpPr>
+          <p:cNvPr id="4" name="Segnaposto numero diapositiva 3"/>
+          <p:cNvSpPr>
+            <a:spLocks noGrp="1"/>
+          </p:cNvSpPr>
+          <p:nvPr>
+            <p:ph type="sldNum" sz="quarter" idx="10"/>
+          </p:nvPr>
+        </p:nvSpPr>
+        <p:spPr/>
+        <p:txBody>
+          <a:bodyPr/>
+          <a:lstStyle/>
+          <a:p>
+            <a:fld id="{D70604CA-7593-4640-8FA1-5523937B8510}" type="slidenum">
+              <a:rPr lang="it-IT" smtClean="0"/>
+              <a:pPr/>
+              <a:t>15</a:t>
+            </a:fld>
+            <a:endParaRPr lang="it-IT"/>
+          </a:p>
+        </p:txBody>
+      </p:sp>
+    </p:spTree>
+  </p:cSld>
+  <p:clrMapOvr>
+    <a:masterClrMapping/>
+  </p:clrMapOvr>
+</p:notes>
+</file>
+
+<file path=ppt/notesSlides/notesSlide16.xml><?xml version="1.0" encoding="utf-8"?>
+<p:notes xmlns:a="http://schemas.openxmlformats.org/drawingml/2006/main" xmlns:r="http://schemas.openxmlformats.org/officeDocument/2006/relationships" xmlns:p="http://schemas.openxmlformats.org/presentationml/2006/main">
+  <p:cSld>
+    <p:spTree>
+      <p:nvGrpSpPr>
+        <p:cNvPr id="1" name=""/>
+        <p:cNvGrpSpPr/>
+        <p:nvPr/>
+      </p:nvGrpSpPr>
+      <p:grpSpPr>
+        <a:xfrm>
+          <a:off x="0" y="0"/>
+          <a:ext cx="0" cy="0"/>
+          <a:chOff x="0" y="0"/>
+          <a:chExt cx="0" cy="0"/>
+        </a:xfrm>
+      </p:grpSpPr>
+      <p:sp>
+        <p:nvSpPr>
+          <p:cNvPr id="2" name="Segnaposto immagine diapositiva 1"/>
+          <p:cNvSpPr>
+            <a:spLocks noGrp="1" noRot="1" noChangeAspect="1"/>
+          </p:cNvSpPr>
+          <p:nvPr>
+            <p:ph type="sldImg"/>
+          </p:nvPr>
+        </p:nvSpPr>
+        <p:spPr/>
+      </p:sp>
+      <p:sp>
+        <p:nvSpPr>
+          <p:cNvPr id="3" name="Segnaposto note 2"/>
+          <p:cNvSpPr>
+            <a:spLocks noGrp="1"/>
+          </p:cNvSpPr>
+          <p:nvPr>
+            <p:ph type="body" idx="1"/>
+          </p:nvPr>
+        </p:nvSpPr>
+        <p:spPr/>
+        <p:txBody>
+          <a:bodyPr>
+            <a:normAutofit/>
+          </a:bodyPr>
+          <a:lstStyle/>
+          <a:p>
+            <a:r>
+              <a:rPr lang="it-IT" dirty="0" smtClean="0"/>
+              <a:t>Nuovo dal </a:t>
+            </a:r>
+            <a:r>
+              <a:rPr lang="it-IT" dirty="0" err="1" smtClean="0"/>
+              <a:t>rad</a:t>
+            </a:r>
+            <a:r>
+              <a:rPr lang="it-IT" dirty="0" smtClean="0"/>
+              <a:t> 3.2: </a:t>
+            </a:r>
+          </a:p>
+          <a:p>
+            <a:endParaRPr lang="it-IT" dirty="0"/>
+          </a:p>
+        </p:txBody>
+      </p:sp>
+      <p:sp>
+        <p:nvSpPr>
+          <p:cNvPr id="4" name="Segnaposto numero diapositiva 3"/>
+          <p:cNvSpPr>
+            <a:spLocks noGrp="1"/>
+          </p:cNvSpPr>
+          <p:nvPr>
+            <p:ph type="sldNum" sz="quarter" idx="10"/>
+          </p:nvPr>
+        </p:nvSpPr>
+        <p:spPr/>
+        <p:txBody>
+          <a:bodyPr/>
+          <a:lstStyle/>
+          <a:p>
+            <a:fld id="{D70604CA-7593-4640-8FA1-5523937B8510}" type="slidenum">
+              <a:rPr lang="it-IT" smtClean="0"/>
+              <a:pPr/>
+              <a:t>16</a:t>
             </a:fld>
             <a:endParaRPr lang="it-IT"/>
           </a:p>
@@ -6155,7 +6669,7 @@
     </p:spTree>
     <p:extLst>
       <p:ext uri="{BB962C8B-B14F-4D97-AF65-F5344CB8AC3E}">
-        <p14:creationId xmlns="" xmlns:p14="http://schemas.microsoft.com/office/powerpoint/2010/main" val="155874689"/>
+        <p14:creationId xmlns:p14="http://schemas.microsoft.com/office/powerpoint/2010/main" xmlns="" val="155874689"/>
       </p:ext>
     </p:extLst>
   </p:cSld>
@@ -6163,7 +6677,7 @@
     <a:masterClrMapping/>
   </p:clrMapOvr>
   <mc:AlternateContent xmlns:mc="http://schemas.openxmlformats.org/markup-compatibility/2006">
-    <mc:Choice xmlns="" xmlns:p14="http://schemas.microsoft.com/office/powerpoint/2010/main" Requires="p14">
+    <mc:Choice xmlns:p14="http://schemas.microsoft.com/office/powerpoint/2010/main" xmlns="" Requires="p14">
       <p:transition spd="slow" p14:dur="2000"/>
     </mc:Choice>
     <mc:Fallback>
@@ -6214,8 +6728,8 @@
         </p:blipFill>
         <p:spPr bwMode="auto">
           <a:xfrm>
-            <a:off x="1043608" y="881336"/>
-            <a:ext cx="6768752" cy="5976664"/>
+            <a:off x="827584" y="764704"/>
+            <a:ext cx="7272808" cy="6093296"/>
           </a:xfrm>
           <a:prstGeom prst="rect">
             <a:avLst/>
@@ -6252,6 +6766,741 @@
               </a:rPr>
               <a:t>Attori del Sistema </a:t>
             </a:r>
+          </a:p>
+          <a:p>
+            <a:pPr algn="ctr"/>
+            <a:endParaRPr lang="it-IT" dirty="0">
+              <a:latin typeface="+mj-lt"/>
+            </a:endParaRPr>
+          </a:p>
+        </p:txBody>
+      </p:sp>
+    </p:spTree>
+  </p:cSld>
+  <p:clrMapOvr>
+    <a:masterClrMapping/>
+  </p:clrMapOvr>
+</p:sld>
+</file>
+
+<file path=ppt/slides/slide11.xml><?xml version="1.0" encoding="utf-8"?>
+<p:sld xmlns:a="http://schemas.openxmlformats.org/drawingml/2006/main" xmlns:r="http://schemas.openxmlformats.org/officeDocument/2006/relationships" xmlns:p="http://schemas.openxmlformats.org/presentationml/2006/main">
+  <p:cSld>
+    <p:spTree>
+      <p:nvGrpSpPr>
+        <p:cNvPr id="1" name=""/>
+        <p:cNvGrpSpPr/>
+        <p:nvPr/>
+      </p:nvGrpSpPr>
+      <p:grpSpPr>
+        <a:xfrm>
+          <a:off x="0" y="0"/>
+          <a:ext cx="0" cy="0"/>
+          <a:chOff x="0" y="0"/>
+          <a:chExt cx="0" cy="0"/>
+        </a:xfrm>
+      </p:grpSpPr>
+      <p:sp>
+        <p:nvSpPr>
+          <p:cNvPr id="3" name="CasellaDiTesto 2"/>
+          <p:cNvSpPr txBox="1"/>
+          <p:nvPr/>
+        </p:nvSpPr>
+        <p:spPr>
+          <a:xfrm>
+            <a:off x="2141887" y="0"/>
+            <a:ext cx="4862100" cy="1107996"/>
+          </a:xfrm>
+          <a:prstGeom prst="rect">
+            <a:avLst/>
+          </a:prstGeom>
+          <a:noFill/>
+        </p:spPr>
+        <p:txBody>
+          <a:bodyPr wrap="square" rtlCol="0">
+            <a:spAutoFit/>
+          </a:bodyPr>
+          <a:lstStyle/>
+          <a:p>
+            <a:pPr algn="ctr"/>
+            <a:r>
+              <a:rPr lang="it-IT" sz="4800" b="1" dirty="0" smtClean="0">
+                <a:latin typeface="+mj-lt"/>
+              </a:rPr>
+              <a:t>Attori del Sistema </a:t>
+            </a:r>
+          </a:p>
+          <a:p>
+            <a:pPr algn="ctr"/>
+            <a:endParaRPr lang="it-IT" dirty="0">
+              <a:latin typeface="+mj-lt"/>
+            </a:endParaRPr>
+          </a:p>
+        </p:txBody>
+      </p:sp>
+      <p:pic>
+        <p:nvPicPr>
+          <p:cNvPr id="5122" name="Picture 2" descr="C:\Users\Ferdinando\Desktop\attori.png"/>
+          <p:cNvPicPr>
+            <a:picLocks noChangeAspect="1" noChangeArrowheads="1"/>
+          </p:cNvPicPr>
+          <p:nvPr/>
+        </p:nvPicPr>
+        <p:blipFill>
+          <a:blip r:embed="rId3" cstate="print"/>
+          <a:srcRect/>
+          <a:stretch>
+            <a:fillRect/>
+          </a:stretch>
+        </p:blipFill>
+        <p:spPr bwMode="auto">
+          <a:xfrm>
+            <a:off x="827584" y="764703"/>
+            <a:ext cx="7260655" cy="6093297"/>
+          </a:xfrm>
+          <a:prstGeom prst="rect">
+            <a:avLst/>
+          </a:prstGeom>
+          <a:noFill/>
+        </p:spPr>
+      </p:pic>
+    </p:spTree>
+  </p:cSld>
+  <p:clrMapOvr>
+    <a:masterClrMapping/>
+  </p:clrMapOvr>
+</p:sld>
+</file>
+
+<file path=ppt/slides/slide12.xml><?xml version="1.0" encoding="utf-8"?>
+<p:sld xmlns:a="http://schemas.openxmlformats.org/drawingml/2006/main" xmlns:r="http://schemas.openxmlformats.org/officeDocument/2006/relationships" xmlns:p="http://schemas.openxmlformats.org/presentationml/2006/main">
+  <p:cSld>
+    <p:spTree>
+      <p:nvGrpSpPr>
+        <p:cNvPr id="1" name=""/>
+        <p:cNvGrpSpPr/>
+        <p:nvPr/>
+      </p:nvGrpSpPr>
+      <p:grpSpPr>
+        <a:xfrm>
+          <a:off x="0" y="0"/>
+          <a:ext cx="0" cy="0"/>
+          <a:chOff x="0" y="0"/>
+          <a:chExt cx="0" cy="0"/>
+        </a:xfrm>
+      </p:grpSpPr>
+      <p:sp>
+        <p:nvSpPr>
+          <p:cNvPr id="4" name="CasellaDiTesto 3"/>
+          <p:cNvSpPr txBox="1"/>
+          <p:nvPr/>
+        </p:nvSpPr>
+        <p:spPr>
+          <a:xfrm>
+            <a:off x="971600" y="1"/>
+            <a:ext cx="6912768" cy="1538883"/>
+          </a:xfrm>
+          <a:prstGeom prst="rect">
+            <a:avLst/>
+          </a:prstGeom>
+          <a:noFill/>
+        </p:spPr>
+        <p:txBody>
+          <a:bodyPr wrap="square" rtlCol="0">
+            <a:spAutoFit/>
+          </a:bodyPr>
+          <a:lstStyle/>
+          <a:p>
+            <a:pPr algn="ctr"/>
+            <a:r>
+              <a:rPr lang="it-IT" sz="4800" b="1" dirty="0" err="1" smtClean="0">
+                <a:latin typeface="+mj-lt"/>
+              </a:rPr>
+              <a:t>Use</a:t>
+            </a:r>
+            <a:r>
+              <a:rPr lang="it-IT" sz="4800" b="1" dirty="0" smtClean="0">
+                <a:latin typeface="+mj-lt"/>
+              </a:rPr>
+              <a:t> case </a:t>
+            </a:r>
+            <a:r>
+              <a:rPr lang="it-IT" sz="4800" b="1" dirty="0" err="1" smtClean="0">
+                <a:latin typeface="+mj-lt"/>
+              </a:rPr>
+              <a:t>Diagram</a:t>
+            </a:r>
+            <a:r>
+              <a:rPr lang="it-IT" sz="4800" b="1" dirty="0" smtClean="0">
+                <a:latin typeface="+mj-lt"/>
+              </a:rPr>
+              <a:t> </a:t>
+            </a:r>
+            <a:endParaRPr lang="it-IT" sz="4800" b="1" dirty="0" smtClean="0">
+              <a:latin typeface="+mj-lt"/>
+            </a:endParaRPr>
+          </a:p>
+          <a:p>
+            <a:pPr algn="ctr"/>
+            <a:r>
+              <a:rPr lang="it-IT" sz="2800" b="1" dirty="0" smtClean="0">
+                <a:latin typeface="+mj-lt"/>
+              </a:rPr>
+              <a:t>Prima versione </a:t>
+            </a:r>
+            <a:endParaRPr lang="it-IT" sz="2800" b="1" dirty="0" smtClean="0">
+              <a:latin typeface="+mj-lt"/>
+            </a:endParaRPr>
+          </a:p>
+          <a:p>
+            <a:pPr algn="ctr"/>
+            <a:endParaRPr lang="it-IT" dirty="0">
+              <a:latin typeface="+mj-lt"/>
+            </a:endParaRPr>
+          </a:p>
+        </p:txBody>
+      </p:sp>
+      <p:pic>
+        <p:nvPicPr>
+          <p:cNvPr id="6146" name="Picture 2" descr="C:\Users\Ferdinando\Desktop\UCD Primo.jpg"/>
+          <p:cNvPicPr>
+            <a:picLocks noChangeAspect="1" noChangeArrowheads="1"/>
+          </p:cNvPicPr>
+          <p:nvPr/>
+        </p:nvPicPr>
+        <p:blipFill>
+          <a:blip r:embed="rId3" cstate="print"/>
+          <a:srcRect/>
+          <a:stretch>
+            <a:fillRect/>
+          </a:stretch>
+        </p:blipFill>
+        <p:spPr bwMode="auto">
+          <a:xfrm>
+            <a:off x="1331640" y="1196752"/>
+            <a:ext cx="6552727" cy="5661248"/>
+          </a:xfrm>
+          <a:prstGeom prst="rect">
+            <a:avLst/>
+          </a:prstGeom>
+          <a:noFill/>
+        </p:spPr>
+      </p:pic>
+    </p:spTree>
+  </p:cSld>
+  <p:clrMapOvr>
+    <a:masterClrMapping/>
+  </p:clrMapOvr>
+</p:sld>
+</file>
+
+<file path=ppt/slides/slide13.xml><?xml version="1.0" encoding="utf-8"?>
+<p:sld xmlns:a="http://schemas.openxmlformats.org/drawingml/2006/main" xmlns:r="http://schemas.openxmlformats.org/officeDocument/2006/relationships" xmlns:p="http://schemas.openxmlformats.org/presentationml/2006/main">
+  <p:cSld>
+    <p:spTree>
+      <p:nvGrpSpPr>
+        <p:cNvPr id="1" name=""/>
+        <p:cNvGrpSpPr/>
+        <p:nvPr/>
+      </p:nvGrpSpPr>
+      <p:grpSpPr>
+        <a:xfrm>
+          <a:off x="0" y="0"/>
+          <a:ext cx="0" cy="0"/>
+          <a:chOff x="0" y="0"/>
+          <a:chExt cx="0" cy="0"/>
+        </a:xfrm>
+      </p:grpSpPr>
+      <p:sp>
+        <p:nvSpPr>
+          <p:cNvPr id="4" name="CasellaDiTesto 3"/>
+          <p:cNvSpPr txBox="1"/>
+          <p:nvPr/>
+        </p:nvSpPr>
+        <p:spPr>
+          <a:xfrm>
+            <a:off x="971600" y="1"/>
+            <a:ext cx="6912768" cy="1538883"/>
+          </a:xfrm>
+          <a:prstGeom prst="rect">
+            <a:avLst/>
+          </a:prstGeom>
+          <a:noFill/>
+        </p:spPr>
+        <p:txBody>
+          <a:bodyPr wrap="square" rtlCol="0">
+            <a:spAutoFit/>
+          </a:bodyPr>
+          <a:lstStyle/>
+          <a:p>
+            <a:pPr algn="ctr"/>
+            <a:r>
+              <a:rPr lang="it-IT" sz="4800" b="1" dirty="0" err="1" smtClean="0">
+                <a:latin typeface="+mj-lt"/>
+              </a:rPr>
+              <a:t>Use</a:t>
+            </a:r>
+            <a:r>
+              <a:rPr lang="it-IT" sz="4800" b="1" dirty="0" smtClean="0">
+                <a:latin typeface="+mj-lt"/>
+              </a:rPr>
+              <a:t> case </a:t>
+            </a:r>
+            <a:r>
+              <a:rPr lang="it-IT" sz="4800" b="1" dirty="0" err="1" smtClean="0">
+                <a:latin typeface="+mj-lt"/>
+              </a:rPr>
+              <a:t>Diagram</a:t>
+            </a:r>
+            <a:r>
+              <a:rPr lang="it-IT" sz="4800" b="1" dirty="0" smtClean="0">
+                <a:latin typeface="+mj-lt"/>
+              </a:rPr>
+              <a:t> </a:t>
+            </a:r>
+            <a:endParaRPr lang="it-IT" sz="4800" b="1" dirty="0" smtClean="0">
+              <a:latin typeface="+mj-lt"/>
+            </a:endParaRPr>
+          </a:p>
+          <a:p>
+            <a:pPr algn="ctr"/>
+            <a:r>
+              <a:rPr lang="it-IT" sz="2800" b="1" dirty="0" smtClean="0">
+                <a:latin typeface="+mj-lt"/>
+              </a:rPr>
+              <a:t>Seconda versione </a:t>
+            </a:r>
+            <a:endParaRPr lang="it-IT" sz="2800" b="1" dirty="0" smtClean="0">
+              <a:latin typeface="+mj-lt"/>
+            </a:endParaRPr>
+          </a:p>
+          <a:p>
+            <a:pPr algn="ctr"/>
+            <a:endParaRPr lang="it-IT" dirty="0">
+              <a:latin typeface="+mj-lt"/>
+            </a:endParaRPr>
+          </a:p>
+        </p:txBody>
+      </p:sp>
+      <p:pic>
+        <p:nvPicPr>
+          <p:cNvPr id="7170" name="Picture 2" descr="C:\Users\Ferdinando\Desktop\2ver.jpg"/>
+          <p:cNvPicPr>
+            <a:picLocks noChangeAspect="1" noChangeArrowheads="1"/>
+          </p:cNvPicPr>
+          <p:nvPr/>
+        </p:nvPicPr>
+        <p:blipFill>
+          <a:blip r:embed="rId3" cstate="print"/>
+          <a:srcRect/>
+          <a:stretch>
+            <a:fillRect/>
+          </a:stretch>
+        </p:blipFill>
+        <p:spPr bwMode="auto">
+          <a:xfrm>
+            <a:off x="1403648" y="1196752"/>
+            <a:ext cx="5976664" cy="5661248"/>
+          </a:xfrm>
+          <a:prstGeom prst="rect">
+            <a:avLst/>
+          </a:prstGeom>
+          <a:noFill/>
+        </p:spPr>
+      </p:pic>
+    </p:spTree>
+  </p:cSld>
+  <p:clrMapOvr>
+    <a:masterClrMapping/>
+  </p:clrMapOvr>
+</p:sld>
+</file>
+
+<file path=ppt/slides/slide14.xml><?xml version="1.0" encoding="utf-8"?>
+<p:sld xmlns:a="http://schemas.openxmlformats.org/drawingml/2006/main" xmlns:r="http://schemas.openxmlformats.org/officeDocument/2006/relationships" xmlns:p="http://schemas.openxmlformats.org/presentationml/2006/main">
+  <p:cSld>
+    <p:spTree>
+      <p:nvGrpSpPr>
+        <p:cNvPr id="1" name=""/>
+        <p:cNvGrpSpPr/>
+        <p:nvPr/>
+      </p:nvGrpSpPr>
+      <p:grpSpPr>
+        <a:xfrm>
+          <a:off x="0" y="0"/>
+          <a:ext cx="0" cy="0"/>
+          <a:chOff x="0" y="0"/>
+          <a:chExt cx="0" cy="0"/>
+        </a:xfrm>
+      </p:grpSpPr>
+      <p:sp>
+        <p:nvSpPr>
+          <p:cNvPr id="4" name="CasellaDiTesto 3"/>
+          <p:cNvSpPr txBox="1"/>
+          <p:nvPr/>
+        </p:nvSpPr>
+        <p:spPr>
+          <a:xfrm>
+            <a:off x="971600" y="1"/>
+            <a:ext cx="6912768" cy="1538883"/>
+          </a:xfrm>
+          <a:prstGeom prst="rect">
+            <a:avLst/>
+          </a:prstGeom>
+          <a:noFill/>
+        </p:spPr>
+        <p:txBody>
+          <a:bodyPr wrap="square" rtlCol="0">
+            <a:spAutoFit/>
+          </a:bodyPr>
+          <a:lstStyle/>
+          <a:p>
+            <a:pPr algn="ctr"/>
+            <a:r>
+              <a:rPr lang="it-IT" sz="4800" b="1" dirty="0" err="1" smtClean="0">
+                <a:latin typeface="+mj-lt"/>
+              </a:rPr>
+              <a:t>Use</a:t>
+            </a:r>
+            <a:r>
+              <a:rPr lang="it-IT" sz="4800" b="1" dirty="0" smtClean="0">
+                <a:latin typeface="+mj-lt"/>
+              </a:rPr>
+              <a:t> case </a:t>
+            </a:r>
+            <a:r>
+              <a:rPr lang="it-IT" sz="4800" b="1" dirty="0" err="1" smtClean="0">
+                <a:latin typeface="+mj-lt"/>
+              </a:rPr>
+              <a:t>Diagram</a:t>
+            </a:r>
+            <a:r>
+              <a:rPr lang="it-IT" sz="4800" b="1" dirty="0" smtClean="0">
+                <a:latin typeface="+mj-lt"/>
+              </a:rPr>
+              <a:t> </a:t>
+            </a:r>
+            <a:endParaRPr lang="it-IT" sz="4800" b="1" dirty="0" smtClean="0">
+              <a:latin typeface="+mj-lt"/>
+            </a:endParaRPr>
+          </a:p>
+          <a:p>
+            <a:pPr algn="ctr"/>
+            <a:r>
+              <a:rPr lang="it-IT" sz="2800" b="1" dirty="0" smtClean="0">
+                <a:latin typeface="+mj-lt"/>
+              </a:rPr>
+              <a:t>Ultima versione </a:t>
+            </a:r>
+            <a:endParaRPr lang="it-IT" sz="2800" b="1" dirty="0" smtClean="0">
+              <a:latin typeface="+mj-lt"/>
+            </a:endParaRPr>
+          </a:p>
+          <a:p>
+            <a:pPr algn="ctr"/>
+            <a:endParaRPr lang="it-IT" dirty="0">
+              <a:latin typeface="+mj-lt"/>
+            </a:endParaRPr>
+          </a:p>
+        </p:txBody>
+      </p:sp>
+      <p:pic>
+        <p:nvPicPr>
+          <p:cNvPr id="8194" name="Picture 2" descr="C:\Users\Ferdinando\Desktop\UCD finale.jpg"/>
+          <p:cNvPicPr>
+            <a:picLocks noChangeAspect="1" noChangeArrowheads="1"/>
+          </p:cNvPicPr>
+          <p:nvPr/>
+        </p:nvPicPr>
+        <p:blipFill>
+          <a:blip r:embed="rId3" cstate="print"/>
+          <a:srcRect/>
+          <a:stretch>
+            <a:fillRect/>
+          </a:stretch>
+        </p:blipFill>
+        <p:spPr bwMode="auto">
+          <a:xfrm>
+            <a:off x="899592" y="1196752"/>
+            <a:ext cx="7416824" cy="5661248"/>
+          </a:xfrm>
+          <a:prstGeom prst="rect">
+            <a:avLst/>
+          </a:prstGeom>
+          <a:noFill/>
+        </p:spPr>
+      </p:pic>
+    </p:spTree>
+  </p:cSld>
+  <p:clrMapOvr>
+    <a:masterClrMapping/>
+  </p:clrMapOvr>
+</p:sld>
+</file>
+
+<file path=ppt/slides/slide15.xml><?xml version="1.0" encoding="utf-8"?>
+<p:sld xmlns:a="http://schemas.openxmlformats.org/drawingml/2006/main" xmlns:r="http://schemas.openxmlformats.org/officeDocument/2006/relationships" xmlns:p="http://schemas.openxmlformats.org/presentationml/2006/main">
+  <p:cSld>
+    <p:spTree>
+      <p:nvGrpSpPr>
+        <p:cNvPr id="1" name=""/>
+        <p:cNvGrpSpPr/>
+        <p:nvPr/>
+      </p:nvGrpSpPr>
+      <p:grpSpPr>
+        <a:xfrm>
+          <a:off x="0" y="0"/>
+          <a:ext cx="0" cy="0"/>
+          <a:chOff x="0" y="0"/>
+          <a:chExt cx="0" cy="0"/>
+        </a:xfrm>
+      </p:grpSpPr>
+      <p:pic>
+        <p:nvPicPr>
+          <p:cNvPr id="1026" name="Picture 2"/>
+          <p:cNvPicPr>
+            <a:picLocks noChangeAspect="1" noChangeArrowheads="1"/>
+          </p:cNvPicPr>
+          <p:nvPr/>
+        </p:nvPicPr>
+        <p:blipFill>
+          <a:blip r:embed="rId3" cstate="print"/>
+          <a:srcRect/>
+          <a:stretch>
+            <a:fillRect/>
+          </a:stretch>
+        </p:blipFill>
+        <p:spPr bwMode="auto">
+          <a:xfrm>
+            <a:off x="0" y="1340768"/>
+            <a:ext cx="9144000" cy="5517232"/>
+          </a:xfrm>
+          <a:prstGeom prst="rect">
+            <a:avLst/>
+          </a:prstGeom>
+          <a:noFill/>
+          <a:ln w="9525">
+            <a:noFill/>
+            <a:miter lim="800000"/>
+            <a:headEnd/>
+            <a:tailEnd/>
+          </a:ln>
+        </p:spPr>
+      </p:pic>
+      <p:sp>
+        <p:nvSpPr>
+          <p:cNvPr id="4" name="CasellaDiTesto 3"/>
+          <p:cNvSpPr txBox="1"/>
+          <p:nvPr/>
+        </p:nvSpPr>
+        <p:spPr>
+          <a:xfrm>
+            <a:off x="971600" y="0"/>
+            <a:ext cx="6912768" cy="1538883"/>
+          </a:xfrm>
+          <a:prstGeom prst="rect">
+            <a:avLst/>
+          </a:prstGeom>
+          <a:noFill/>
+        </p:spPr>
+        <p:txBody>
+          <a:bodyPr wrap="square" rtlCol="0">
+            <a:spAutoFit/>
+          </a:bodyPr>
+          <a:lstStyle/>
+          <a:p>
+            <a:pPr algn="ctr"/>
+            <a:r>
+              <a:rPr lang="it-IT" sz="4800" b="1" dirty="0" err="1" smtClean="0">
+                <a:latin typeface="+mj-lt"/>
+              </a:rPr>
+              <a:t>Use</a:t>
+            </a:r>
+            <a:r>
+              <a:rPr lang="it-IT" sz="4800" b="1" dirty="0" smtClean="0">
+                <a:latin typeface="+mj-lt"/>
+              </a:rPr>
+              <a:t> case </a:t>
+            </a:r>
+            <a:r>
+              <a:rPr lang="it-IT" sz="4800" b="1" dirty="0" err="1" smtClean="0">
+                <a:latin typeface="+mj-lt"/>
+              </a:rPr>
+              <a:t>Diagram</a:t>
+            </a:r>
+            <a:r>
+              <a:rPr lang="it-IT" sz="4800" b="1" dirty="0" smtClean="0">
+                <a:latin typeface="+mj-lt"/>
+              </a:rPr>
+              <a:t> </a:t>
+            </a:r>
+            <a:endParaRPr lang="it-IT" sz="4800" b="1" dirty="0" smtClean="0">
+              <a:latin typeface="+mj-lt"/>
+            </a:endParaRPr>
+          </a:p>
+          <a:p>
+            <a:pPr algn="ctr"/>
+            <a:r>
+              <a:rPr lang="it-IT" sz="2800" b="1" dirty="0" smtClean="0">
+                <a:latin typeface="+mj-lt"/>
+              </a:rPr>
+              <a:t>Prima versione </a:t>
+            </a:r>
+            <a:r>
+              <a:rPr lang="it-IT" sz="2800" b="1" dirty="0" err="1" smtClean="0">
+                <a:latin typeface="+mj-lt"/>
+              </a:rPr>
+              <a:t>GestioneDatiPersonali</a:t>
+            </a:r>
+            <a:r>
+              <a:rPr lang="it-IT" sz="2800" b="1" dirty="0" smtClean="0">
+                <a:latin typeface="+mj-lt"/>
+              </a:rPr>
+              <a:t> </a:t>
+            </a:r>
+            <a:endParaRPr lang="it-IT" sz="2800" b="1" dirty="0" smtClean="0">
+              <a:latin typeface="+mj-lt"/>
+            </a:endParaRPr>
+          </a:p>
+          <a:p>
+            <a:pPr algn="ctr"/>
+            <a:endParaRPr lang="it-IT" dirty="0">
+              <a:latin typeface="+mj-lt"/>
+            </a:endParaRPr>
+          </a:p>
+        </p:txBody>
+      </p:sp>
+    </p:spTree>
+  </p:cSld>
+  <p:clrMapOvr>
+    <a:masterClrMapping/>
+  </p:clrMapOvr>
+</p:sld>
+</file>
+
+<file path=ppt/slides/slide16.xml><?xml version="1.0" encoding="utf-8"?>
+<p:sld xmlns:a="http://schemas.openxmlformats.org/drawingml/2006/main" xmlns:r="http://schemas.openxmlformats.org/officeDocument/2006/relationships" xmlns:p="http://schemas.openxmlformats.org/presentationml/2006/main">
+  <p:cSld>
+    <p:spTree>
+      <p:nvGrpSpPr>
+        <p:cNvPr id="1" name=""/>
+        <p:cNvGrpSpPr/>
+        <p:nvPr/>
+      </p:nvGrpSpPr>
+      <p:grpSpPr>
+        <a:xfrm>
+          <a:off x="0" y="0"/>
+          <a:ext cx="0" cy="0"/>
+          <a:chOff x="0" y="0"/>
+          <a:chExt cx="0" cy="0"/>
+        </a:xfrm>
+      </p:grpSpPr>
+      <p:pic>
+        <p:nvPicPr>
+          <p:cNvPr id="3074" name="Picture 2"/>
+          <p:cNvPicPr>
+            <a:picLocks noChangeAspect="1" noChangeArrowheads="1"/>
+          </p:cNvPicPr>
+          <p:nvPr/>
+        </p:nvPicPr>
+        <p:blipFill>
+          <a:blip r:embed="rId3" cstate="print"/>
+          <a:srcRect/>
+          <a:stretch>
+            <a:fillRect/>
+          </a:stretch>
+        </p:blipFill>
+        <p:spPr bwMode="auto">
+          <a:xfrm>
+            <a:off x="0" y="1268760"/>
+            <a:ext cx="9144000" cy="5589240"/>
+          </a:xfrm>
+          <a:prstGeom prst="rect">
+            <a:avLst/>
+          </a:prstGeom>
+          <a:noFill/>
+          <a:ln w="9525">
+            <a:noFill/>
+            <a:miter lim="800000"/>
+            <a:headEnd/>
+            <a:tailEnd/>
+          </a:ln>
+        </p:spPr>
+      </p:pic>
+      <p:sp>
+        <p:nvSpPr>
+          <p:cNvPr id="3" name="CasellaDiTesto 2"/>
+          <p:cNvSpPr txBox="1"/>
+          <p:nvPr/>
+        </p:nvSpPr>
+        <p:spPr>
+          <a:xfrm>
+            <a:off x="971600" y="0"/>
+            <a:ext cx="6912768" cy="1538883"/>
+          </a:xfrm>
+          <a:prstGeom prst="rect">
+            <a:avLst/>
+          </a:prstGeom>
+          <a:noFill/>
+        </p:spPr>
+        <p:txBody>
+          <a:bodyPr wrap="square" rtlCol="0">
+            <a:spAutoFit/>
+          </a:bodyPr>
+          <a:lstStyle/>
+          <a:p>
+            <a:pPr algn="ctr"/>
+            <a:r>
+              <a:rPr lang="it-IT" sz="4800" b="1" dirty="0" err="1" smtClean="0">
+                <a:latin typeface="+mj-lt"/>
+              </a:rPr>
+              <a:t>Use</a:t>
+            </a:r>
+            <a:r>
+              <a:rPr lang="it-IT" sz="4800" b="1" dirty="0" smtClean="0">
+                <a:latin typeface="+mj-lt"/>
+              </a:rPr>
+              <a:t> case </a:t>
+            </a:r>
+            <a:r>
+              <a:rPr lang="it-IT" sz="4800" b="1" dirty="0" err="1" smtClean="0">
+                <a:latin typeface="+mj-lt"/>
+              </a:rPr>
+              <a:t>Diagram</a:t>
+            </a:r>
+            <a:r>
+              <a:rPr lang="it-IT" sz="4800" b="1" dirty="0" smtClean="0">
+                <a:latin typeface="+mj-lt"/>
+              </a:rPr>
+              <a:t> </a:t>
+            </a:r>
+            <a:endParaRPr lang="it-IT" sz="4800" b="1" dirty="0" smtClean="0">
+              <a:latin typeface="+mj-lt"/>
+            </a:endParaRPr>
+          </a:p>
+          <a:p>
+            <a:pPr algn="ctr"/>
+            <a:r>
+              <a:rPr lang="it-IT" sz="2800" b="1" dirty="0" smtClean="0">
+                <a:latin typeface="+mj-lt"/>
+              </a:rPr>
+              <a:t>Ultima versione </a:t>
+            </a:r>
+            <a:r>
+              <a:rPr lang="it-IT" sz="2800" b="1" dirty="0" err="1" smtClean="0">
+                <a:latin typeface="+mj-lt"/>
+              </a:rPr>
+              <a:t>GestioneDati</a:t>
+            </a:r>
+            <a:r>
+              <a:rPr lang="it-IT" sz="2800" b="1" dirty="0" smtClean="0">
+                <a:latin typeface="+mj-lt"/>
+              </a:rPr>
+              <a:t> personali</a:t>
+            </a:r>
+            <a:endParaRPr lang="it-IT" sz="2800" b="1" dirty="0" smtClean="0">
+              <a:latin typeface="+mj-lt"/>
+            </a:endParaRPr>
           </a:p>
           <a:p>
             <a:pPr algn="ctr"/>
@@ -6769,7 +8018,7 @@
     </p:spTree>
     <p:extLst>
       <p:ext uri="{BB962C8B-B14F-4D97-AF65-F5344CB8AC3E}">
-        <p14:creationId xmlns="" xmlns:p14="http://schemas.microsoft.com/office/powerpoint/2010/main" val="155874689"/>
+        <p14:creationId xmlns:p14="http://schemas.microsoft.com/office/powerpoint/2010/main" xmlns="" val="155874689"/>
       </p:ext>
     </p:extLst>
   </p:cSld>
@@ -6777,7 +8026,7 @@
     <a:masterClrMapping/>
   </p:clrMapOvr>
   <mc:AlternateContent xmlns:mc="http://schemas.openxmlformats.org/markup-compatibility/2006">
-    <mc:Choice xmlns="" xmlns:p14="http://schemas.microsoft.com/office/powerpoint/2010/main" Requires="p14">
+    <mc:Choice xmlns:p14="http://schemas.microsoft.com/office/powerpoint/2010/main" xmlns="" Requires="p14">
       <p:transition spd="slow" p14:dur="2000"/>
     </mc:Choice>
     <mc:Fallback>
@@ -7124,7 +8373,7 @@
     </p:spTree>
     <p:extLst>
       <p:ext uri="{BB962C8B-B14F-4D97-AF65-F5344CB8AC3E}">
-        <p14:creationId xmlns="" xmlns:p14="http://schemas.microsoft.com/office/powerpoint/2010/main" val="155874689"/>
+        <p14:creationId xmlns:p14="http://schemas.microsoft.com/office/powerpoint/2010/main" xmlns="" val="155874689"/>
       </p:ext>
     </p:extLst>
   </p:cSld>
@@ -7132,7 +8381,7 @@
     <a:masterClrMapping/>
   </p:clrMapOvr>
   <mc:AlternateContent xmlns:mc="http://schemas.openxmlformats.org/markup-compatibility/2006">
-    <mc:Choice xmlns="" xmlns:p14="http://schemas.microsoft.com/office/powerpoint/2010/main" Requires="p14">
+    <mc:Choice xmlns:p14="http://schemas.microsoft.com/office/powerpoint/2010/main" xmlns="" Requires="p14">
       <p:transition spd="slow" p14:dur="2000"/>
     </mc:Choice>
     <mc:Fallback>
@@ -7483,7 +8732,7 @@
     </p:spTree>
     <p:extLst>
       <p:ext uri="{BB962C8B-B14F-4D97-AF65-F5344CB8AC3E}">
-        <p14:creationId xmlns="" xmlns:p14="http://schemas.microsoft.com/office/powerpoint/2010/main" val="155874689"/>
+        <p14:creationId xmlns:p14="http://schemas.microsoft.com/office/powerpoint/2010/main" xmlns="" val="155874689"/>
       </p:ext>
     </p:extLst>
   </p:cSld>
@@ -7491,7 +8740,7 @@
     <a:masterClrMapping/>
   </p:clrMapOvr>
   <mc:AlternateContent xmlns:mc="http://schemas.openxmlformats.org/markup-compatibility/2006">
-    <mc:Choice xmlns="" xmlns:p14="http://schemas.microsoft.com/office/powerpoint/2010/main" Requires="p14">
+    <mc:Choice xmlns:p14="http://schemas.microsoft.com/office/powerpoint/2010/main" xmlns="" Requires="p14">
       <p:transition spd="slow" p14:dur="2000"/>
     </mc:Choice>
     <mc:Fallback>
@@ -7843,7 +9092,7 @@
     </p:spTree>
     <p:extLst>
       <p:ext uri="{BB962C8B-B14F-4D97-AF65-F5344CB8AC3E}">
-        <p14:creationId xmlns="" xmlns:p14="http://schemas.microsoft.com/office/powerpoint/2010/main" val="155874689"/>
+        <p14:creationId xmlns:p14="http://schemas.microsoft.com/office/powerpoint/2010/main" xmlns="" val="155874689"/>
       </p:ext>
     </p:extLst>
   </p:cSld>
@@ -7851,7 +9100,7 @@
     <a:masterClrMapping/>
   </p:clrMapOvr>
   <mc:AlternateContent xmlns:mc="http://schemas.openxmlformats.org/markup-compatibility/2006">
-    <mc:Choice xmlns="" xmlns:p14="http://schemas.microsoft.com/office/powerpoint/2010/main" Requires="p14">
+    <mc:Choice xmlns:p14="http://schemas.microsoft.com/office/powerpoint/2010/main" xmlns="" Requires="p14">
       <p:transition spd="slow" p14:dur="2000"/>
     </mc:Choice>
     <mc:Fallback>
@@ -8202,7 +9451,7 @@
     </p:spTree>
     <p:extLst>
       <p:ext uri="{BB962C8B-B14F-4D97-AF65-F5344CB8AC3E}">
-        <p14:creationId xmlns="" xmlns:p14="http://schemas.microsoft.com/office/powerpoint/2010/main" val="155874689"/>
+        <p14:creationId xmlns:p14="http://schemas.microsoft.com/office/powerpoint/2010/main" xmlns="" val="155874689"/>
       </p:ext>
     </p:extLst>
   </p:cSld>
@@ -8210,7 +9459,7 @@
     <a:masterClrMapping/>
   </p:clrMapOvr>
   <mc:AlternateContent xmlns:mc="http://schemas.openxmlformats.org/markup-compatibility/2006">
-    <mc:Choice xmlns="" xmlns:p14="http://schemas.microsoft.com/office/powerpoint/2010/main" Requires="p14">
+    <mc:Choice xmlns:p14="http://schemas.microsoft.com/office/powerpoint/2010/main" xmlns="" Requires="p14">
       <p:transition spd="slow" p14:dur="2000"/>
     </mc:Choice>
     <mc:Fallback>
@@ -8571,7 +9820,7 @@
     </p:spTree>
     <p:extLst>
       <p:ext uri="{BB962C8B-B14F-4D97-AF65-F5344CB8AC3E}">
-        <p14:creationId xmlns="" xmlns:p14="http://schemas.microsoft.com/office/powerpoint/2010/main" val="155874689"/>
+        <p14:creationId xmlns:p14="http://schemas.microsoft.com/office/powerpoint/2010/main" xmlns="" val="155874689"/>
       </p:ext>
     </p:extLst>
   </p:cSld>
@@ -8579,7 +9828,7 @@
     <a:masterClrMapping/>
   </p:clrMapOvr>
   <mc:AlternateContent xmlns:mc="http://schemas.openxmlformats.org/markup-compatibility/2006">
-    <mc:Choice xmlns="" xmlns:p14="http://schemas.microsoft.com/office/powerpoint/2010/main" Requires="p14">
+    <mc:Choice xmlns:p14="http://schemas.microsoft.com/office/powerpoint/2010/main" xmlns="" Requires="p14">
       <p:transition spd="slow" p14:dur="2000"/>
     </mc:Choice>
     <mc:Fallback>
@@ -8934,7 +10183,7 @@
     </p:spTree>
     <p:extLst>
       <p:ext uri="{BB962C8B-B14F-4D97-AF65-F5344CB8AC3E}">
-        <p14:creationId xmlns="" xmlns:p14="http://schemas.microsoft.com/office/powerpoint/2010/main" val="155874689"/>
+        <p14:creationId xmlns:p14="http://schemas.microsoft.com/office/powerpoint/2010/main" xmlns="" val="155874689"/>
       </p:ext>
     </p:extLst>
   </p:cSld>
@@ -8942,7 +10191,7 @@
     <a:masterClrMapping/>
   </p:clrMapOvr>
   <mc:AlternateContent xmlns:mc="http://schemas.openxmlformats.org/markup-compatibility/2006">
-    <mc:Choice xmlns="" xmlns:p14="http://schemas.microsoft.com/office/powerpoint/2010/main" Requires="p14">
+    <mc:Choice xmlns:p14="http://schemas.microsoft.com/office/powerpoint/2010/main" xmlns="" Requires="p14">
       <p:transition spd="slow" p14:dur="2000"/>
     </mc:Choice>
     <mc:Fallback>
@@ -9248,7 +10497,7 @@
     </p:spTree>
     <p:extLst>
       <p:ext uri="{BB962C8B-B14F-4D97-AF65-F5344CB8AC3E}">
-        <p14:creationId xmlns="" xmlns:p14="http://schemas.microsoft.com/office/powerpoint/2010/main" val="155874689"/>
+        <p14:creationId xmlns:p14="http://schemas.microsoft.com/office/powerpoint/2010/main" xmlns="" val="155874689"/>
       </p:ext>
     </p:extLst>
   </p:cSld>
@@ -9256,7 +10505,7 @@
     <a:masterClrMapping/>
   </p:clrMapOvr>
   <mc:AlternateContent xmlns:mc="http://schemas.openxmlformats.org/markup-compatibility/2006">
-    <mc:Choice xmlns="" xmlns:p14="http://schemas.microsoft.com/office/powerpoint/2010/main" Requires="p14">
+    <mc:Choice xmlns:p14="http://schemas.microsoft.com/office/powerpoint/2010/main" xmlns="" Requires="p14">
       <p:transition spd="slow" p14:dur="2000"/>
     </mc:Choice>
     <mc:Fallback>

</xml_diff>

<commit_message>
[WR_A] Revisione presentazione in seguito ad accorgimenti di errori
</commit_message>
<xml_diff>
--- a/Presentazione/Atsilo1/Di Palma/[Bozza]Introduzione.pptx
+++ b/Presentazione/Atsilo1/Di Palma/[Bozza]Introduzione.pptx
@@ -208,7 +208,7 @@
             <a:fld id="{38D78F4D-402C-46E0-A4BB-DF91EA86B14C}" type="datetimeFigureOut">
               <a:rPr lang="it-IT" smtClean="0"/>
               <a:pPr/>
-              <a:t>28/12/2012</a:t>
+              <a:t>29/12/2012</a:t>
             </a:fld>
             <a:endParaRPr lang="it-IT"/>
           </a:p>
@@ -377,7 +377,7 @@
     </p:spTree>
     <p:extLst>
       <p:ext uri="{BB962C8B-B14F-4D97-AF65-F5344CB8AC3E}">
-        <p14:creationId xmlns:p14="http://schemas.microsoft.com/office/powerpoint/2010/main" xmlns="" val="2126419590"/>
+        <p14:creationId xmlns="" xmlns:p14="http://schemas.microsoft.com/office/powerpoint/2010/main" val="2126419590"/>
       </p:ext>
     </p:extLst>
   </p:cSld>
@@ -621,13 +621,8 @@
           <a:p>
             <a:r>
               <a:rPr lang="it-IT" dirty="0" smtClean="0"/>
-              <a:t>-Possibilità di cerchiare attori del sottosistema (spiegazione rapida</a:t>
-            </a:r>
-            <a:r>
-              <a:rPr lang="it-IT" dirty="0" smtClean="0"/>
-              <a:t>)</a:t>
-            </a:r>
-            <a:endParaRPr lang="it-IT" dirty="0" smtClean="0"/>
+              <a:t>-Possibilità di cerchiare attori del sottosistema (spiegazione rapida)</a:t>
+            </a:r>
           </a:p>
         </p:txBody>
       </p:sp>
@@ -709,14 +704,6 @@
           </a:bodyPr>
           <a:lstStyle/>
           <a:p>
-            <a:r>
-              <a:rPr lang="it-IT" dirty="0" smtClean="0"/>
-              <a:t>-Possibilità di cerchiare attori del sottosistema (spiegazione rapida</a:t>
-            </a:r>
-            <a:r>
-              <a:rPr lang="it-IT" dirty="0" smtClean="0"/>
-              <a:t>)</a:t>
-            </a:r>
             <a:endParaRPr lang="it-IT" dirty="0" smtClean="0"/>
           </a:p>
         </p:txBody>
@@ -881,6 +868,18 @@
           </a:bodyPr>
           <a:lstStyle/>
           <a:p>
+            <a:r>
+              <a:rPr lang="it-IT" dirty="0" smtClean="0"/>
+              <a:t>Direttore dal </a:t>
+            </a:r>
+            <a:r>
+              <a:rPr lang="it-IT" dirty="0" err="1" smtClean="0"/>
+              <a:t>rad</a:t>
+            </a:r>
+            <a:r>
+              <a:rPr lang="it-IT" dirty="0" smtClean="0"/>
+              <a:t> 2.0</a:t>
+            </a:r>
             <a:endParaRPr lang="it-IT" dirty="0" smtClean="0"/>
           </a:p>
         </p:txBody>
@@ -2195,7 +2194,7 @@
             <a:fld id="{63CABBC0-75E4-43BB-A6A6-84C2A96BDB82}" type="datetimeFigureOut">
               <a:rPr lang="it-IT" smtClean="0"/>
               <a:pPr/>
-              <a:t>28/12/2012</a:t>
+              <a:t>29/12/2012</a:t>
             </a:fld>
             <a:endParaRPr lang="it-IT"/>
           </a:p>
@@ -2377,7 +2376,7 @@
             <a:fld id="{63CABBC0-75E4-43BB-A6A6-84C2A96BDB82}" type="datetimeFigureOut">
               <a:rPr lang="it-IT" smtClean="0"/>
               <a:pPr/>
-              <a:t>28/12/2012</a:t>
+              <a:t>29/12/2012</a:t>
             </a:fld>
             <a:endParaRPr lang="it-IT"/>
           </a:p>
@@ -2569,7 +2568,7 @@
             <a:fld id="{63CABBC0-75E4-43BB-A6A6-84C2A96BDB82}" type="datetimeFigureOut">
               <a:rPr lang="it-IT" smtClean="0"/>
               <a:pPr/>
-              <a:t>28/12/2012</a:t>
+              <a:t>29/12/2012</a:t>
             </a:fld>
             <a:endParaRPr lang="it-IT"/>
           </a:p>
@@ -2751,7 +2750,7 @@
             <a:fld id="{63CABBC0-75E4-43BB-A6A6-84C2A96BDB82}" type="datetimeFigureOut">
               <a:rPr lang="it-IT" smtClean="0"/>
               <a:pPr/>
-              <a:t>28/12/2012</a:t>
+              <a:t>29/12/2012</a:t>
             </a:fld>
             <a:endParaRPr lang="it-IT"/>
           </a:p>
@@ -2994,7 +2993,7 @@
             <a:fld id="{63CABBC0-75E4-43BB-A6A6-84C2A96BDB82}" type="datetimeFigureOut">
               <a:rPr lang="it-IT" smtClean="0"/>
               <a:pPr/>
-              <a:t>28/12/2012</a:t>
+              <a:t>29/12/2012</a:t>
             </a:fld>
             <a:endParaRPr lang="it-IT"/>
           </a:p>
@@ -3275,7 +3274,7 @@
             <a:fld id="{63CABBC0-75E4-43BB-A6A6-84C2A96BDB82}" type="datetimeFigureOut">
               <a:rPr lang="it-IT" smtClean="0"/>
               <a:pPr/>
-              <a:t>28/12/2012</a:t>
+              <a:t>29/12/2012</a:t>
             </a:fld>
             <a:endParaRPr lang="it-IT"/>
           </a:p>
@@ -3666,7 +3665,7 @@
             <a:fld id="{63CABBC0-75E4-43BB-A6A6-84C2A96BDB82}" type="datetimeFigureOut">
               <a:rPr lang="it-IT" smtClean="0"/>
               <a:pPr/>
-              <a:t>28/12/2012</a:t>
+              <a:t>29/12/2012</a:t>
             </a:fld>
             <a:endParaRPr lang="it-IT"/>
           </a:p>
@@ -3825,7 +3824,7 @@
             <a:fld id="{63CABBC0-75E4-43BB-A6A6-84C2A96BDB82}" type="datetimeFigureOut">
               <a:rPr lang="it-IT" smtClean="0"/>
               <a:pPr/>
-              <a:t>28/12/2012</a:t>
+              <a:t>29/12/2012</a:t>
             </a:fld>
             <a:endParaRPr lang="it-IT"/>
           </a:p>
@@ -3924,7 +3923,7 @@
             <a:fld id="{63CABBC0-75E4-43BB-A6A6-84C2A96BDB82}" type="datetimeFigureOut">
               <a:rPr lang="it-IT" smtClean="0"/>
               <a:pPr/>
-              <a:t>28/12/2012</a:t>
+              <a:t>29/12/2012</a:t>
             </a:fld>
             <a:endParaRPr lang="it-IT"/>
           </a:p>
@@ -4194,7 +4193,7 @@
             <a:fld id="{63CABBC0-75E4-43BB-A6A6-84C2A96BDB82}" type="datetimeFigureOut">
               <a:rPr lang="it-IT" smtClean="0"/>
               <a:pPr/>
-              <a:t>28/12/2012</a:t>
+              <a:t>29/12/2012</a:t>
             </a:fld>
             <a:endParaRPr lang="it-IT"/>
           </a:p>
@@ -4491,7 +4490,7 @@
             <a:fld id="{63CABBC0-75E4-43BB-A6A6-84C2A96BDB82}" type="datetimeFigureOut">
               <a:rPr lang="it-IT" smtClean="0"/>
               <a:pPr/>
-              <a:t>28/12/2012</a:t>
+              <a:t>29/12/2012</a:t>
             </a:fld>
             <a:endParaRPr lang="it-IT"/>
           </a:p>
@@ -5271,7 +5270,7 @@
             <a:fld id="{63CABBC0-75E4-43BB-A6A6-84C2A96BDB82}" type="datetimeFigureOut">
               <a:rPr lang="it-IT" smtClean="0"/>
               <a:pPr/>
-              <a:t>28/12/2012</a:t>
+              <a:t>29/12/2012</a:t>
             </a:fld>
             <a:endParaRPr lang="it-IT"/>
           </a:p>
@@ -6637,8 +6636,9 @@
             <a:pPr lvl="1"/>
             <a:r>
               <a:rPr lang="it-IT" dirty="0" smtClean="0"/>
-              <a:t>Sottosistema Management</a:t>
-            </a:r>
+              <a:t>Sottosistema Accessi</a:t>
+            </a:r>
+            <a:endParaRPr lang="it-IT" dirty="0" smtClean="0"/>
           </a:p>
           <a:p>
             <a:pPr lvl="1"/>
@@ -6669,7 +6669,7 @@
     </p:spTree>
     <p:extLst>
       <p:ext uri="{BB962C8B-B14F-4D97-AF65-F5344CB8AC3E}">
-        <p14:creationId xmlns:p14="http://schemas.microsoft.com/office/powerpoint/2010/main" xmlns="" val="155874689"/>
+        <p14:creationId xmlns="" xmlns:p14="http://schemas.microsoft.com/office/powerpoint/2010/main" val="155874689"/>
       </p:ext>
     </p:extLst>
   </p:cSld>
@@ -6677,7 +6677,7 @@
     <a:masterClrMapping/>
   </p:clrMapOvr>
   <mc:AlternateContent xmlns:mc="http://schemas.openxmlformats.org/markup-compatibility/2006">
-    <mc:Choice xmlns:p14="http://schemas.microsoft.com/office/powerpoint/2010/main" xmlns="" Requires="p14">
+    <mc:Choice xmlns="" xmlns:p14="http://schemas.microsoft.com/office/powerpoint/2010/main" Requires="p14">
       <p:transition spd="slow" p14:dur="2000"/>
     </mc:Choice>
     <mc:Fallback>
@@ -6936,9 +6936,6 @@
               </a:rPr>
               <a:t> </a:t>
             </a:r>
-            <a:endParaRPr lang="it-IT" sz="4800" b="1" dirty="0" smtClean="0">
-              <a:latin typeface="+mj-lt"/>
-            </a:endParaRPr>
           </a:p>
           <a:p>
             <a:pPr algn="ctr"/>
@@ -6948,9 +6945,6 @@
               </a:rPr>
               <a:t>Prima versione </a:t>
             </a:r>
-            <a:endParaRPr lang="it-IT" sz="2800" b="1" dirty="0" smtClean="0">
-              <a:latin typeface="+mj-lt"/>
-            </a:endParaRPr>
           </a:p>
           <a:p>
             <a:pPr algn="ctr"/>
@@ -7058,9 +7052,6 @@
               </a:rPr>
               <a:t> </a:t>
             </a:r>
-            <a:endParaRPr lang="it-IT" sz="4800" b="1" dirty="0" smtClean="0">
-              <a:latin typeface="+mj-lt"/>
-            </a:endParaRPr>
           </a:p>
           <a:p>
             <a:pPr algn="ctr"/>
@@ -7070,9 +7061,6 @@
               </a:rPr>
               <a:t>Seconda versione </a:t>
             </a:r>
-            <a:endParaRPr lang="it-IT" sz="2800" b="1" dirty="0" smtClean="0">
-              <a:latin typeface="+mj-lt"/>
-            </a:endParaRPr>
           </a:p>
           <a:p>
             <a:pPr algn="ctr"/>
@@ -7180,9 +7168,6 @@
               </a:rPr>
               <a:t> </a:t>
             </a:r>
-            <a:endParaRPr lang="it-IT" sz="4800" b="1" dirty="0" smtClean="0">
-              <a:latin typeface="+mj-lt"/>
-            </a:endParaRPr>
           </a:p>
           <a:p>
             <a:pPr algn="ctr"/>
@@ -7192,9 +7177,6 @@
               </a:rPr>
               <a:t>Ultima versione </a:t>
             </a:r>
-            <a:endParaRPr lang="it-IT" sz="2800" b="1" dirty="0" smtClean="0">
-              <a:latin typeface="+mj-lt"/>
-            </a:endParaRPr>
           </a:p>
           <a:p>
             <a:pPr algn="ctr"/>
@@ -7255,9 +7237,86 @@
           <a:chExt cx="0" cy="0"/>
         </a:xfrm>
       </p:grpSpPr>
+      <p:sp>
+        <p:nvSpPr>
+          <p:cNvPr id="4" name="CasellaDiTesto 3"/>
+          <p:cNvSpPr txBox="1"/>
+          <p:nvPr/>
+        </p:nvSpPr>
+        <p:spPr>
+          <a:xfrm>
+            <a:off x="971600" y="0"/>
+            <a:ext cx="6912768" cy="1538883"/>
+          </a:xfrm>
+          <a:prstGeom prst="rect">
+            <a:avLst/>
+          </a:prstGeom>
+          <a:noFill/>
+        </p:spPr>
+        <p:txBody>
+          <a:bodyPr wrap="square" rtlCol="0">
+            <a:spAutoFit/>
+          </a:bodyPr>
+          <a:lstStyle/>
+          <a:p>
+            <a:pPr algn="ctr"/>
+            <a:r>
+              <a:rPr lang="it-IT" sz="4800" b="1" dirty="0" err="1" smtClean="0">
+                <a:latin typeface="+mj-lt"/>
+              </a:rPr>
+              <a:t>Use</a:t>
+            </a:r>
+            <a:r>
+              <a:rPr lang="it-IT" sz="4800" b="1" dirty="0" smtClean="0">
+                <a:latin typeface="+mj-lt"/>
+              </a:rPr>
+              <a:t> case </a:t>
+            </a:r>
+            <a:r>
+              <a:rPr lang="it-IT" sz="4800" b="1" dirty="0" err="1" smtClean="0">
+                <a:latin typeface="+mj-lt"/>
+              </a:rPr>
+              <a:t>Diagram</a:t>
+            </a:r>
+            <a:r>
+              <a:rPr lang="it-IT" sz="4800" b="1" dirty="0" smtClean="0">
+                <a:latin typeface="+mj-lt"/>
+              </a:rPr>
+              <a:t> </a:t>
+            </a:r>
+          </a:p>
+          <a:p>
+            <a:pPr algn="ctr"/>
+            <a:r>
+              <a:rPr lang="it-IT" sz="2800" b="1" dirty="0" smtClean="0">
+                <a:latin typeface="+mj-lt"/>
+              </a:rPr>
+              <a:t>Prima versione </a:t>
+            </a:r>
+            <a:r>
+              <a:rPr lang="it-IT" sz="2800" b="1" dirty="0" err="1" smtClean="0">
+                <a:latin typeface="+mj-lt"/>
+              </a:rPr>
+              <a:t>GestioneDatiPersonali</a:t>
+            </a:r>
+            <a:r>
+              <a:rPr lang="it-IT" sz="2800" b="1" dirty="0" smtClean="0">
+                <a:latin typeface="+mj-lt"/>
+              </a:rPr>
+              <a:t> </a:t>
+            </a:r>
+          </a:p>
+          <a:p>
+            <a:pPr algn="ctr"/>
+            <a:endParaRPr lang="it-IT" dirty="0">
+              <a:latin typeface="+mj-lt"/>
+            </a:endParaRPr>
+          </a:p>
+        </p:txBody>
+      </p:sp>
       <p:pic>
         <p:nvPicPr>
-          <p:cNvPr id="1026" name="Picture 2"/>
+          <p:cNvPr id="2050" name="Picture 2" descr="C:\Users\Ferdinando\Desktop\Immagine1.png"/>
           <p:cNvPicPr>
             <a:picLocks noChangeAspect="1" noChangeArrowheads="1"/>
           </p:cNvPicPr>
@@ -7272,104 +7331,15 @@
         </p:blipFill>
         <p:spPr bwMode="auto">
           <a:xfrm>
-            <a:off x="0" y="1340768"/>
-            <a:ext cx="9144000" cy="5517232"/>
-          </a:xfrm>
-          <a:prstGeom prst="rect">
-            <a:avLst/>
-          </a:prstGeom>
-          <a:noFill/>
-          <a:ln w="9525">
-            <a:noFill/>
-            <a:miter lim="800000"/>
-            <a:headEnd/>
-            <a:tailEnd/>
-          </a:ln>
-        </p:spPr>
-      </p:pic>
-      <p:sp>
-        <p:nvSpPr>
-          <p:cNvPr id="4" name="CasellaDiTesto 3"/>
-          <p:cNvSpPr txBox="1"/>
-          <p:nvPr/>
-        </p:nvSpPr>
-        <p:spPr>
-          <a:xfrm>
-            <a:off x="971600" y="0"/>
-            <a:ext cx="6912768" cy="1538883"/>
+            <a:off x="0" y="1196752"/>
+            <a:ext cx="9144000" cy="5661248"/>
           </a:xfrm>
           <a:prstGeom prst="rect">
             <a:avLst/>
           </a:prstGeom>
           <a:noFill/>
         </p:spPr>
-        <p:txBody>
-          <a:bodyPr wrap="square" rtlCol="0">
-            <a:spAutoFit/>
-          </a:bodyPr>
-          <a:lstStyle/>
-          <a:p>
-            <a:pPr algn="ctr"/>
-            <a:r>
-              <a:rPr lang="it-IT" sz="4800" b="1" dirty="0" err="1" smtClean="0">
-                <a:latin typeface="+mj-lt"/>
-              </a:rPr>
-              <a:t>Use</a:t>
-            </a:r>
-            <a:r>
-              <a:rPr lang="it-IT" sz="4800" b="1" dirty="0" smtClean="0">
-                <a:latin typeface="+mj-lt"/>
-              </a:rPr>
-              <a:t> case </a:t>
-            </a:r>
-            <a:r>
-              <a:rPr lang="it-IT" sz="4800" b="1" dirty="0" err="1" smtClean="0">
-                <a:latin typeface="+mj-lt"/>
-              </a:rPr>
-              <a:t>Diagram</a:t>
-            </a:r>
-            <a:r>
-              <a:rPr lang="it-IT" sz="4800" b="1" dirty="0" smtClean="0">
-                <a:latin typeface="+mj-lt"/>
-              </a:rPr>
-              <a:t> </a:t>
-            </a:r>
-            <a:endParaRPr lang="it-IT" sz="4800" b="1" dirty="0" smtClean="0">
-              <a:latin typeface="+mj-lt"/>
-            </a:endParaRPr>
-          </a:p>
-          <a:p>
-            <a:pPr algn="ctr"/>
-            <a:r>
-              <a:rPr lang="it-IT" sz="2800" b="1" dirty="0" smtClean="0">
-                <a:latin typeface="+mj-lt"/>
-              </a:rPr>
-              <a:t>Prima versione </a:t>
-            </a:r>
-            <a:r>
-              <a:rPr lang="it-IT" sz="2800" b="1" dirty="0" err="1" smtClean="0">
-                <a:latin typeface="+mj-lt"/>
-              </a:rPr>
-              <a:t>GestioneDatiPersonali</a:t>
-            </a:r>
-            <a:r>
-              <a:rPr lang="it-IT" sz="2800" b="1" dirty="0" smtClean="0">
-                <a:latin typeface="+mj-lt"/>
-              </a:rPr>
-              <a:t> </a:t>
-            </a:r>
-            <a:endParaRPr lang="it-IT" sz="2800" b="1" dirty="0" smtClean="0">
-              <a:latin typeface="+mj-lt"/>
-            </a:endParaRPr>
-          </a:p>
-          <a:p>
-            <a:pPr algn="ctr"/>
-            <a:endParaRPr lang="it-IT" dirty="0">
-              <a:latin typeface="+mj-lt"/>
-            </a:endParaRPr>
-          </a:p>
-        </p:txBody>
-      </p:sp>
+      </p:pic>
     </p:spTree>
   </p:cSld>
   <p:clrMapOvr>
@@ -7395,9 +7365,86 @@
           <a:chExt cx="0" cy="0"/>
         </a:xfrm>
       </p:grpSpPr>
+      <p:sp>
+        <p:nvSpPr>
+          <p:cNvPr id="3" name="CasellaDiTesto 2"/>
+          <p:cNvSpPr txBox="1"/>
+          <p:nvPr/>
+        </p:nvSpPr>
+        <p:spPr>
+          <a:xfrm>
+            <a:off x="971600" y="0"/>
+            <a:ext cx="6912768" cy="1538883"/>
+          </a:xfrm>
+          <a:prstGeom prst="rect">
+            <a:avLst/>
+          </a:prstGeom>
+          <a:noFill/>
+        </p:spPr>
+        <p:txBody>
+          <a:bodyPr wrap="square" rtlCol="0">
+            <a:spAutoFit/>
+          </a:bodyPr>
+          <a:lstStyle/>
+          <a:p>
+            <a:pPr algn="ctr"/>
+            <a:r>
+              <a:rPr lang="it-IT" sz="4800" b="1" dirty="0" err="1" smtClean="0">
+                <a:latin typeface="+mj-lt"/>
+              </a:rPr>
+              <a:t>Use</a:t>
+            </a:r>
+            <a:r>
+              <a:rPr lang="it-IT" sz="4800" b="1" dirty="0" smtClean="0">
+                <a:latin typeface="+mj-lt"/>
+              </a:rPr>
+              <a:t> case </a:t>
+            </a:r>
+            <a:r>
+              <a:rPr lang="it-IT" sz="4800" b="1" dirty="0" err="1" smtClean="0">
+                <a:latin typeface="+mj-lt"/>
+              </a:rPr>
+              <a:t>Diagram</a:t>
+            </a:r>
+            <a:r>
+              <a:rPr lang="it-IT" sz="4800" b="1" dirty="0" smtClean="0">
+                <a:latin typeface="+mj-lt"/>
+              </a:rPr>
+              <a:t> </a:t>
+            </a:r>
+          </a:p>
+          <a:p>
+            <a:pPr algn="ctr"/>
+            <a:r>
+              <a:rPr lang="it-IT" sz="2800" b="1" dirty="0" smtClean="0">
+                <a:latin typeface="+mj-lt"/>
+              </a:rPr>
+              <a:t>Ultima versione </a:t>
+            </a:r>
+            <a:r>
+              <a:rPr lang="it-IT" sz="2800" b="1" dirty="0" err="1" smtClean="0">
+                <a:latin typeface="+mj-lt"/>
+              </a:rPr>
+              <a:t>GestioneDati</a:t>
+            </a:r>
+            <a:r>
+              <a:rPr lang="it-IT" sz="2800" b="1" dirty="0" smtClean="0">
+                <a:latin typeface="+mj-lt"/>
+              </a:rPr>
+              <a:t> personali</a:t>
+            </a:r>
+          </a:p>
+          <a:p>
+            <a:pPr algn="ctr"/>
+            <a:endParaRPr lang="it-IT" dirty="0">
+              <a:latin typeface="+mj-lt"/>
+            </a:endParaRPr>
+          </a:p>
+        </p:txBody>
+      </p:sp>
       <p:pic>
         <p:nvPicPr>
-          <p:cNvPr id="3074" name="Picture 2"/>
+          <p:cNvPr id="1026" name="Picture 2" descr="C:\Users\Ferdinando\Documents\Università\IS\RAD\Casi d'uso\Atsilo1\Gestione Dati personali\UCD_A_3 GestioneDatiPersonaliCompleto.png"/>
           <p:cNvPicPr>
             <a:picLocks noChangeAspect="1" noChangeArrowheads="1"/>
           </p:cNvPicPr>
@@ -7412,104 +7459,15 @@
         </p:blipFill>
         <p:spPr bwMode="auto">
           <a:xfrm>
-            <a:off x="0" y="1268760"/>
-            <a:ext cx="9144000" cy="5589240"/>
-          </a:xfrm>
-          <a:prstGeom prst="rect">
-            <a:avLst/>
-          </a:prstGeom>
-          <a:noFill/>
-          <a:ln w="9525">
-            <a:noFill/>
-            <a:miter lim="800000"/>
-            <a:headEnd/>
-            <a:tailEnd/>
-          </a:ln>
-        </p:spPr>
-      </p:pic>
-      <p:sp>
-        <p:nvSpPr>
-          <p:cNvPr id="3" name="CasellaDiTesto 2"/>
-          <p:cNvSpPr txBox="1"/>
-          <p:nvPr/>
-        </p:nvSpPr>
-        <p:spPr>
-          <a:xfrm>
-            <a:off x="971600" y="0"/>
-            <a:ext cx="6912768" cy="1538883"/>
+            <a:off x="0" y="1196752"/>
+            <a:ext cx="9144000" cy="5661248"/>
           </a:xfrm>
           <a:prstGeom prst="rect">
             <a:avLst/>
           </a:prstGeom>
           <a:noFill/>
         </p:spPr>
-        <p:txBody>
-          <a:bodyPr wrap="square" rtlCol="0">
-            <a:spAutoFit/>
-          </a:bodyPr>
-          <a:lstStyle/>
-          <a:p>
-            <a:pPr algn="ctr"/>
-            <a:r>
-              <a:rPr lang="it-IT" sz="4800" b="1" dirty="0" err="1" smtClean="0">
-                <a:latin typeface="+mj-lt"/>
-              </a:rPr>
-              <a:t>Use</a:t>
-            </a:r>
-            <a:r>
-              <a:rPr lang="it-IT" sz="4800" b="1" dirty="0" smtClean="0">
-                <a:latin typeface="+mj-lt"/>
-              </a:rPr>
-              <a:t> case </a:t>
-            </a:r>
-            <a:r>
-              <a:rPr lang="it-IT" sz="4800" b="1" dirty="0" err="1" smtClean="0">
-                <a:latin typeface="+mj-lt"/>
-              </a:rPr>
-              <a:t>Diagram</a:t>
-            </a:r>
-            <a:r>
-              <a:rPr lang="it-IT" sz="4800" b="1" dirty="0" smtClean="0">
-                <a:latin typeface="+mj-lt"/>
-              </a:rPr>
-              <a:t> </a:t>
-            </a:r>
-            <a:endParaRPr lang="it-IT" sz="4800" b="1" dirty="0" smtClean="0">
-              <a:latin typeface="+mj-lt"/>
-            </a:endParaRPr>
-          </a:p>
-          <a:p>
-            <a:pPr algn="ctr"/>
-            <a:r>
-              <a:rPr lang="it-IT" sz="2800" b="1" dirty="0" smtClean="0">
-                <a:latin typeface="+mj-lt"/>
-              </a:rPr>
-              <a:t>Ultima versione </a:t>
-            </a:r>
-            <a:r>
-              <a:rPr lang="it-IT" sz="2800" b="1" dirty="0" err="1" smtClean="0">
-                <a:latin typeface="+mj-lt"/>
-              </a:rPr>
-              <a:t>GestioneDati</a:t>
-            </a:r>
-            <a:r>
-              <a:rPr lang="it-IT" sz="2800" b="1" dirty="0" smtClean="0">
-                <a:latin typeface="+mj-lt"/>
-              </a:rPr>
-              <a:t> personali</a:t>
-            </a:r>
-            <a:endParaRPr lang="it-IT" sz="2800" b="1" dirty="0" smtClean="0">
-              <a:latin typeface="+mj-lt"/>
-            </a:endParaRPr>
-          </a:p>
-          <a:p>
-            <a:pPr algn="ctr"/>
-            <a:endParaRPr lang="it-IT" dirty="0">
-              <a:latin typeface="+mj-lt"/>
-            </a:endParaRPr>
-          </a:p>
-        </p:txBody>
-      </p:sp>
+      </p:pic>
     </p:spTree>
   </p:cSld>
   <p:clrMapOvr>
@@ -7543,8 +7501,8 @@
         </p:nvSpPr>
         <p:spPr>
           <a:xfrm>
-            <a:off x="1128139" y="476672"/>
-            <a:ext cx="7202677" cy="1538883"/>
+            <a:off x="1917872" y="476672"/>
+            <a:ext cx="5623207" cy="1538883"/>
           </a:xfrm>
           <a:prstGeom prst="rect">
             <a:avLst/>
@@ -7562,8 +7520,23 @@
               <a:rPr lang="it-IT" sz="4800" b="1" dirty="0" smtClean="0">
                 <a:latin typeface="+mj-lt"/>
               </a:rPr>
-              <a:t>Sottosistema Management </a:t>
-            </a:r>
+              <a:t>Sottosistema </a:t>
+            </a:r>
+            <a:r>
+              <a:rPr lang="it-IT" sz="4800" b="1" dirty="0" smtClean="0">
+                <a:latin typeface="+mj-lt"/>
+              </a:rPr>
+              <a:t>Accessi</a:t>
+            </a:r>
+            <a:r>
+              <a:rPr lang="it-IT" sz="4800" b="1" dirty="0" smtClean="0">
+                <a:latin typeface="+mj-lt"/>
+              </a:rPr>
+              <a:t> </a:t>
+            </a:r>
+            <a:endParaRPr lang="it-IT" sz="4800" b="1" dirty="0" smtClean="0">
+              <a:latin typeface="+mj-lt"/>
+            </a:endParaRPr>
           </a:p>
           <a:p>
             <a:pPr algn="ctr"/>
@@ -8018,7 +7991,7 @@
     </p:spTree>
     <p:extLst>
       <p:ext uri="{BB962C8B-B14F-4D97-AF65-F5344CB8AC3E}">
-        <p14:creationId xmlns:p14="http://schemas.microsoft.com/office/powerpoint/2010/main" xmlns="" val="155874689"/>
+        <p14:creationId xmlns="" xmlns:p14="http://schemas.microsoft.com/office/powerpoint/2010/main" val="155874689"/>
       </p:ext>
     </p:extLst>
   </p:cSld>
@@ -8026,7 +7999,7 @@
     <a:masterClrMapping/>
   </p:clrMapOvr>
   <mc:AlternateContent xmlns:mc="http://schemas.openxmlformats.org/markup-compatibility/2006">
-    <mc:Choice xmlns:p14="http://schemas.microsoft.com/office/powerpoint/2010/main" xmlns="" Requires="p14">
+    <mc:Choice xmlns="" xmlns:p14="http://schemas.microsoft.com/office/powerpoint/2010/main" Requires="p14">
       <p:transition spd="slow" p14:dur="2000"/>
     </mc:Choice>
     <mc:Fallback>
@@ -8068,8 +8041,8 @@
         </p:nvSpPr>
         <p:spPr>
           <a:xfrm>
-            <a:off x="1128139" y="476672"/>
-            <a:ext cx="7202677" cy="1538883"/>
+            <a:off x="1917872" y="476672"/>
+            <a:ext cx="5623207" cy="1538883"/>
           </a:xfrm>
           <a:prstGeom prst="rect">
             <a:avLst/>
@@ -8087,7 +8060,13 @@
               <a:rPr lang="it-IT" sz="4800" b="1" dirty="0" smtClean="0">
                 <a:latin typeface="+mj-lt"/>
               </a:rPr>
-              <a:t>Sottosistema Management </a:t>
+              <a:t>Sottosistema Accessi</a:t>
+            </a:r>
+            <a:r>
+              <a:rPr lang="it-IT" sz="4800" b="1" dirty="0" smtClean="0">
+                <a:latin typeface="+mj-lt"/>
+              </a:rPr>
+              <a:t> </a:t>
             </a:r>
           </a:p>
           <a:p>
@@ -8373,7 +8352,7 @@
     </p:spTree>
     <p:extLst>
       <p:ext uri="{BB962C8B-B14F-4D97-AF65-F5344CB8AC3E}">
-        <p14:creationId xmlns:p14="http://schemas.microsoft.com/office/powerpoint/2010/main" xmlns="" val="155874689"/>
+        <p14:creationId xmlns="" xmlns:p14="http://schemas.microsoft.com/office/powerpoint/2010/main" val="155874689"/>
       </p:ext>
     </p:extLst>
   </p:cSld>
@@ -8381,7 +8360,7 @@
     <a:masterClrMapping/>
   </p:clrMapOvr>
   <mc:AlternateContent xmlns:mc="http://schemas.openxmlformats.org/markup-compatibility/2006">
-    <mc:Choice xmlns:p14="http://schemas.microsoft.com/office/powerpoint/2010/main" xmlns="" Requires="p14">
+    <mc:Choice xmlns="" xmlns:p14="http://schemas.microsoft.com/office/powerpoint/2010/main" Requires="p14">
       <p:transition spd="slow" p14:dur="2000"/>
     </mc:Choice>
     <mc:Fallback>
@@ -8423,8 +8402,8 @@
         </p:nvSpPr>
         <p:spPr>
           <a:xfrm>
-            <a:off x="1128139" y="476672"/>
-            <a:ext cx="7202677" cy="1538883"/>
+            <a:off x="1917872" y="476672"/>
+            <a:ext cx="5623207" cy="1538883"/>
           </a:xfrm>
           <a:prstGeom prst="rect">
             <a:avLst/>
@@ -8442,8 +8421,17 @@
               <a:rPr lang="it-IT" sz="4800" b="1" dirty="0" smtClean="0">
                 <a:latin typeface="+mj-lt"/>
               </a:rPr>
-              <a:t>Sottosistema Management </a:t>
-            </a:r>
+              <a:t>Sottosistema </a:t>
+            </a:r>
+            <a:r>
+              <a:rPr lang="it-IT" sz="4800" b="1" dirty="0" smtClean="0">
+                <a:latin typeface="+mj-lt"/>
+              </a:rPr>
+              <a:t>Accessi </a:t>
+            </a:r>
+            <a:endParaRPr lang="it-IT" sz="4800" b="1" dirty="0" smtClean="0">
+              <a:latin typeface="+mj-lt"/>
+            </a:endParaRPr>
           </a:p>
           <a:p>
             <a:pPr algn="ctr"/>
@@ -8732,7 +8720,7 @@
     </p:spTree>
     <p:extLst>
       <p:ext uri="{BB962C8B-B14F-4D97-AF65-F5344CB8AC3E}">
-        <p14:creationId xmlns:p14="http://schemas.microsoft.com/office/powerpoint/2010/main" xmlns="" val="155874689"/>
+        <p14:creationId xmlns="" xmlns:p14="http://schemas.microsoft.com/office/powerpoint/2010/main" val="155874689"/>
       </p:ext>
     </p:extLst>
   </p:cSld>
@@ -8740,7 +8728,7 @@
     <a:masterClrMapping/>
   </p:clrMapOvr>
   <mc:AlternateContent xmlns:mc="http://schemas.openxmlformats.org/markup-compatibility/2006">
-    <mc:Choice xmlns:p14="http://schemas.microsoft.com/office/powerpoint/2010/main" xmlns="" Requires="p14">
+    <mc:Choice xmlns="" xmlns:p14="http://schemas.microsoft.com/office/powerpoint/2010/main" Requires="p14">
       <p:transition spd="slow" p14:dur="2000"/>
     </mc:Choice>
     <mc:Fallback>
@@ -8782,8 +8770,8 @@
         </p:nvSpPr>
         <p:spPr>
           <a:xfrm>
-            <a:off x="1128139" y="476672"/>
-            <a:ext cx="7202677" cy="1538883"/>
+            <a:off x="1917872" y="476672"/>
+            <a:ext cx="5623207" cy="1538883"/>
           </a:xfrm>
           <a:prstGeom prst="rect">
             <a:avLst/>
@@ -8801,8 +8789,23 @@
               <a:rPr lang="it-IT" sz="4800" b="1" dirty="0" smtClean="0">
                 <a:latin typeface="+mj-lt"/>
               </a:rPr>
-              <a:t>Sottosistema Management </a:t>
-            </a:r>
+              <a:t>Sottosistema </a:t>
+            </a:r>
+            <a:r>
+              <a:rPr lang="it-IT" sz="4800" b="1" dirty="0" smtClean="0">
+                <a:latin typeface="+mj-lt"/>
+              </a:rPr>
+              <a:t>Accessi</a:t>
+            </a:r>
+            <a:r>
+              <a:rPr lang="it-IT" sz="4800" b="1" dirty="0" smtClean="0">
+                <a:latin typeface="+mj-lt"/>
+              </a:rPr>
+              <a:t> </a:t>
+            </a:r>
+            <a:endParaRPr lang="it-IT" sz="4800" b="1" dirty="0" smtClean="0">
+              <a:latin typeface="+mj-lt"/>
+            </a:endParaRPr>
           </a:p>
           <a:p>
             <a:pPr algn="ctr"/>
@@ -9092,7 +9095,7 @@
     </p:spTree>
     <p:extLst>
       <p:ext uri="{BB962C8B-B14F-4D97-AF65-F5344CB8AC3E}">
-        <p14:creationId xmlns:p14="http://schemas.microsoft.com/office/powerpoint/2010/main" xmlns="" val="155874689"/>
+        <p14:creationId xmlns="" xmlns:p14="http://schemas.microsoft.com/office/powerpoint/2010/main" val="155874689"/>
       </p:ext>
     </p:extLst>
   </p:cSld>
@@ -9100,7 +9103,7 @@
     <a:masterClrMapping/>
   </p:clrMapOvr>
   <mc:AlternateContent xmlns:mc="http://schemas.openxmlformats.org/markup-compatibility/2006">
-    <mc:Choice xmlns:p14="http://schemas.microsoft.com/office/powerpoint/2010/main" xmlns="" Requires="p14">
+    <mc:Choice xmlns="" xmlns:p14="http://schemas.microsoft.com/office/powerpoint/2010/main" Requires="p14">
       <p:transition spd="slow" p14:dur="2000"/>
     </mc:Choice>
     <mc:Fallback>
@@ -9142,8 +9145,8 @@
         </p:nvSpPr>
         <p:spPr>
           <a:xfrm>
-            <a:off x="1128139" y="476672"/>
-            <a:ext cx="7202677" cy="1538883"/>
+            <a:off x="1917872" y="476672"/>
+            <a:ext cx="5623207" cy="1538883"/>
           </a:xfrm>
           <a:prstGeom prst="rect">
             <a:avLst/>
@@ -9161,8 +9164,23 @@
               <a:rPr lang="it-IT" sz="4800" b="1" dirty="0" smtClean="0">
                 <a:latin typeface="+mj-lt"/>
               </a:rPr>
-              <a:t>Sottosistema Management </a:t>
-            </a:r>
+              <a:t>Sottosistema </a:t>
+            </a:r>
+            <a:r>
+              <a:rPr lang="it-IT" sz="4800" b="1" dirty="0" smtClean="0">
+                <a:latin typeface="+mj-lt"/>
+              </a:rPr>
+              <a:t>Accessi</a:t>
+            </a:r>
+            <a:r>
+              <a:rPr lang="it-IT" sz="4800" b="1" dirty="0" smtClean="0">
+                <a:latin typeface="+mj-lt"/>
+              </a:rPr>
+              <a:t> </a:t>
+            </a:r>
+            <a:endParaRPr lang="it-IT" sz="4800" b="1" dirty="0" smtClean="0">
+              <a:latin typeface="+mj-lt"/>
+            </a:endParaRPr>
           </a:p>
           <a:p>
             <a:pPr algn="ctr"/>
@@ -9451,7 +9469,7 @@
     </p:spTree>
     <p:extLst>
       <p:ext uri="{BB962C8B-B14F-4D97-AF65-F5344CB8AC3E}">
-        <p14:creationId xmlns:p14="http://schemas.microsoft.com/office/powerpoint/2010/main" xmlns="" val="155874689"/>
+        <p14:creationId xmlns="" xmlns:p14="http://schemas.microsoft.com/office/powerpoint/2010/main" val="155874689"/>
       </p:ext>
     </p:extLst>
   </p:cSld>
@@ -9459,7 +9477,7 @@
     <a:masterClrMapping/>
   </p:clrMapOvr>
   <mc:AlternateContent xmlns:mc="http://schemas.openxmlformats.org/markup-compatibility/2006">
-    <mc:Choice xmlns:p14="http://schemas.microsoft.com/office/powerpoint/2010/main" xmlns="" Requires="p14">
+    <mc:Choice xmlns="" xmlns:p14="http://schemas.microsoft.com/office/powerpoint/2010/main" Requires="p14">
       <p:transition spd="slow" p14:dur="2000"/>
     </mc:Choice>
     <mc:Fallback>
@@ -9501,8 +9519,8 @@
         </p:nvSpPr>
         <p:spPr>
           <a:xfrm>
-            <a:off x="1128139" y="476672"/>
-            <a:ext cx="7202677" cy="1538883"/>
+            <a:off x="1917872" y="476672"/>
+            <a:ext cx="5623207" cy="1538883"/>
           </a:xfrm>
           <a:prstGeom prst="rect">
             <a:avLst/>
@@ -9520,8 +9538,23 @@
               <a:rPr lang="it-IT" sz="4800" b="1" dirty="0" smtClean="0">
                 <a:latin typeface="+mj-lt"/>
               </a:rPr>
-              <a:t>Sottosistema Management </a:t>
-            </a:r>
+              <a:t>Sottosistema </a:t>
+            </a:r>
+            <a:r>
+              <a:rPr lang="it-IT" sz="4800" b="1" dirty="0" smtClean="0">
+                <a:latin typeface="+mj-lt"/>
+              </a:rPr>
+              <a:t>Accessi</a:t>
+            </a:r>
+            <a:r>
+              <a:rPr lang="it-IT" sz="4800" b="1" dirty="0" smtClean="0">
+                <a:latin typeface="+mj-lt"/>
+              </a:rPr>
+              <a:t> </a:t>
+            </a:r>
+            <a:endParaRPr lang="it-IT" sz="4800" b="1" dirty="0" smtClean="0">
+              <a:latin typeface="+mj-lt"/>
+            </a:endParaRPr>
           </a:p>
           <a:p>
             <a:pPr algn="ctr"/>
@@ -9820,7 +9853,7 @@
     </p:spTree>
     <p:extLst>
       <p:ext uri="{BB962C8B-B14F-4D97-AF65-F5344CB8AC3E}">
-        <p14:creationId xmlns:p14="http://schemas.microsoft.com/office/powerpoint/2010/main" xmlns="" val="155874689"/>
+        <p14:creationId xmlns="" xmlns:p14="http://schemas.microsoft.com/office/powerpoint/2010/main" val="155874689"/>
       </p:ext>
     </p:extLst>
   </p:cSld>
@@ -9828,7 +9861,7 @@
     <a:masterClrMapping/>
   </p:clrMapOvr>
   <mc:AlternateContent xmlns:mc="http://schemas.openxmlformats.org/markup-compatibility/2006">
-    <mc:Choice xmlns:p14="http://schemas.microsoft.com/office/powerpoint/2010/main" xmlns="" Requires="p14">
+    <mc:Choice xmlns="" xmlns:p14="http://schemas.microsoft.com/office/powerpoint/2010/main" Requires="p14">
       <p:transition spd="slow" p14:dur="2000"/>
     </mc:Choice>
     <mc:Fallback>
@@ -9870,8 +9903,8 @@
         </p:nvSpPr>
         <p:spPr>
           <a:xfrm>
-            <a:off x="1128139" y="476672"/>
-            <a:ext cx="7202677" cy="1538883"/>
+            <a:off x="1917872" y="476672"/>
+            <a:ext cx="5623207" cy="1538883"/>
           </a:xfrm>
           <a:prstGeom prst="rect">
             <a:avLst/>
@@ -9889,8 +9922,23 @@
               <a:rPr lang="it-IT" sz="4800" b="1" dirty="0" smtClean="0">
                 <a:latin typeface="+mj-lt"/>
               </a:rPr>
-              <a:t>Sottosistema Management </a:t>
-            </a:r>
+              <a:t>Sottosistema </a:t>
+            </a:r>
+            <a:r>
+              <a:rPr lang="it-IT" sz="4800" b="1" dirty="0" smtClean="0">
+                <a:latin typeface="+mj-lt"/>
+              </a:rPr>
+              <a:t>Accessi</a:t>
+            </a:r>
+            <a:r>
+              <a:rPr lang="it-IT" sz="4800" b="1" dirty="0" smtClean="0">
+                <a:latin typeface="+mj-lt"/>
+              </a:rPr>
+              <a:t> </a:t>
+            </a:r>
+            <a:endParaRPr lang="it-IT" sz="4800" b="1" dirty="0" smtClean="0">
+              <a:latin typeface="+mj-lt"/>
+            </a:endParaRPr>
           </a:p>
           <a:p>
             <a:pPr algn="ctr"/>
@@ -10183,7 +10231,7 @@
     </p:spTree>
     <p:extLst>
       <p:ext uri="{BB962C8B-B14F-4D97-AF65-F5344CB8AC3E}">
-        <p14:creationId xmlns:p14="http://schemas.microsoft.com/office/powerpoint/2010/main" xmlns="" val="155874689"/>
+        <p14:creationId xmlns="" xmlns:p14="http://schemas.microsoft.com/office/powerpoint/2010/main" val="155874689"/>
       </p:ext>
     </p:extLst>
   </p:cSld>
@@ -10191,7 +10239,7 @@
     <a:masterClrMapping/>
   </p:clrMapOvr>
   <mc:AlternateContent xmlns:mc="http://schemas.openxmlformats.org/markup-compatibility/2006">
-    <mc:Choice xmlns:p14="http://schemas.microsoft.com/office/powerpoint/2010/main" xmlns="" Requires="p14">
+    <mc:Choice xmlns="" xmlns:p14="http://schemas.microsoft.com/office/powerpoint/2010/main" Requires="p14">
       <p:transition spd="slow" p14:dur="2000"/>
     </mc:Choice>
     <mc:Fallback>
@@ -10233,8 +10281,8 @@
         </p:nvSpPr>
         <p:spPr>
           <a:xfrm>
-            <a:off x="1128139" y="476672"/>
-            <a:ext cx="7202677" cy="1538883"/>
+            <a:off x="1917872" y="476672"/>
+            <a:ext cx="5623207" cy="1538883"/>
           </a:xfrm>
           <a:prstGeom prst="rect">
             <a:avLst/>
@@ -10252,8 +10300,23 @@
               <a:rPr lang="it-IT" sz="4800" b="1" dirty="0" smtClean="0">
                 <a:latin typeface="+mj-lt"/>
               </a:rPr>
-              <a:t>Sottosistema Management </a:t>
-            </a:r>
+              <a:t>Sottosistema </a:t>
+            </a:r>
+            <a:r>
+              <a:rPr lang="it-IT" sz="4800" b="1" dirty="0" smtClean="0">
+                <a:latin typeface="+mj-lt"/>
+              </a:rPr>
+              <a:t>Accessi</a:t>
+            </a:r>
+            <a:r>
+              <a:rPr lang="it-IT" sz="4800" b="1" dirty="0" smtClean="0">
+                <a:latin typeface="+mj-lt"/>
+              </a:rPr>
+              <a:t> </a:t>
+            </a:r>
+            <a:endParaRPr lang="it-IT" sz="4800" b="1" dirty="0" smtClean="0">
+              <a:latin typeface="+mj-lt"/>
+            </a:endParaRPr>
           </a:p>
           <a:p>
             <a:pPr algn="ctr"/>
@@ -10497,7 +10560,7 @@
     </p:spTree>
     <p:extLst>
       <p:ext uri="{BB962C8B-B14F-4D97-AF65-F5344CB8AC3E}">
-        <p14:creationId xmlns:p14="http://schemas.microsoft.com/office/powerpoint/2010/main" xmlns="" val="155874689"/>
+        <p14:creationId xmlns="" xmlns:p14="http://schemas.microsoft.com/office/powerpoint/2010/main" val="155874689"/>
       </p:ext>
     </p:extLst>
   </p:cSld>
@@ -10505,7 +10568,7 @@
     <a:masterClrMapping/>
   </p:clrMapOvr>
   <mc:AlternateContent xmlns:mc="http://schemas.openxmlformats.org/markup-compatibility/2006">
-    <mc:Choice xmlns:p14="http://schemas.microsoft.com/office/powerpoint/2010/main" xmlns="" Requires="p14">
+    <mc:Choice xmlns="" xmlns:p14="http://schemas.microsoft.com/office/powerpoint/2010/main" Requires="p14">
       <p:transition spd="slow" p14:dur="2000"/>
     </mc:Choice>
     <mc:Fallback>

</xml_diff>

<commit_message>
[WR_A] Revisione presentazione accorgimenti e aggiunte
</commit_message>
<xml_diff>
--- a/Presentazione/Atsilo1/Di Palma/[Bozza]Introduzione.pptx
+++ b/Presentazione/Atsilo1/Di Palma/[Bozza]Introduzione.pptx
@@ -5,7 +5,7 @@
     <p:sldMasterId id="2147483684" r:id="rId1"/>
   </p:sldMasterIdLst>
   <p:notesMasterIdLst>
-    <p:notesMasterId r:id="rId18"/>
+    <p:notesMasterId r:id="rId20"/>
   </p:notesMasterIdLst>
   <p:sldIdLst>
     <p:sldId id="259" r:id="rId2"/>
@@ -19,11 +19,13 @@
     <p:sldId id="263" r:id="rId10"/>
     <p:sldId id="268" r:id="rId11"/>
     <p:sldId id="272" r:id="rId12"/>
-    <p:sldId id="271" r:id="rId13"/>
-    <p:sldId id="273" r:id="rId14"/>
-    <p:sldId id="274" r:id="rId15"/>
-    <p:sldId id="269" r:id="rId16"/>
-    <p:sldId id="270" r:id="rId17"/>
+    <p:sldId id="275" r:id="rId13"/>
+    <p:sldId id="271" r:id="rId14"/>
+    <p:sldId id="273" r:id="rId15"/>
+    <p:sldId id="274" r:id="rId16"/>
+    <p:sldId id="269" r:id="rId17"/>
+    <p:sldId id="270" r:id="rId18"/>
+    <p:sldId id="276" r:id="rId19"/>
   </p:sldIdLst>
   <p:sldSz cx="9144000" cy="6858000" type="screen4x3"/>
   <p:notesSz cx="6858000" cy="9144000"/>
@@ -208,7 +210,7 @@
             <a:fld id="{38D78F4D-402C-46E0-A4BB-DF91EA86B14C}" type="datetimeFigureOut">
               <a:rPr lang="it-IT" smtClean="0"/>
               <a:pPr/>
-              <a:t>29/12/2012</a:t>
+              <a:t>30/12/2012</a:t>
             </a:fld>
             <a:endParaRPr lang="it-IT"/>
           </a:p>
@@ -377,7 +379,7 @@
     </p:spTree>
     <p:extLst>
       <p:ext uri="{BB962C8B-B14F-4D97-AF65-F5344CB8AC3E}">
-        <p14:creationId xmlns="" xmlns:p14="http://schemas.microsoft.com/office/powerpoint/2010/main" val="2126419590"/>
+        <p14:creationId xmlns:p14="http://schemas.microsoft.com/office/powerpoint/2010/main" xmlns="" val="2126419590"/>
       </p:ext>
     </p:extLst>
   </p:cSld>
@@ -870,15 +872,19 @@
           <a:p>
             <a:r>
               <a:rPr lang="it-IT" dirty="0" smtClean="0"/>
-              <a:t>Direttore dal </a:t>
+              <a:t>Possibilità di </a:t>
             </a:r>
             <a:r>
               <a:rPr lang="it-IT" dirty="0" err="1" smtClean="0"/>
-              <a:t>rad</a:t>
+              <a:t>evidenzionare</a:t>
             </a:r>
             <a:r>
               <a:rPr lang="it-IT" dirty="0" smtClean="0"/>
-              <a:t> 2.0</a:t>
+              <a:t> generalizzazioni</a:t>
+            </a:r>
+            <a:r>
+              <a:rPr lang="it-IT" baseline="0" dirty="0" smtClean="0"/>
+              <a:t> future</a:t>
             </a:r>
             <a:endParaRPr lang="it-IT" dirty="0" smtClean="0"/>
           </a:p>
@@ -962,7 +968,18 @@
           </a:bodyPr>
           <a:lstStyle/>
           <a:p>
-            <a:endParaRPr lang="it-IT" dirty="0" smtClean="0"/>
+            <a:r>
+              <a:rPr lang="it-IT" dirty="0" smtClean="0"/>
+              <a:t>Direttore dal </a:t>
+            </a:r>
+            <a:r>
+              <a:rPr lang="it-IT" dirty="0" err="1" smtClean="0"/>
+              <a:t>rad</a:t>
+            </a:r>
+            <a:r>
+              <a:rPr lang="it-IT" dirty="0" smtClean="0"/>
+              <a:t> 2.0</a:t>
+            </a:r>
           </a:p>
         </p:txBody>
       </p:sp>
@@ -1044,7 +1061,27 @@
           </a:bodyPr>
           <a:lstStyle/>
           <a:p>
-            <a:endParaRPr lang="it-IT" dirty="0"/>
+            <a:r>
+              <a:rPr lang="it-IT" dirty="0" smtClean="0"/>
+              <a:t>Dal </a:t>
+            </a:r>
+            <a:r>
+              <a:rPr lang="it-IT" dirty="0" err="1" smtClean="0"/>
+              <a:t>rad</a:t>
+            </a:r>
+            <a:r>
+              <a:rPr lang="it-IT" dirty="0" smtClean="0"/>
+              <a:t> 3.2 in </a:t>
+            </a:r>
+            <a:r>
+              <a:rPr lang="it-IT" dirty="0" err="1" smtClean="0"/>
+              <a:t>poi…</a:t>
+            </a:r>
+            <a:r>
+              <a:rPr lang="it-IT" dirty="0" smtClean="0"/>
+              <a:t>..</a:t>
+            </a:r>
+            <a:endParaRPr lang="it-IT" dirty="0" smtClean="0"/>
           </a:p>
         </p:txBody>
       </p:sp>
@@ -1126,20 +1163,6 @@
           </a:bodyPr>
           <a:lstStyle/>
           <a:p>
-            <a:r>
-              <a:rPr lang="it-IT" dirty="0" smtClean="0"/>
-              <a:t>Nuovo dal </a:t>
-            </a:r>
-            <a:r>
-              <a:rPr lang="it-IT" dirty="0" err="1" smtClean="0"/>
-              <a:t>rad</a:t>
-            </a:r>
-            <a:r>
-              <a:rPr lang="it-IT" dirty="0" smtClean="0"/>
-              <a:t> 3.2: </a:t>
-            </a:r>
-          </a:p>
-          <a:p>
             <a:endParaRPr lang="it-IT" dirty="0"/>
           </a:p>
         </p:txBody>
@@ -1163,6 +1186,188 @@
               <a:rPr lang="it-IT" smtClean="0"/>
               <a:pPr/>
               <a:t>16</a:t>
+            </a:fld>
+            <a:endParaRPr lang="it-IT"/>
+          </a:p>
+        </p:txBody>
+      </p:sp>
+    </p:spTree>
+  </p:cSld>
+  <p:clrMapOvr>
+    <a:masterClrMapping/>
+  </p:clrMapOvr>
+</p:notes>
+</file>
+
+<file path=ppt/notesSlides/notesSlide17.xml><?xml version="1.0" encoding="utf-8"?>
+<p:notes xmlns:a="http://schemas.openxmlformats.org/drawingml/2006/main" xmlns:r="http://schemas.openxmlformats.org/officeDocument/2006/relationships" xmlns:p="http://schemas.openxmlformats.org/presentationml/2006/main">
+  <p:cSld>
+    <p:spTree>
+      <p:nvGrpSpPr>
+        <p:cNvPr id="1" name=""/>
+        <p:cNvGrpSpPr/>
+        <p:nvPr/>
+      </p:nvGrpSpPr>
+      <p:grpSpPr>
+        <a:xfrm>
+          <a:off x="0" y="0"/>
+          <a:ext cx="0" cy="0"/>
+          <a:chOff x="0" y="0"/>
+          <a:chExt cx="0" cy="0"/>
+        </a:xfrm>
+      </p:grpSpPr>
+      <p:sp>
+        <p:nvSpPr>
+          <p:cNvPr id="2" name="Segnaposto immagine diapositiva 1"/>
+          <p:cNvSpPr>
+            <a:spLocks noGrp="1" noRot="1" noChangeAspect="1"/>
+          </p:cNvSpPr>
+          <p:nvPr>
+            <p:ph type="sldImg"/>
+          </p:nvPr>
+        </p:nvSpPr>
+        <p:spPr/>
+      </p:sp>
+      <p:sp>
+        <p:nvSpPr>
+          <p:cNvPr id="3" name="Segnaposto note 2"/>
+          <p:cNvSpPr>
+            <a:spLocks noGrp="1"/>
+          </p:cNvSpPr>
+          <p:nvPr>
+            <p:ph type="body" idx="1"/>
+          </p:nvPr>
+        </p:nvSpPr>
+        <p:spPr/>
+        <p:txBody>
+          <a:bodyPr>
+            <a:normAutofit/>
+          </a:bodyPr>
+          <a:lstStyle/>
+          <a:p>
+            <a:r>
+              <a:rPr lang="it-IT" dirty="0" smtClean="0"/>
+              <a:t>Nuovo dal </a:t>
+            </a:r>
+            <a:r>
+              <a:rPr lang="it-IT" dirty="0" err="1" smtClean="0"/>
+              <a:t>rad</a:t>
+            </a:r>
+            <a:r>
+              <a:rPr lang="it-IT" dirty="0" smtClean="0"/>
+              <a:t> 3.2: </a:t>
+            </a:r>
+          </a:p>
+          <a:p>
+            <a:endParaRPr lang="it-IT" dirty="0"/>
+          </a:p>
+        </p:txBody>
+      </p:sp>
+      <p:sp>
+        <p:nvSpPr>
+          <p:cNvPr id="4" name="Segnaposto numero diapositiva 3"/>
+          <p:cNvSpPr>
+            <a:spLocks noGrp="1"/>
+          </p:cNvSpPr>
+          <p:nvPr>
+            <p:ph type="sldNum" sz="quarter" idx="10"/>
+          </p:nvPr>
+        </p:nvSpPr>
+        <p:spPr/>
+        <p:txBody>
+          <a:bodyPr/>
+          <a:lstStyle/>
+          <a:p>
+            <a:fld id="{D70604CA-7593-4640-8FA1-5523937B8510}" type="slidenum">
+              <a:rPr lang="it-IT" smtClean="0"/>
+              <a:pPr/>
+              <a:t>17</a:t>
+            </a:fld>
+            <a:endParaRPr lang="it-IT"/>
+          </a:p>
+        </p:txBody>
+      </p:sp>
+    </p:spTree>
+  </p:cSld>
+  <p:clrMapOvr>
+    <a:masterClrMapping/>
+  </p:clrMapOvr>
+</p:notes>
+</file>
+
+<file path=ppt/notesSlides/notesSlide18.xml><?xml version="1.0" encoding="utf-8"?>
+<p:notes xmlns:a="http://schemas.openxmlformats.org/drawingml/2006/main" xmlns:r="http://schemas.openxmlformats.org/officeDocument/2006/relationships" xmlns:p="http://schemas.openxmlformats.org/presentationml/2006/main">
+  <p:cSld>
+    <p:spTree>
+      <p:nvGrpSpPr>
+        <p:cNvPr id="1" name=""/>
+        <p:cNvGrpSpPr/>
+        <p:nvPr/>
+      </p:nvGrpSpPr>
+      <p:grpSpPr>
+        <a:xfrm>
+          <a:off x="0" y="0"/>
+          <a:ext cx="0" cy="0"/>
+          <a:chOff x="0" y="0"/>
+          <a:chExt cx="0" cy="0"/>
+        </a:xfrm>
+      </p:grpSpPr>
+      <p:sp>
+        <p:nvSpPr>
+          <p:cNvPr id="2" name="Segnaposto immagine diapositiva 1"/>
+          <p:cNvSpPr>
+            <a:spLocks noGrp="1" noRot="1" noChangeAspect="1"/>
+          </p:cNvSpPr>
+          <p:nvPr>
+            <p:ph type="sldImg"/>
+          </p:nvPr>
+        </p:nvSpPr>
+        <p:spPr/>
+      </p:sp>
+      <p:sp>
+        <p:nvSpPr>
+          <p:cNvPr id="3" name="Segnaposto note 2"/>
+          <p:cNvSpPr>
+            <a:spLocks noGrp="1"/>
+          </p:cNvSpPr>
+          <p:nvPr>
+            <p:ph type="body" idx="1"/>
+          </p:nvPr>
+        </p:nvSpPr>
+        <p:spPr/>
+        <p:txBody>
+          <a:bodyPr>
+            <a:normAutofit/>
+          </a:bodyPr>
+          <a:lstStyle/>
+          <a:p>
+            <a:r>
+              <a:rPr lang="it-IT" dirty="0" smtClean="0"/>
+              <a:t>Familiarità: fare tutto ciò che prima era possibile, con maggior velocità ed efficienza. Un bene per tutti gli enti</a:t>
+            </a:r>
+            <a:endParaRPr lang="it-IT" dirty="0"/>
+          </a:p>
+        </p:txBody>
+      </p:sp>
+      <p:sp>
+        <p:nvSpPr>
+          <p:cNvPr id="4" name="Segnaposto numero diapositiva 3"/>
+          <p:cNvSpPr>
+            <a:spLocks noGrp="1"/>
+          </p:cNvSpPr>
+          <p:nvPr>
+            <p:ph type="sldNum" sz="quarter" idx="10"/>
+          </p:nvPr>
+        </p:nvSpPr>
+        <p:spPr/>
+        <p:txBody>
+          <a:bodyPr/>
+          <a:lstStyle/>
+          <a:p>
+            <a:fld id="{D70604CA-7593-4640-8FA1-5523937B8510}" type="slidenum">
+              <a:rPr lang="it-IT" smtClean="0"/>
+              <a:pPr/>
+              <a:t>18</a:t>
             </a:fld>
             <a:endParaRPr lang="it-IT"/>
           </a:p>
@@ -2194,7 +2399,7 @@
             <a:fld id="{63CABBC0-75E4-43BB-A6A6-84C2A96BDB82}" type="datetimeFigureOut">
               <a:rPr lang="it-IT" smtClean="0"/>
               <a:pPr/>
-              <a:t>29/12/2012</a:t>
+              <a:t>30/12/2012</a:t>
             </a:fld>
             <a:endParaRPr lang="it-IT"/>
           </a:p>
@@ -2376,7 +2581,7 @@
             <a:fld id="{63CABBC0-75E4-43BB-A6A6-84C2A96BDB82}" type="datetimeFigureOut">
               <a:rPr lang="it-IT" smtClean="0"/>
               <a:pPr/>
-              <a:t>29/12/2012</a:t>
+              <a:t>30/12/2012</a:t>
             </a:fld>
             <a:endParaRPr lang="it-IT"/>
           </a:p>
@@ -2568,7 +2773,7 @@
             <a:fld id="{63CABBC0-75E4-43BB-A6A6-84C2A96BDB82}" type="datetimeFigureOut">
               <a:rPr lang="it-IT" smtClean="0"/>
               <a:pPr/>
-              <a:t>29/12/2012</a:t>
+              <a:t>30/12/2012</a:t>
             </a:fld>
             <a:endParaRPr lang="it-IT"/>
           </a:p>
@@ -2750,7 +2955,7 @@
             <a:fld id="{63CABBC0-75E4-43BB-A6A6-84C2A96BDB82}" type="datetimeFigureOut">
               <a:rPr lang="it-IT" smtClean="0"/>
               <a:pPr/>
-              <a:t>29/12/2012</a:t>
+              <a:t>30/12/2012</a:t>
             </a:fld>
             <a:endParaRPr lang="it-IT"/>
           </a:p>
@@ -2993,7 +3198,7 @@
             <a:fld id="{63CABBC0-75E4-43BB-A6A6-84C2A96BDB82}" type="datetimeFigureOut">
               <a:rPr lang="it-IT" smtClean="0"/>
               <a:pPr/>
-              <a:t>29/12/2012</a:t>
+              <a:t>30/12/2012</a:t>
             </a:fld>
             <a:endParaRPr lang="it-IT"/>
           </a:p>
@@ -3274,7 +3479,7 @@
             <a:fld id="{63CABBC0-75E4-43BB-A6A6-84C2A96BDB82}" type="datetimeFigureOut">
               <a:rPr lang="it-IT" smtClean="0"/>
               <a:pPr/>
-              <a:t>29/12/2012</a:t>
+              <a:t>30/12/2012</a:t>
             </a:fld>
             <a:endParaRPr lang="it-IT"/>
           </a:p>
@@ -3665,7 +3870,7 @@
             <a:fld id="{63CABBC0-75E4-43BB-A6A6-84C2A96BDB82}" type="datetimeFigureOut">
               <a:rPr lang="it-IT" smtClean="0"/>
               <a:pPr/>
-              <a:t>29/12/2012</a:t>
+              <a:t>30/12/2012</a:t>
             </a:fld>
             <a:endParaRPr lang="it-IT"/>
           </a:p>
@@ -3824,7 +4029,7 @@
             <a:fld id="{63CABBC0-75E4-43BB-A6A6-84C2A96BDB82}" type="datetimeFigureOut">
               <a:rPr lang="it-IT" smtClean="0"/>
               <a:pPr/>
-              <a:t>29/12/2012</a:t>
+              <a:t>30/12/2012</a:t>
             </a:fld>
             <a:endParaRPr lang="it-IT"/>
           </a:p>
@@ -3923,7 +4128,7 @@
             <a:fld id="{63CABBC0-75E4-43BB-A6A6-84C2A96BDB82}" type="datetimeFigureOut">
               <a:rPr lang="it-IT" smtClean="0"/>
               <a:pPr/>
-              <a:t>29/12/2012</a:t>
+              <a:t>30/12/2012</a:t>
             </a:fld>
             <a:endParaRPr lang="it-IT"/>
           </a:p>
@@ -4193,7 +4398,7 @@
             <a:fld id="{63CABBC0-75E4-43BB-A6A6-84C2A96BDB82}" type="datetimeFigureOut">
               <a:rPr lang="it-IT" smtClean="0"/>
               <a:pPr/>
-              <a:t>29/12/2012</a:t>
+              <a:t>30/12/2012</a:t>
             </a:fld>
             <a:endParaRPr lang="it-IT"/>
           </a:p>
@@ -4490,7 +4695,7 @@
             <a:fld id="{63CABBC0-75E4-43BB-A6A6-84C2A96BDB82}" type="datetimeFigureOut">
               <a:rPr lang="it-IT" smtClean="0"/>
               <a:pPr/>
-              <a:t>29/12/2012</a:t>
+              <a:t>30/12/2012</a:t>
             </a:fld>
             <a:endParaRPr lang="it-IT"/>
           </a:p>
@@ -5270,7 +5475,7 @@
             <a:fld id="{63CABBC0-75E4-43BB-A6A6-84C2A96BDB82}" type="datetimeFigureOut">
               <a:rPr lang="it-IT" smtClean="0"/>
               <a:pPr/>
-              <a:t>29/12/2012</a:t>
+              <a:t>30/12/2012</a:t>
             </a:fld>
             <a:endParaRPr lang="it-IT"/>
           </a:p>
@@ -5894,7 +6099,7 @@
         </p:nvSpPr>
         <p:spPr>
           <a:xfrm>
-            <a:off x="2483768" y="188641"/>
+            <a:off x="2411760" y="2780928"/>
             <a:ext cx="4096442" cy="1538883"/>
           </a:xfrm>
           <a:prstGeom prst="rect">
@@ -5913,29 +6118,29 @@
               <a:rPr lang="it-IT" sz="4800" b="1" dirty="0" smtClean="0">
                 <a:latin typeface="+mj-lt"/>
               </a:rPr>
-              <a:t>Progetto </a:t>
-            </a:r>
-            <a:r>
-              <a:rPr lang="it-IT" sz="4800" b="1" dirty="0" err="1" smtClean="0">
+              <a:t> </a:t>
+            </a:r>
+            <a:endParaRPr lang="it-IT" sz="4800" b="1" dirty="0" smtClean="0">
+              <a:latin typeface="+mj-lt"/>
+            </a:endParaRPr>
+          </a:p>
+          <a:p>
+            <a:pPr algn="ctr"/>
+            <a:r>
+              <a:rPr lang="it-IT" sz="2800" b="1" dirty="0" err="1" smtClean="0">
                 <a:latin typeface="+mj-lt"/>
               </a:rPr>
-              <a:t>@silo</a:t>
-            </a:r>
-            <a:r>
-              <a:rPr lang="it-IT" sz="4800" b="1" dirty="0" smtClean="0">
-                <a:latin typeface="+mj-lt"/>
-              </a:rPr>
-              <a:t> </a:t>
-            </a:r>
-          </a:p>
-          <a:p>
-            <a:pPr algn="ctr"/>
+              <a:t>Teams</a:t>
+            </a:r>
             <a:r>
               <a:rPr lang="it-IT" sz="2800" b="1" dirty="0" smtClean="0">
                 <a:latin typeface="+mj-lt"/>
               </a:rPr>
-              <a:t>Finalità e obiettivo</a:t>
-            </a:r>
+              <a:t> di Sviluppo</a:t>
+            </a:r>
+            <a:endParaRPr lang="it-IT" sz="2800" b="1" dirty="0" smtClean="0">
+              <a:latin typeface="+mj-lt"/>
+            </a:endParaRPr>
           </a:p>
           <a:p>
             <a:pPr algn="ctr"/>
@@ -6246,7 +6451,7 @@
       </p:sp>
       <p:sp>
         <p:nvSpPr>
-          <p:cNvPr id="5" name="Content Placeholder 3"/>
+          <p:cNvPr id="8" name="Content Placeholder 3"/>
           <p:cNvSpPr txBox="1">
             <a:spLocks/>
           </p:cNvSpPr>
@@ -6254,8 +6459,8 @@
         </p:nvSpPr>
         <p:spPr>
           <a:xfrm>
-            <a:off x="3059832" y="2996952"/>
-            <a:ext cx="2736304" cy="625536"/>
+            <a:off x="467544" y="3789040"/>
+            <a:ext cx="5111750" cy="1921680"/>
           </a:xfrm>
           <a:prstGeom prst="rect">
             <a:avLst/>
@@ -6424,252 +6629,107 @@
             </a:lvl9pPr>
           </a:lstStyle>
           <a:p>
-            <a:pPr marL="0" indent="0">
+            <a:pPr>
               <a:buNone/>
             </a:pPr>
-            <a:r>
-              <a:rPr lang="en-US" dirty="0" smtClean="0"/>
-              <a:t>Team </a:t>
-            </a:r>
-            <a:r>
-              <a:rPr lang="en-US" dirty="0" err="1" smtClean="0"/>
-              <a:t>di</a:t>
-            </a:r>
-            <a:r>
-              <a:rPr lang="en-US" dirty="0" smtClean="0"/>
-              <a:t> </a:t>
-            </a:r>
-            <a:r>
-              <a:rPr lang="en-US" dirty="0" err="1" smtClean="0"/>
-              <a:t>Sviluppo</a:t>
-            </a:r>
-            <a:endParaRPr lang="en-US" dirty="0"/>
-          </a:p>
-        </p:txBody>
-      </p:sp>
-      <p:sp>
-        <p:nvSpPr>
-          <p:cNvPr id="8" name="Content Placeholder 3"/>
-          <p:cNvSpPr txBox="1">
-            <a:spLocks/>
-          </p:cNvSpPr>
+            <a:endParaRPr lang="it-IT" dirty="0" smtClean="0"/>
+          </a:p>
+          <a:p>
+            <a:pPr lvl="1"/>
+            <a:r>
+              <a:rPr lang="it-IT" dirty="0" smtClean="0"/>
+              <a:t>Sottosistema Accessi</a:t>
+            </a:r>
+          </a:p>
+          <a:p>
+            <a:pPr lvl="1"/>
+            <a:r>
+              <a:rPr lang="it-IT" dirty="0" smtClean="0"/>
+              <a:t>Sottosistema </a:t>
+            </a:r>
+            <a:r>
+              <a:rPr lang="it-IT" dirty="0" err="1" smtClean="0"/>
+              <a:t>……</a:t>
+            </a:r>
+            <a:endParaRPr lang="it-IT" dirty="0" smtClean="0"/>
+          </a:p>
+          <a:p>
+            <a:pPr lvl="1"/>
+            <a:r>
+              <a:rPr lang="it-IT" dirty="0" smtClean="0"/>
+              <a:t>Sottosistema </a:t>
+            </a:r>
+            <a:r>
+              <a:rPr lang="it-IT" dirty="0" err="1" smtClean="0"/>
+              <a:t>……</a:t>
+            </a:r>
+            <a:endParaRPr lang="it-IT" dirty="0" smtClean="0"/>
+          </a:p>
+        </p:txBody>
+      </p:sp>
+      <p:sp>
+        <p:nvSpPr>
+          <p:cNvPr id="6" name="CasellaDiTesto 5"/>
+          <p:cNvSpPr txBox="1"/>
           <p:nvPr/>
         </p:nvSpPr>
         <p:spPr>
           <a:xfrm>
-            <a:off x="395536" y="3717032"/>
-            <a:ext cx="5111750" cy="2353728"/>
+            <a:off x="2636168" y="341041"/>
+            <a:ext cx="4096442" cy="1538883"/>
           </a:xfrm>
           <a:prstGeom prst="rect">
             <a:avLst/>
           </a:prstGeom>
+          <a:noFill/>
         </p:spPr>
         <p:txBody>
-          <a:bodyPr tIns="0"/>
-          <a:lstStyle>
-            <a:lvl1pPr marL="274320" indent="-274320" algn="l" rtl="0" eaLnBrk="1" latinLnBrk="0" hangingPunct="1">
-              <a:spcBef>
-                <a:spcPct val="20000"/>
-              </a:spcBef>
-              <a:buClrTx/>
-              <a:buSzPct val="95000"/>
-              <a:buFont typeface="Wingdings" pitchFamily="2" charset="2"/>
-              <a:buChar char="v"/>
-              <a:defRPr kumimoji="0" sz="2800" kern="1200">
-                <a:solidFill>
-                  <a:schemeClr val="tx1"/>
-                </a:solidFill>
-                <a:latin typeface="+mn-lt"/>
-                <a:ea typeface="+mn-ea"/>
-                <a:cs typeface="+mn-cs"/>
-              </a:defRPr>
-            </a:lvl1pPr>
-            <a:lvl2pPr marL="640080" indent="-246888" algn="l" rtl="0" eaLnBrk="1" latinLnBrk="0" hangingPunct="1">
-              <a:spcBef>
-                <a:spcPct val="20000"/>
-              </a:spcBef>
-              <a:buClrTx/>
-              <a:buSzPct val="85000"/>
-              <a:buFont typeface="Courier New" pitchFamily="49" charset="0"/>
-              <a:buChar char="o"/>
-              <a:defRPr kumimoji="0" sz="2600" kern="1200">
-                <a:solidFill>
-                  <a:schemeClr val="tx1"/>
-                </a:solidFill>
-                <a:latin typeface="+mn-lt"/>
-                <a:ea typeface="+mn-ea"/>
-                <a:cs typeface="+mn-cs"/>
-              </a:defRPr>
-            </a:lvl2pPr>
-            <a:lvl3pPr marL="914400" indent="-246888" algn="l" rtl="0" eaLnBrk="1" latinLnBrk="0" hangingPunct="1">
-              <a:spcBef>
-                <a:spcPct val="20000"/>
-              </a:spcBef>
-              <a:buClrTx/>
-              <a:buSzPct val="70000"/>
-              <a:buFont typeface="Wingdings 2"/>
-              <a:buChar char=""/>
-              <a:defRPr kumimoji="0" sz="2400" kern="1200">
-                <a:solidFill>
-                  <a:schemeClr val="tx1"/>
-                </a:solidFill>
-                <a:latin typeface="+mn-lt"/>
-                <a:ea typeface="+mn-ea"/>
-                <a:cs typeface="+mn-cs"/>
-              </a:defRPr>
-            </a:lvl3pPr>
-            <a:lvl4pPr marL="1188720" indent="-210312" algn="l" rtl="0" eaLnBrk="1" latinLnBrk="0" hangingPunct="1">
-              <a:spcBef>
-                <a:spcPct val="20000"/>
-              </a:spcBef>
-              <a:buClrTx/>
-              <a:buSzPct val="65000"/>
-              <a:buFont typeface="Wingdings 2"/>
-              <a:buChar char=""/>
-              <a:defRPr kumimoji="0" sz="2000" kern="1200">
-                <a:solidFill>
-                  <a:schemeClr val="tx1"/>
-                </a:solidFill>
-                <a:latin typeface="+mn-lt"/>
-                <a:ea typeface="+mn-ea"/>
-                <a:cs typeface="+mn-cs"/>
-              </a:defRPr>
-            </a:lvl4pPr>
-            <a:lvl5pPr marL="1463040" indent="-210312" algn="l" rtl="0" eaLnBrk="1" latinLnBrk="0" hangingPunct="1">
-              <a:spcBef>
-                <a:spcPct val="20000"/>
-              </a:spcBef>
-              <a:buClrTx/>
-              <a:buSzPct val="65000"/>
-              <a:buFont typeface="Wingdings 2"/>
-              <a:buChar char=""/>
-              <a:defRPr kumimoji="0" sz="1800" kern="1200">
-                <a:solidFill>
-                  <a:schemeClr val="tx1"/>
-                </a:solidFill>
-                <a:latin typeface="+mn-lt"/>
-                <a:ea typeface="+mn-ea"/>
-                <a:cs typeface="+mn-cs"/>
-              </a:defRPr>
-            </a:lvl5pPr>
-            <a:lvl6pPr marL="1737360" indent="-210312" algn="l" rtl="0" eaLnBrk="1" latinLnBrk="0" hangingPunct="1">
-              <a:spcBef>
-                <a:spcPct val="20000"/>
-              </a:spcBef>
-              <a:buClr>
-                <a:schemeClr val="accent5"/>
-              </a:buClr>
-              <a:buSzPct val="80000"/>
-              <a:buFont typeface="Wingdings 2"/>
-              <a:buChar char=""/>
-              <a:defRPr kumimoji="0" sz="1800" kern="1200">
-                <a:solidFill>
-                  <a:schemeClr val="tx1"/>
-                </a:solidFill>
-                <a:latin typeface="+mn-lt"/>
-                <a:ea typeface="+mn-ea"/>
-                <a:cs typeface="+mn-cs"/>
-              </a:defRPr>
-            </a:lvl6pPr>
-            <a:lvl7pPr marL="1920240" indent="-182880" algn="l" rtl="0" eaLnBrk="1" latinLnBrk="0" hangingPunct="1">
-              <a:spcBef>
-                <a:spcPct val="20000"/>
-              </a:spcBef>
-              <a:buClr>
-                <a:schemeClr val="accent6"/>
-              </a:buClr>
-              <a:buSzPct val="80000"/>
-              <a:buFont typeface="Wingdings 2"/>
-              <a:buChar char=""/>
-              <a:defRPr kumimoji="0" sz="1600" kern="1200" baseline="0">
-                <a:solidFill>
-                  <a:schemeClr val="tx1"/>
-                </a:solidFill>
-                <a:latin typeface="+mn-lt"/>
-                <a:ea typeface="+mn-ea"/>
-                <a:cs typeface="+mn-cs"/>
-              </a:defRPr>
-            </a:lvl7pPr>
-            <a:lvl8pPr marL="2194560" indent="-182880" algn="l" rtl="0" eaLnBrk="1" latinLnBrk="0" hangingPunct="1">
-              <a:spcBef>
-                <a:spcPct val="20000"/>
-              </a:spcBef>
-              <a:buClr>
-                <a:schemeClr val="tx2"/>
-              </a:buClr>
-              <a:buChar char="•"/>
-              <a:defRPr kumimoji="0" sz="1600" kern="1200">
-                <a:solidFill>
-                  <a:schemeClr val="tx1"/>
-                </a:solidFill>
-                <a:latin typeface="+mn-lt"/>
-                <a:ea typeface="+mn-ea"/>
-                <a:cs typeface="+mn-cs"/>
-              </a:defRPr>
-            </a:lvl8pPr>
-            <a:lvl9pPr marL="2468880" indent="-182880" algn="l" rtl="0" eaLnBrk="1" latinLnBrk="0" hangingPunct="1">
-              <a:spcBef>
-                <a:spcPct val="20000"/>
-              </a:spcBef>
-              <a:buClr>
-                <a:schemeClr val="tx2"/>
-              </a:buClr>
-              <a:buFontTx/>
-              <a:buChar char="•"/>
-              <a:defRPr kumimoji="0" sz="1400" kern="1200" baseline="0">
-                <a:solidFill>
-                  <a:schemeClr val="tx1"/>
-                </a:solidFill>
-                <a:latin typeface="+mn-lt"/>
-                <a:ea typeface="+mn-ea"/>
-                <a:cs typeface="+mn-cs"/>
-              </a:defRPr>
-            </a:lvl9pPr>
-          </a:lstStyle>
-          <a:p>
-            <a:r>
-              <a:rPr lang="it-IT" dirty="0" smtClean="0"/>
-              <a:t>Controllato Decentralizzato</a:t>
-            </a:r>
-          </a:p>
-          <a:p>
-            <a:pPr lvl="1"/>
-            <a:r>
-              <a:rPr lang="it-IT" dirty="0" smtClean="0"/>
-              <a:t>Sottosistema Accessi</a:t>
-            </a:r>
-            <a:endParaRPr lang="it-IT" dirty="0" smtClean="0"/>
-          </a:p>
-          <a:p>
-            <a:pPr lvl="1"/>
-            <a:r>
-              <a:rPr lang="it-IT" dirty="0" smtClean="0"/>
-              <a:t>Sottosistema </a:t>
-            </a:r>
-            <a:r>
-              <a:rPr lang="it-IT" dirty="0" err="1" smtClean="0"/>
-              <a:t>……</a:t>
-            </a:r>
-            <a:endParaRPr lang="it-IT" dirty="0" smtClean="0"/>
-          </a:p>
-          <a:p>
-            <a:pPr lvl="1"/>
-            <a:r>
-              <a:rPr lang="it-IT" dirty="0" smtClean="0"/>
-              <a:t>Sottosistema </a:t>
-            </a:r>
-            <a:r>
-              <a:rPr lang="it-IT" dirty="0" err="1" smtClean="0"/>
-              <a:t>……</a:t>
-            </a:r>
-            <a:endParaRPr lang="it-IT" dirty="0" smtClean="0"/>
+          <a:bodyPr wrap="square" rtlCol="0">
+            <a:spAutoFit/>
+          </a:bodyPr>
+          <a:lstStyle/>
+          <a:p>
+            <a:pPr algn="ctr"/>
+            <a:r>
+              <a:rPr lang="it-IT" sz="4800" b="1" dirty="0" smtClean="0">
+                <a:latin typeface="+mj-lt"/>
+              </a:rPr>
+              <a:t>Progetto </a:t>
+            </a:r>
+            <a:r>
+              <a:rPr lang="it-IT" sz="4800" b="1" dirty="0" err="1" smtClean="0">
+                <a:latin typeface="+mj-lt"/>
+              </a:rPr>
+              <a:t>@silo</a:t>
+            </a:r>
+            <a:r>
+              <a:rPr lang="it-IT" sz="4800" b="1" dirty="0" smtClean="0">
+                <a:latin typeface="+mj-lt"/>
+              </a:rPr>
+              <a:t> </a:t>
+            </a:r>
+          </a:p>
+          <a:p>
+            <a:pPr algn="ctr"/>
+            <a:r>
+              <a:rPr lang="it-IT" sz="2800" b="1" dirty="0" smtClean="0">
+                <a:latin typeface="+mj-lt"/>
+              </a:rPr>
+              <a:t>Finalità e obiettivo</a:t>
+            </a:r>
+          </a:p>
+          <a:p>
+            <a:pPr algn="ctr"/>
+            <a:endParaRPr lang="it-IT" dirty="0">
+              <a:latin typeface="+mj-lt"/>
+            </a:endParaRPr>
           </a:p>
         </p:txBody>
       </p:sp>
     </p:spTree>
     <p:extLst>
       <p:ext uri="{BB962C8B-B14F-4D97-AF65-F5344CB8AC3E}">
-        <p14:creationId xmlns="" xmlns:p14="http://schemas.microsoft.com/office/powerpoint/2010/main" val="155874689"/>
+        <p14:creationId xmlns:p14="http://schemas.microsoft.com/office/powerpoint/2010/main" xmlns="" val="155874689"/>
       </p:ext>
     </p:extLst>
   </p:cSld>
@@ -6677,7 +6737,7 @@
     <a:masterClrMapping/>
   </p:clrMapOvr>
   <mc:AlternateContent xmlns:mc="http://schemas.openxmlformats.org/markup-compatibility/2006">
-    <mc:Choice xmlns="" xmlns:p14="http://schemas.microsoft.com/office/powerpoint/2010/main" Requires="p14">
+    <mc:Choice xmlns:p14="http://schemas.microsoft.com/office/powerpoint/2010/main" xmlns="" Requires="p14">
       <p:transition spd="slow" p14:dur="2000"/>
     </mc:Choice>
     <mc:Fallback>
@@ -6808,8 +6868,8 @@
         </p:nvSpPr>
         <p:spPr>
           <a:xfrm>
-            <a:off x="2141887" y="0"/>
-            <a:ext cx="4862100" cy="1107996"/>
+            <a:off x="1043608" y="0"/>
+            <a:ext cx="7002113" cy="1107996"/>
           </a:xfrm>
           <a:prstGeom prst="rect">
             <a:avLst/>
@@ -6827,8 +6887,17 @@
               <a:rPr lang="it-IT" sz="4800" b="1" dirty="0" smtClean="0">
                 <a:latin typeface="+mj-lt"/>
               </a:rPr>
-              <a:t>Attori del Sistema </a:t>
-            </a:r>
+              <a:t>Principali del Sottosistema</a:t>
+            </a:r>
+            <a:r>
+              <a:rPr lang="it-IT" sz="4800" b="1" dirty="0" smtClean="0">
+                <a:latin typeface="+mj-lt"/>
+              </a:rPr>
+              <a:t> </a:t>
+            </a:r>
+            <a:endParaRPr lang="it-IT" sz="4800" b="1" dirty="0" smtClean="0">
+              <a:latin typeface="+mj-lt"/>
+            </a:endParaRPr>
           </a:p>
           <a:p>
             <a:pPr algn="ctr"/>
@@ -6855,7 +6924,7 @@
         </p:blipFill>
         <p:spPr bwMode="auto">
           <a:xfrm>
-            <a:off x="827584" y="764703"/>
+            <a:off x="899592" y="764703"/>
             <a:ext cx="7260655" cy="6093297"/>
           </a:xfrm>
           <a:prstGeom prst="rect">
@@ -6897,8 +6966,8 @@
         </p:nvSpPr>
         <p:spPr>
           <a:xfrm>
-            <a:off x="971600" y="1"/>
-            <a:ext cx="6912768" cy="1538883"/>
+            <a:off x="2197459" y="404664"/>
+            <a:ext cx="4611647" cy="1538883"/>
           </a:xfrm>
           <a:prstGeom prst="rect">
             <a:avLst/>
@@ -6906,29 +6975,17 @@
           <a:noFill/>
         </p:spPr>
         <p:txBody>
-          <a:bodyPr wrap="square" rtlCol="0">
+          <a:bodyPr wrap="none" rtlCol="0">
             <a:spAutoFit/>
           </a:bodyPr>
           <a:lstStyle/>
           <a:p>
             <a:pPr algn="ctr"/>
             <a:r>
-              <a:rPr lang="it-IT" sz="4800" b="1" dirty="0" err="1" smtClean="0">
-                <a:latin typeface="+mj-lt"/>
-              </a:rPr>
-              <a:t>Use</a:t>
-            </a:r>
-            <a:r>
               <a:rPr lang="it-IT" sz="4800" b="1" dirty="0" smtClean="0">
                 <a:latin typeface="+mj-lt"/>
               </a:rPr>
-              <a:t> case </a:t>
-            </a:r>
-            <a:r>
-              <a:rPr lang="it-IT" sz="4800" b="1" dirty="0" err="1" smtClean="0">
-                <a:latin typeface="+mj-lt"/>
-              </a:rPr>
-              <a:t>Diagram</a:t>
+              <a:t>Generalizzazioni </a:t>
             </a:r>
             <a:r>
               <a:rPr lang="it-IT" sz="4800" b="1" dirty="0" smtClean="0">
@@ -6936,6 +6993,9 @@
               </a:rPr>
               <a:t> </a:t>
             </a:r>
+            <a:endParaRPr lang="it-IT" sz="4800" b="1" dirty="0" smtClean="0">
+              <a:latin typeface="+mj-lt"/>
+            </a:endParaRPr>
           </a:p>
           <a:p>
             <a:pPr algn="ctr"/>
@@ -6943,8 +7003,11 @@
               <a:rPr lang="it-IT" sz="2800" b="1" dirty="0" smtClean="0">
                 <a:latin typeface="+mj-lt"/>
               </a:rPr>
-              <a:t>Prima versione </a:t>
-            </a:r>
+              <a:t>Trasformazioni  e  Aggiunte</a:t>
+            </a:r>
+            <a:endParaRPr lang="it-IT" sz="2800" b="1" dirty="0" smtClean="0">
+              <a:latin typeface="+mj-lt"/>
+            </a:endParaRPr>
           </a:p>
           <a:p>
             <a:pPr algn="ctr"/>
@@ -6954,32 +7017,251 @@
           </a:p>
         </p:txBody>
       </p:sp>
-      <p:pic>
-        <p:nvPicPr>
-          <p:cNvPr id="6146" name="Picture 2" descr="C:\Users\Ferdinando\Desktop\UCD Primo.jpg"/>
-          <p:cNvPicPr>
-            <a:picLocks noChangeAspect="1" noChangeArrowheads="1"/>
-          </p:cNvPicPr>
+      <p:sp>
+        <p:nvSpPr>
+          <p:cNvPr id="5" name="Content Placeholder 3"/>
+          <p:cNvSpPr txBox="1">
+            <a:spLocks/>
+          </p:cNvSpPr>
           <p:nvPr/>
-        </p:nvPicPr>
-        <p:blipFill>
-          <a:blip r:embed="rId3" cstate="print"/>
-          <a:srcRect/>
-          <a:stretch>
-            <a:fillRect/>
-          </a:stretch>
-        </p:blipFill>
-        <p:spPr bwMode="auto">
+        </p:nvSpPr>
+        <p:spPr>
           <a:xfrm>
-            <a:off x="1331640" y="1196752"/>
-            <a:ext cx="6552727" cy="5661248"/>
+            <a:off x="467544" y="2060848"/>
+            <a:ext cx="7200800" cy="4536504"/>
           </a:xfrm>
           <a:prstGeom prst="rect">
             <a:avLst/>
           </a:prstGeom>
-          <a:noFill/>
         </p:spPr>
-      </p:pic>
+        <p:txBody>
+          <a:bodyPr tIns="0"/>
+          <a:lstStyle>
+            <a:lvl1pPr marL="274320" indent="-274320" algn="l" rtl="0" eaLnBrk="1" latinLnBrk="0" hangingPunct="1">
+              <a:spcBef>
+                <a:spcPct val="20000"/>
+              </a:spcBef>
+              <a:buClrTx/>
+              <a:buSzPct val="95000"/>
+              <a:buFont typeface="Wingdings" pitchFamily="2" charset="2"/>
+              <a:buChar char="v"/>
+              <a:defRPr kumimoji="0" sz="2800" kern="1200">
+                <a:solidFill>
+                  <a:schemeClr val="tx1"/>
+                </a:solidFill>
+                <a:latin typeface="+mn-lt"/>
+                <a:ea typeface="+mn-ea"/>
+                <a:cs typeface="+mn-cs"/>
+              </a:defRPr>
+            </a:lvl1pPr>
+            <a:lvl2pPr marL="640080" indent="-246888" algn="l" rtl="0" eaLnBrk="1" latinLnBrk="0" hangingPunct="1">
+              <a:spcBef>
+                <a:spcPct val="20000"/>
+              </a:spcBef>
+              <a:buClrTx/>
+              <a:buSzPct val="85000"/>
+              <a:buFont typeface="Courier New" pitchFamily="49" charset="0"/>
+              <a:buChar char="o"/>
+              <a:defRPr kumimoji="0" sz="2600" kern="1200">
+                <a:solidFill>
+                  <a:schemeClr val="tx1"/>
+                </a:solidFill>
+                <a:latin typeface="+mn-lt"/>
+                <a:ea typeface="+mn-ea"/>
+                <a:cs typeface="+mn-cs"/>
+              </a:defRPr>
+            </a:lvl2pPr>
+            <a:lvl3pPr marL="914400" indent="-246888" algn="l" rtl="0" eaLnBrk="1" latinLnBrk="0" hangingPunct="1">
+              <a:spcBef>
+                <a:spcPct val="20000"/>
+              </a:spcBef>
+              <a:buClrTx/>
+              <a:buSzPct val="70000"/>
+              <a:buFont typeface="Wingdings 2"/>
+              <a:buChar char=""/>
+              <a:defRPr kumimoji="0" sz="2400" kern="1200">
+                <a:solidFill>
+                  <a:schemeClr val="tx1"/>
+                </a:solidFill>
+                <a:latin typeface="+mn-lt"/>
+                <a:ea typeface="+mn-ea"/>
+                <a:cs typeface="+mn-cs"/>
+              </a:defRPr>
+            </a:lvl3pPr>
+            <a:lvl4pPr marL="1188720" indent="-210312" algn="l" rtl="0" eaLnBrk="1" latinLnBrk="0" hangingPunct="1">
+              <a:spcBef>
+                <a:spcPct val="20000"/>
+              </a:spcBef>
+              <a:buClrTx/>
+              <a:buSzPct val="65000"/>
+              <a:buFont typeface="Wingdings 2"/>
+              <a:buChar char=""/>
+              <a:defRPr kumimoji="0" sz="2000" kern="1200">
+                <a:solidFill>
+                  <a:schemeClr val="tx1"/>
+                </a:solidFill>
+                <a:latin typeface="+mn-lt"/>
+                <a:ea typeface="+mn-ea"/>
+                <a:cs typeface="+mn-cs"/>
+              </a:defRPr>
+            </a:lvl4pPr>
+            <a:lvl5pPr marL="1463040" indent="-210312" algn="l" rtl="0" eaLnBrk="1" latinLnBrk="0" hangingPunct="1">
+              <a:spcBef>
+                <a:spcPct val="20000"/>
+              </a:spcBef>
+              <a:buClrTx/>
+              <a:buSzPct val="65000"/>
+              <a:buFont typeface="Wingdings 2"/>
+              <a:buChar char=""/>
+              <a:defRPr kumimoji="0" sz="1800" kern="1200">
+                <a:solidFill>
+                  <a:schemeClr val="tx1"/>
+                </a:solidFill>
+                <a:latin typeface="+mn-lt"/>
+                <a:ea typeface="+mn-ea"/>
+                <a:cs typeface="+mn-cs"/>
+              </a:defRPr>
+            </a:lvl5pPr>
+            <a:lvl6pPr marL="1737360" indent="-210312" algn="l" rtl="0" eaLnBrk="1" latinLnBrk="0" hangingPunct="1">
+              <a:spcBef>
+                <a:spcPct val="20000"/>
+              </a:spcBef>
+              <a:buClr>
+                <a:schemeClr val="accent5"/>
+              </a:buClr>
+              <a:buSzPct val="80000"/>
+              <a:buFont typeface="Wingdings 2"/>
+              <a:buChar char=""/>
+              <a:defRPr kumimoji="0" sz="1800" kern="1200">
+                <a:solidFill>
+                  <a:schemeClr val="tx1"/>
+                </a:solidFill>
+                <a:latin typeface="+mn-lt"/>
+                <a:ea typeface="+mn-ea"/>
+                <a:cs typeface="+mn-cs"/>
+              </a:defRPr>
+            </a:lvl6pPr>
+            <a:lvl7pPr marL="1920240" indent="-182880" algn="l" rtl="0" eaLnBrk="1" latinLnBrk="0" hangingPunct="1">
+              <a:spcBef>
+                <a:spcPct val="20000"/>
+              </a:spcBef>
+              <a:buClr>
+                <a:schemeClr val="accent6"/>
+              </a:buClr>
+              <a:buSzPct val="80000"/>
+              <a:buFont typeface="Wingdings 2"/>
+              <a:buChar char=""/>
+              <a:defRPr kumimoji="0" sz="1600" kern="1200" baseline="0">
+                <a:solidFill>
+                  <a:schemeClr val="tx1"/>
+                </a:solidFill>
+                <a:latin typeface="+mn-lt"/>
+                <a:ea typeface="+mn-ea"/>
+                <a:cs typeface="+mn-cs"/>
+              </a:defRPr>
+            </a:lvl7pPr>
+            <a:lvl8pPr marL="2194560" indent="-182880" algn="l" rtl="0" eaLnBrk="1" latinLnBrk="0" hangingPunct="1">
+              <a:spcBef>
+                <a:spcPct val="20000"/>
+              </a:spcBef>
+              <a:buClr>
+                <a:schemeClr val="tx2"/>
+              </a:buClr>
+              <a:buChar char="•"/>
+              <a:defRPr kumimoji="0" sz="1600" kern="1200">
+                <a:solidFill>
+                  <a:schemeClr val="tx1"/>
+                </a:solidFill>
+                <a:latin typeface="+mn-lt"/>
+                <a:ea typeface="+mn-ea"/>
+                <a:cs typeface="+mn-cs"/>
+              </a:defRPr>
+            </a:lvl8pPr>
+            <a:lvl9pPr marL="2468880" indent="-182880" algn="l" rtl="0" eaLnBrk="1" latinLnBrk="0" hangingPunct="1">
+              <a:spcBef>
+                <a:spcPct val="20000"/>
+              </a:spcBef>
+              <a:buClr>
+                <a:schemeClr val="tx2"/>
+              </a:buClr>
+              <a:buFontTx/>
+              <a:buChar char="•"/>
+              <a:defRPr kumimoji="0" sz="1400" kern="1200" baseline="0">
+                <a:solidFill>
+                  <a:schemeClr val="tx1"/>
+                </a:solidFill>
+                <a:latin typeface="+mn-lt"/>
+                <a:ea typeface="+mn-ea"/>
+                <a:cs typeface="+mn-cs"/>
+              </a:defRPr>
+            </a:lvl9pPr>
+          </a:lstStyle>
+          <a:p>
+            <a:r>
+              <a:rPr lang="it-IT" dirty="0" smtClean="0"/>
+              <a:t>Aggiunte</a:t>
+            </a:r>
+            <a:endParaRPr lang="it-IT" dirty="0" smtClean="0"/>
+          </a:p>
+          <a:p>
+            <a:pPr lvl="1"/>
+            <a:r>
+              <a:rPr lang="it-IT" dirty="0" smtClean="0"/>
+              <a:t>Durante il processo di Analisi e </a:t>
+            </a:r>
+            <a:r>
+              <a:rPr lang="it-IT" dirty="0" err="1" smtClean="0"/>
+              <a:t>oltre…</a:t>
+            </a:r>
+            <a:r>
+              <a:rPr lang="it-IT" dirty="0" smtClean="0"/>
+              <a:t>.</a:t>
+            </a:r>
+          </a:p>
+          <a:p>
+            <a:pPr lvl="1"/>
+            <a:r>
+              <a:rPr lang="it-IT" dirty="0" smtClean="0"/>
+              <a:t>Migliorare o Ottimizzare</a:t>
+            </a:r>
+            <a:endParaRPr lang="it-IT" dirty="0" smtClean="0"/>
+          </a:p>
+          <a:p>
+            <a:r>
+              <a:rPr lang="it-IT" dirty="0" smtClean="0"/>
+              <a:t>Trasformazioni e Generalizzazioni</a:t>
+            </a:r>
+            <a:endParaRPr lang="it-IT" dirty="0" smtClean="0"/>
+          </a:p>
+          <a:p>
+            <a:pPr lvl="1"/>
+            <a:r>
+              <a:rPr lang="it-IT" dirty="0" smtClean="0"/>
+              <a:t>Normale evoluzione del sistema</a:t>
+            </a:r>
+          </a:p>
+          <a:p>
+            <a:pPr lvl="1"/>
+            <a:r>
+              <a:rPr lang="it-IT" dirty="0" smtClean="0"/>
+              <a:t>Complessità sempre maggiore</a:t>
+            </a:r>
+          </a:p>
+          <a:p>
+            <a:r>
+              <a:rPr lang="it-IT" dirty="0" smtClean="0"/>
+              <a:t>Riportate e descritte nell’evoluzione del RAD</a:t>
+            </a:r>
+            <a:endParaRPr lang="it-IT" dirty="0" smtClean="0"/>
+          </a:p>
+          <a:p>
+            <a:pPr lvl="1">
+              <a:buNone/>
+            </a:pPr>
+            <a:endParaRPr lang="it-IT" dirty="0" smtClean="0"/>
+          </a:p>
+        </p:txBody>
+      </p:sp>
     </p:spTree>
   </p:cSld>
   <p:clrMapOvr>
@@ -7059,8 +7341,17 @@
               <a:rPr lang="it-IT" sz="2800" b="1" dirty="0" smtClean="0">
                 <a:latin typeface="+mj-lt"/>
               </a:rPr>
-              <a:t>Seconda versione </a:t>
-            </a:r>
+              <a:t>Prima </a:t>
+            </a:r>
+            <a:r>
+              <a:rPr lang="it-IT" sz="2800" b="1" dirty="0" smtClean="0">
+                <a:latin typeface="+mj-lt"/>
+              </a:rPr>
+              <a:t>versione RAD 1.0 </a:t>
+            </a:r>
+            <a:endParaRPr lang="it-IT" sz="2800" b="1" dirty="0" smtClean="0">
+              <a:latin typeface="+mj-lt"/>
+            </a:endParaRPr>
           </a:p>
           <a:p>
             <a:pPr algn="ctr"/>
@@ -7072,7 +7363,7 @@
       </p:sp>
       <p:pic>
         <p:nvPicPr>
-          <p:cNvPr id="7170" name="Picture 2" descr="C:\Users\Ferdinando\Desktop\2ver.jpg"/>
+          <p:cNvPr id="6146" name="Picture 2" descr="C:\Users\Ferdinando\Desktop\UCD Primo.jpg"/>
           <p:cNvPicPr>
             <a:picLocks noChangeAspect="1" noChangeArrowheads="1"/>
           </p:cNvPicPr>
@@ -7087,8 +7378,8 @@
         </p:blipFill>
         <p:spPr bwMode="auto">
           <a:xfrm>
-            <a:off x="1403648" y="1196752"/>
-            <a:ext cx="5976664" cy="5661248"/>
+            <a:off x="683568" y="1196752"/>
+            <a:ext cx="7200799" cy="5661248"/>
           </a:xfrm>
           <a:prstGeom prst="rect">
             <a:avLst/>
@@ -7175,8 +7466,17 @@
               <a:rPr lang="it-IT" sz="2800" b="1" dirty="0" smtClean="0">
                 <a:latin typeface="+mj-lt"/>
               </a:rPr>
-              <a:t>Ultima versione </a:t>
-            </a:r>
+              <a:t>Seconda </a:t>
+            </a:r>
+            <a:r>
+              <a:rPr lang="it-IT" sz="2800" b="1" dirty="0" smtClean="0">
+                <a:latin typeface="+mj-lt"/>
+              </a:rPr>
+              <a:t>versione RAD 2.0 </a:t>
+            </a:r>
+            <a:endParaRPr lang="it-IT" sz="2800" b="1" dirty="0" smtClean="0">
+              <a:latin typeface="+mj-lt"/>
+            </a:endParaRPr>
           </a:p>
           <a:p>
             <a:pPr algn="ctr"/>
@@ -7188,7 +7488,7 @@
       </p:sp>
       <p:pic>
         <p:nvPicPr>
-          <p:cNvPr id="8194" name="Picture 2" descr="C:\Users\Ferdinando\Desktop\UCD finale.jpg"/>
+          <p:cNvPr id="1026" name="Picture 2" descr="C:\Users\Ferdinando\Desktop\Nuova cartella\2ver.jpg"/>
           <p:cNvPicPr>
             <a:picLocks noChangeAspect="1" noChangeArrowheads="1"/>
           </p:cNvPicPr>
@@ -7203,8 +7503,8 @@
         </p:blipFill>
         <p:spPr bwMode="auto">
           <a:xfrm>
-            <a:off x="899592" y="1196752"/>
-            <a:ext cx="7416824" cy="5661248"/>
+            <a:off x="1043608" y="1196752"/>
+            <a:ext cx="6840760" cy="5661248"/>
           </a:xfrm>
           <a:prstGeom prst="rect">
             <a:avLst/>
@@ -7221,6 +7521,131 @@
 </file>
 
 <file path=ppt/slides/slide15.xml><?xml version="1.0" encoding="utf-8"?>
+<p:sld xmlns:a="http://schemas.openxmlformats.org/drawingml/2006/main" xmlns:r="http://schemas.openxmlformats.org/officeDocument/2006/relationships" xmlns:p="http://schemas.openxmlformats.org/presentationml/2006/main">
+  <p:cSld>
+    <p:spTree>
+      <p:nvGrpSpPr>
+        <p:cNvPr id="1" name=""/>
+        <p:cNvGrpSpPr/>
+        <p:nvPr/>
+      </p:nvGrpSpPr>
+      <p:grpSpPr>
+        <a:xfrm>
+          <a:off x="0" y="0"/>
+          <a:ext cx="0" cy="0"/>
+          <a:chOff x="0" y="0"/>
+          <a:chExt cx="0" cy="0"/>
+        </a:xfrm>
+      </p:grpSpPr>
+      <p:sp>
+        <p:nvSpPr>
+          <p:cNvPr id="4" name="CasellaDiTesto 3"/>
+          <p:cNvSpPr txBox="1"/>
+          <p:nvPr/>
+        </p:nvSpPr>
+        <p:spPr>
+          <a:xfrm>
+            <a:off x="971600" y="1"/>
+            <a:ext cx="6912768" cy="1538883"/>
+          </a:xfrm>
+          <a:prstGeom prst="rect">
+            <a:avLst/>
+          </a:prstGeom>
+          <a:noFill/>
+        </p:spPr>
+        <p:txBody>
+          <a:bodyPr wrap="square" rtlCol="0">
+            <a:spAutoFit/>
+          </a:bodyPr>
+          <a:lstStyle/>
+          <a:p>
+            <a:pPr algn="ctr"/>
+            <a:r>
+              <a:rPr lang="it-IT" sz="4800" b="1" dirty="0" err="1" smtClean="0">
+                <a:latin typeface="+mj-lt"/>
+              </a:rPr>
+              <a:t>Use</a:t>
+            </a:r>
+            <a:r>
+              <a:rPr lang="it-IT" sz="4800" b="1" dirty="0" smtClean="0">
+                <a:latin typeface="+mj-lt"/>
+              </a:rPr>
+              <a:t> case </a:t>
+            </a:r>
+            <a:r>
+              <a:rPr lang="it-IT" sz="4800" b="1" dirty="0" err="1" smtClean="0">
+                <a:latin typeface="+mj-lt"/>
+              </a:rPr>
+              <a:t>Diagram</a:t>
+            </a:r>
+            <a:r>
+              <a:rPr lang="it-IT" sz="4800" b="1" dirty="0" smtClean="0">
+                <a:latin typeface="+mj-lt"/>
+              </a:rPr>
+              <a:t> </a:t>
+            </a:r>
+          </a:p>
+          <a:p>
+            <a:pPr algn="ctr"/>
+            <a:r>
+              <a:rPr lang="it-IT" sz="2800" b="1" dirty="0" smtClean="0">
+                <a:latin typeface="+mj-lt"/>
+              </a:rPr>
+              <a:t>Ultima </a:t>
+            </a:r>
+            <a:r>
+              <a:rPr lang="it-IT" sz="2800" b="1" dirty="0" smtClean="0">
+                <a:latin typeface="+mj-lt"/>
+              </a:rPr>
+              <a:t>versione RAD 4.0 </a:t>
+            </a:r>
+            <a:endParaRPr lang="it-IT" sz="2800" b="1" dirty="0" smtClean="0">
+              <a:latin typeface="+mj-lt"/>
+            </a:endParaRPr>
+          </a:p>
+          <a:p>
+            <a:pPr algn="ctr"/>
+            <a:endParaRPr lang="it-IT" dirty="0">
+              <a:latin typeface="+mj-lt"/>
+            </a:endParaRPr>
+          </a:p>
+        </p:txBody>
+      </p:sp>
+      <p:pic>
+        <p:nvPicPr>
+          <p:cNvPr id="2050" name="Picture 2" descr="C:\Users\Ferdinando\Desktop\Nuova cartella\UCD finale.jpg"/>
+          <p:cNvPicPr>
+            <a:picLocks noChangeAspect="1" noChangeArrowheads="1"/>
+          </p:cNvPicPr>
+          <p:nvPr/>
+        </p:nvPicPr>
+        <p:blipFill>
+          <a:blip r:embed="rId3" cstate="print"/>
+          <a:srcRect/>
+          <a:stretch>
+            <a:fillRect/>
+          </a:stretch>
+        </p:blipFill>
+        <p:spPr bwMode="auto">
+          <a:xfrm>
+            <a:off x="827584" y="1196752"/>
+            <a:ext cx="7560840" cy="5661248"/>
+          </a:xfrm>
+          <a:prstGeom prst="rect">
+            <a:avLst/>
+          </a:prstGeom>
+          <a:noFill/>
+        </p:spPr>
+      </p:pic>
+    </p:spTree>
+  </p:cSld>
+  <p:clrMapOvr>
+    <a:masterClrMapping/>
+  </p:clrMapOvr>
+</p:sld>
+</file>
+
+<file path=ppt/slides/slide16.xml><?xml version="1.0" encoding="utf-8"?>
 <p:sld xmlns:a="http://schemas.openxmlformats.org/drawingml/2006/main" xmlns:r="http://schemas.openxmlformats.org/officeDocument/2006/relationships" xmlns:p="http://schemas.openxmlformats.org/presentationml/2006/main">
   <p:cSld>
     <p:spTree>
@@ -7348,7 +7773,7 @@
 </p:sld>
 </file>
 
-<file path=ppt/slides/slide16.xml><?xml version="1.0" encoding="utf-8"?>
+<file path=ppt/slides/slide17.xml><?xml version="1.0" encoding="utf-8"?>
 <p:sld xmlns:a="http://schemas.openxmlformats.org/drawingml/2006/main" xmlns:r="http://schemas.openxmlformats.org/officeDocument/2006/relationships" xmlns:p="http://schemas.openxmlformats.org/presentationml/2006/main">
   <p:cSld>
     <p:spTree>
@@ -7476,6 +7901,407 @@
 </p:sld>
 </file>
 
+<file path=ppt/slides/slide18.xml><?xml version="1.0" encoding="utf-8"?>
+<p:sld xmlns:a="http://schemas.openxmlformats.org/drawingml/2006/main" xmlns:r="http://schemas.openxmlformats.org/officeDocument/2006/relationships" xmlns:p="http://schemas.openxmlformats.org/presentationml/2006/main">
+  <p:cSld>
+    <p:spTree>
+      <p:nvGrpSpPr>
+        <p:cNvPr id="1" name=""/>
+        <p:cNvGrpSpPr/>
+        <p:nvPr/>
+      </p:nvGrpSpPr>
+      <p:grpSpPr>
+        <a:xfrm>
+          <a:off x="0" y="0"/>
+          <a:ext cx="0" cy="0"/>
+          <a:chOff x="0" y="0"/>
+          <a:chExt cx="0" cy="0"/>
+        </a:xfrm>
+      </p:grpSpPr>
+      <p:sp>
+        <p:nvSpPr>
+          <p:cNvPr id="2" name="CasellaDiTesto 1"/>
+          <p:cNvSpPr txBox="1"/>
+          <p:nvPr/>
+        </p:nvSpPr>
+        <p:spPr>
+          <a:xfrm>
+            <a:off x="2339752" y="0"/>
+            <a:ext cx="4096442" cy="1538883"/>
+          </a:xfrm>
+          <a:prstGeom prst="rect">
+            <a:avLst/>
+          </a:prstGeom>
+          <a:noFill/>
+        </p:spPr>
+        <p:txBody>
+          <a:bodyPr wrap="square" rtlCol="0">
+            <a:spAutoFit/>
+          </a:bodyPr>
+          <a:lstStyle/>
+          <a:p>
+            <a:pPr algn="ctr"/>
+            <a:r>
+              <a:rPr lang="it-IT" sz="4800" b="1" dirty="0" smtClean="0">
+                <a:latin typeface="+mj-lt"/>
+              </a:rPr>
+              <a:t>Progetto </a:t>
+            </a:r>
+            <a:r>
+              <a:rPr lang="it-IT" sz="4800" b="1" dirty="0" err="1" smtClean="0">
+                <a:latin typeface="+mj-lt"/>
+              </a:rPr>
+              <a:t>@</a:t>
+            </a:r>
+            <a:r>
+              <a:rPr lang="it-IT" sz="4800" b="1" dirty="0" err="1" smtClean="0">
+                <a:latin typeface="+mj-lt"/>
+              </a:rPr>
+              <a:t>silo</a:t>
+            </a:r>
+            <a:r>
+              <a:rPr lang="it-IT" sz="4800" b="1" dirty="0" smtClean="0">
+                <a:latin typeface="+mj-lt"/>
+              </a:rPr>
+              <a:t> </a:t>
+            </a:r>
+            <a:endParaRPr lang="it-IT" sz="4800" b="1" dirty="0" smtClean="0">
+              <a:latin typeface="+mj-lt"/>
+            </a:endParaRPr>
+          </a:p>
+          <a:p>
+            <a:pPr algn="ctr"/>
+            <a:r>
+              <a:rPr lang="it-IT" sz="2800" b="1" dirty="0" smtClean="0">
+                <a:latin typeface="+mj-lt"/>
+              </a:rPr>
+              <a:t>Perché?</a:t>
+            </a:r>
+            <a:endParaRPr lang="it-IT" sz="2800" b="1" dirty="0" smtClean="0">
+              <a:latin typeface="+mj-lt"/>
+            </a:endParaRPr>
+          </a:p>
+          <a:p>
+            <a:pPr algn="ctr"/>
+            <a:endParaRPr lang="it-IT" dirty="0">
+              <a:latin typeface="+mj-lt"/>
+            </a:endParaRPr>
+          </a:p>
+        </p:txBody>
+      </p:sp>
+      <p:sp>
+        <p:nvSpPr>
+          <p:cNvPr id="5" name="Content Placeholder 3"/>
+          <p:cNvSpPr txBox="1">
+            <a:spLocks/>
+          </p:cNvSpPr>
+          <p:nvPr/>
+        </p:nvSpPr>
+        <p:spPr>
+          <a:xfrm>
+            <a:off x="539552" y="1268760"/>
+            <a:ext cx="8280920" cy="5400600"/>
+          </a:xfrm>
+          <a:prstGeom prst="rect">
+            <a:avLst/>
+          </a:prstGeom>
+        </p:spPr>
+        <p:txBody>
+          <a:bodyPr tIns="0"/>
+          <a:lstStyle>
+            <a:lvl1pPr marL="274320" indent="-274320" algn="l" rtl="0" eaLnBrk="1" latinLnBrk="0" hangingPunct="1">
+              <a:spcBef>
+                <a:spcPct val="20000"/>
+              </a:spcBef>
+              <a:buClrTx/>
+              <a:buSzPct val="95000"/>
+              <a:buFont typeface="Wingdings" pitchFamily="2" charset="2"/>
+              <a:buChar char="v"/>
+              <a:defRPr kumimoji="0" sz="2800" kern="1200">
+                <a:solidFill>
+                  <a:schemeClr val="tx1"/>
+                </a:solidFill>
+                <a:latin typeface="+mn-lt"/>
+                <a:ea typeface="+mn-ea"/>
+                <a:cs typeface="+mn-cs"/>
+              </a:defRPr>
+            </a:lvl1pPr>
+            <a:lvl2pPr marL="640080" indent="-246888" algn="l" rtl="0" eaLnBrk="1" latinLnBrk="0" hangingPunct="1">
+              <a:spcBef>
+                <a:spcPct val="20000"/>
+              </a:spcBef>
+              <a:buClrTx/>
+              <a:buSzPct val="85000"/>
+              <a:buFont typeface="Courier New" pitchFamily="49" charset="0"/>
+              <a:buChar char="o"/>
+              <a:defRPr kumimoji="0" sz="2600" kern="1200">
+                <a:solidFill>
+                  <a:schemeClr val="tx1"/>
+                </a:solidFill>
+                <a:latin typeface="+mn-lt"/>
+                <a:ea typeface="+mn-ea"/>
+                <a:cs typeface="+mn-cs"/>
+              </a:defRPr>
+            </a:lvl2pPr>
+            <a:lvl3pPr marL="914400" indent="-246888" algn="l" rtl="0" eaLnBrk="1" latinLnBrk="0" hangingPunct="1">
+              <a:spcBef>
+                <a:spcPct val="20000"/>
+              </a:spcBef>
+              <a:buClrTx/>
+              <a:buSzPct val="70000"/>
+              <a:buFont typeface="Wingdings 2"/>
+              <a:buChar char=""/>
+              <a:defRPr kumimoji="0" sz="2400" kern="1200">
+                <a:solidFill>
+                  <a:schemeClr val="tx1"/>
+                </a:solidFill>
+                <a:latin typeface="+mn-lt"/>
+                <a:ea typeface="+mn-ea"/>
+                <a:cs typeface="+mn-cs"/>
+              </a:defRPr>
+            </a:lvl3pPr>
+            <a:lvl4pPr marL="1188720" indent="-210312" algn="l" rtl="0" eaLnBrk="1" latinLnBrk="0" hangingPunct="1">
+              <a:spcBef>
+                <a:spcPct val="20000"/>
+              </a:spcBef>
+              <a:buClrTx/>
+              <a:buSzPct val="65000"/>
+              <a:buFont typeface="Wingdings 2"/>
+              <a:buChar char=""/>
+              <a:defRPr kumimoji="0" sz="2000" kern="1200">
+                <a:solidFill>
+                  <a:schemeClr val="tx1"/>
+                </a:solidFill>
+                <a:latin typeface="+mn-lt"/>
+                <a:ea typeface="+mn-ea"/>
+                <a:cs typeface="+mn-cs"/>
+              </a:defRPr>
+            </a:lvl4pPr>
+            <a:lvl5pPr marL="1463040" indent="-210312" algn="l" rtl="0" eaLnBrk="1" latinLnBrk="0" hangingPunct="1">
+              <a:spcBef>
+                <a:spcPct val="20000"/>
+              </a:spcBef>
+              <a:buClrTx/>
+              <a:buSzPct val="65000"/>
+              <a:buFont typeface="Wingdings 2"/>
+              <a:buChar char=""/>
+              <a:defRPr kumimoji="0" sz="1800" kern="1200">
+                <a:solidFill>
+                  <a:schemeClr val="tx1"/>
+                </a:solidFill>
+                <a:latin typeface="+mn-lt"/>
+                <a:ea typeface="+mn-ea"/>
+                <a:cs typeface="+mn-cs"/>
+              </a:defRPr>
+            </a:lvl5pPr>
+            <a:lvl6pPr marL="1737360" indent="-210312" algn="l" rtl="0" eaLnBrk="1" latinLnBrk="0" hangingPunct="1">
+              <a:spcBef>
+                <a:spcPct val="20000"/>
+              </a:spcBef>
+              <a:buClr>
+                <a:schemeClr val="accent5"/>
+              </a:buClr>
+              <a:buSzPct val="80000"/>
+              <a:buFont typeface="Wingdings 2"/>
+              <a:buChar char=""/>
+              <a:defRPr kumimoji="0" sz="1800" kern="1200">
+                <a:solidFill>
+                  <a:schemeClr val="tx1"/>
+                </a:solidFill>
+                <a:latin typeface="+mn-lt"/>
+                <a:ea typeface="+mn-ea"/>
+                <a:cs typeface="+mn-cs"/>
+              </a:defRPr>
+            </a:lvl6pPr>
+            <a:lvl7pPr marL="1920240" indent="-182880" algn="l" rtl="0" eaLnBrk="1" latinLnBrk="0" hangingPunct="1">
+              <a:spcBef>
+                <a:spcPct val="20000"/>
+              </a:spcBef>
+              <a:buClr>
+                <a:schemeClr val="accent6"/>
+              </a:buClr>
+              <a:buSzPct val="80000"/>
+              <a:buFont typeface="Wingdings 2"/>
+              <a:buChar char=""/>
+              <a:defRPr kumimoji="0" sz="1600" kern="1200" baseline="0">
+                <a:solidFill>
+                  <a:schemeClr val="tx1"/>
+                </a:solidFill>
+                <a:latin typeface="+mn-lt"/>
+                <a:ea typeface="+mn-ea"/>
+                <a:cs typeface="+mn-cs"/>
+              </a:defRPr>
+            </a:lvl7pPr>
+            <a:lvl8pPr marL="2194560" indent="-182880" algn="l" rtl="0" eaLnBrk="1" latinLnBrk="0" hangingPunct="1">
+              <a:spcBef>
+                <a:spcPct val="20000"/>
+              </a:spcBef>
+              <a:buClr>
+                <a:schemeClr val="tx2"/>
+              </a:buClr>
+              <a:buChar char="•"/>
+              <a:defRPr kumimoji="0" sz="1600" kern="1200">
+                <a:solidFill>
+                  <a:schemeClr val="tx1"/>
+                </a:solidFill>
+                <a:latin typeface="+mn-lt"/>
+                <a:ea typeface="+mn-ea"/>
+                <a:cs typeface="+mn-cs"/>
+              </a:defRPr>
+            </a:lvl8pPr>
+            <a:lvl9pPr marL="2468880" indent="-182880" algn="l" rtl="0" eaLnBrk="1" latinLnBrk="0" hangingPunct="1">
+              <a:spcBef>
+                <a:spcPct val="20000"/>
+              </a:spcBef>
+              <a:buClr>
+                <a:schemeClr val="tx2"/>
+              </a:buClr>
+              <a:buFontTx/>
+              <a:buChar char="•"/>
+              <a:defRPr kumimoji="0" sz="1400" kern="1200" baseline="0">
+                <a:solidFill>
+                  <a:schemeClr val="tx1"/>
+                </a:solidFill>
+                <a:latin typeface="+mn-lt"/>
+                <a:ea typeface="+mn-ea"/>
+                <a:cs typeface="+mn-cs"/>
+              </a:defRPr>
+            </a:lvl9pPr>
+          </a:lstStyle>
+          <a:p>
+            <a:r>
+              <a:rPr lang="it-IT" dirty="0" smtClean="0"/>
+              <a:t>Aderente alle </a:t>
+            </a:r>
+            <a:r>
+              <a:rPr lang="it-IT" dirty="0" smtClean="0"/>
+              <a:t>aspettative </a:t>
+            </a:r>
+            <a:endParaRPr lang="it-IT" dirty="0" smtClean="0"/>
+          </a:p>
+          <a:p>
+            <a:pPr lvl="1"/>
+            <a:r>
+              <a:rPr lang="it-IT" dirty="0" smtClean="0"/>
+              <a:t>Familiarità</a:t>
+            </a:r>
+            <a:endParaRPr lang="it-IT" dirty="0" smtClean="0"/>
+          </a:p>
+          <a:p>
+            <a:r>
+              <a:rPr lang="it-IT" dirty="0" smtClean="0"/>
+              <a:t>Struttura aziendale</a:t>
+            </a:r>
+            <a:endParaRPr lang="it-IT" dirty="0" smtClean="0"/>
+          </a:p>
+          <a:p>
+            <a:pPr lvl="1"/>
+            <a:r>
+              <a:rPr lang="it-IT" dirty="0" smtClean="0"/>
+              <a:t>Nessuna Variazione</a:t>
+            </a:r>
+            <a:endParaRPr lang="it-IT" dirty="0" smtClean="0"/>
+          </a:p>
+          <a:p>
+            <a:pPr lvl="1"/>
+            <a:r>
+              <a:rPr lang="it-IT" dirty="0" smtClean="0"/>
+              <a:t>Ingrato ai processi già noti</a:t>
+            </a:r>
+            <a:endParaRPr lang="it-IT" dirty="0" smtClean="0"/>
+          </a:p>
+          <a:p>
+            <a:r>
+              <a:rPr lang="it-IT" dirty="0" smtClean="0"/>
+              <a:t>Documentazione Solida</a:t>
+            </a:r>
+            <a:endParaRPr lang="it-IT" dirty="0" smtClean="0"/>
+          </a:p>
+          <a:p>
+            <a:pPr lvl="1"/>
+            <a:r>
+              <a:rPr lang="it-IT" dirty="0" smtClean="0"/>
+              <a:t>Raffinata (revisionata)</a:t>
+            </a:r>
+            <a:endParaRPr lang="it-IT" dirty="0" smtClean="0"/>
+          </a:p>
+          <a:p>
+            <a:pPr lvl="1"/>
+            <a:r>
+              <a:rPr lang="it-IT" dirty="0" smtClean="0"/>
+              <a:t>Crescita costante</a:t>
+            </a:r>
+          </a:p>
+          <a:p>
+            <a:pPr lvl="1"/>
+            <a:r>
+              <a:rPr lang="it-IT" dirty="0" smtClean="0"/>
+              <a:t>Ottima Tracciabilità</a:t>
+            </a:r>
+          </a:p>
+          <a:p>
+            <a:r>
+              <a:rPr lang="it-IT" dirty="0" smtClean="0"/>
+              <a:t>Usare </a:t>
+            </a:r>
+            <a:r>
+              <a:rPr lang="it-IT" dirty="0" err="1" smtClean="0"/>
+              <a:t>@silo</a:t>
+            </a:r>
+            <a:r>
+              <a:rPr lang="it-IT" dirty="0" smtClean="0"/>
+              <a:t> senza accorgersene</a:t>
+            </a:r>
+            <a:endParaRPr lang="it-IT" dirty="0" smtClean="0"/>
+          </a:p>
+          <a:p>
+            <a:pPr lvl="1"/>
+            <a:r>
+              <a:rPr lang="it-IT" dirty="0" smtClean="0"/>
+              <a:t>Stessi processi, con maggiore velocità ed efficienza </a:t>
+            </a:r>
+            <a:endParaRPr lang="it-IT" dirty="0" smtClean="0"/>
+          </a:p>
+          <a:p>
+            <a:pPr lvl="1"/>
+            <a:endParaRPr lang="it-IT" dirty="0" smtClean="0"/>
+          </a:p>
+          <a:p>
+            <a:pPr lvl="1">
+              <a:buNone/>
+            </a:pPr>
+            <a:endParaRPr lang="it-IT" dirty="0" smtClean="0"/>
+          </a:p>
+        </p:txBody>
+      </p:sp>
+    </p:spTree>
+    <p:extLst>
+      <p:ext uri="{BB962C8B-B14F-4D97-AF65-F5344CB8AC3E}">
+        <p14:creationId xmlns:p14="http://schemas.microsoft.com/office/powerpoint/2010/main" xmlns="" val="155874689"/>
+      </p:ext>
+    </p:extLst>
+  </p:cSld>
+  <p:clrMapOvr>
+    <a:masterClrMapping/>
+  </p:clrMapOvr>
+  <mc:AlternateContent xmlns:mc="http://schemas.openxmlformats.org/markup-compatibility/2006">
+    <mc:Choice xmlns:p14="http://schemas.microsoft.com/office/powerpoint/2010/main" xmlns="" Requires="p14">
+      <p:transition spd="slow" p14:dur="2000"/>
+    </mc:Choice>
+    <mc:Fallback>
+      <p:transition spd="slow"/>
+    </mc:Fallback>
+  </mc:AlternateContent>
+  <p:timing>
+    <p:tnLst>
+      <p:par>
+        <p:cTn id="1" dur="indefinite" restart="never" nodeType="tmRoot"/>
+      </p:par>
+    </p:tnLst>
+  </p:timing>
+</p:sld>
+</file>
+
 <file path=ppt/slides/slide2.xml><?xml version="1.0" encoding="utf-8"?>
 <p:sld xmlns:a="http://schemas.openxmlformats.org/drawingml/2006/main" xmlns:r="http://schemas.openxmlformats.org/officeDocument/2006/relationships" xmlns:p="http://schemas.openxmlformats.org/presentationml/2006/main">
   <p:cSld>
@@ -7520,23 +8346,8 @@
               <a:rPr lang="it-IT" sz="4800" b="1" dirty="0" smtClean="0">
                 <a:latin typeface="+mj-lt"/>
               </a:rPr>
-              <a:t>Sottosistema </a:t>
-            </a:r>
-            <a:r>
-              <a:rPr lang="it-IT" sz="4800" b="1" dirty="0" smtClean="0">
-                <a:latin typeface="+mj-lt"/>
-              </a:rPr>
-              <a:t>Accessi</a:t>
-            </a:r>
-            <a:r>
-              <a:rPr lang="it-IT" sz="4800" b="1" dirty="0" smtClean="0">
-                <a:latin typeface="+mj-lt"/>
-              </a:rPr>
-              <a:t> </a:t>
-            </a:r>
-            <a:endParaRPr lang="it-IT" sz="4800" b="1" dirty="0" smtClean="0">
-              <a:latin typeface="+mj-lt"/>
-            </a:endParaRPr>
+              <a:t>Sottosistema Accessi </a:t>
+            </a:r>
           </a:p>
           <a:p>
             <a:pPr algn="ctr"/>
@@ -7991,7 +8802,7 @@
     </p:spTree>
     <p:extLst>
       <p:ext uri="{BB962C8B-B14F-4D97-AF65-F5344CB8AC3E}">
-        <p14:creationId xmlns="" xmlns:p14="http://schemas.microsoft.com/office/powerpoint/2010/main" val="155874689"/>
+        <p14:creationId xmlns:p14="http://schemas.microsoft.com/office/powerpoint/2010/main" xmlns="" val="155874689"/>
       </p:ext>
     </p:extLst>
   </p:cSld>
@@ -7999,7 +8810,7 @@
     <a:masterClrMapping/>
   </p:clrMapOvr>
   <mc:AlternateContent xmlns:mc="http://schemas.openxmlformats.org/markup-compatibility/2006">
-    <mc:Choice xmlns="" xmlns:p14="http://schemas.microsoft.com/office/powerpoint/2010/main" Requires="p14">
+    <mc:Choice xmlns:p14="http://schemas.microsoft.com/office/powerpoint/2010/main" xmlns="" Requires="p14">
       <p:transition spd="slow" p14:dur="2000"/>
     </mc:Choice>
     <mc:Fallback>
@@ -8060,13 +8871,7 @@
               <a:rPr lang="it-IT" sz="4800" b="1" dirty="0" smtClean="0">
                 <a:latin typeface="+mj-lt"/>
               </a:rPr>
-              <a:t>Sottosistema Accessi</a:t>
-            </a:r>
-            <a:r>
-              <a:rPr lang="it-IT" sz="4800" b="1" dirty="0" smtClean="0">
-                <a:latin typeface="+mj-lt"/>
-              </a:rPr>
-              <a:t> </a:t>
+              <a:t>Sottosistema Accessi </a:t>
             </a:r>
           </a:p>
           <a:p>
@@ -8352,7 +9157,7 @@
     </p:spTree>
     <p:extLst>
       <p:ext uri="{BB962C8B-B14F-4D97-AF65-F5344CB8AC3E}">
-        <p14:creationId xmlns="" xmlns:p14="http://schemas.microsoft.com/office/powerpoint/2010/main" val="155874689"/>
+        <p14:creationId xmlns:p14="http://schemas.microsoft.com/office/powerpoint/2010/main" xmlns="" val="155874689"/>
       </p:ext>
     </p:extLst>
   </p:cSld>
@@ -8360,7 +9165,7 @@
     <a:masterClrMapping/>
   </p:clrMapOvr>
   <mc:AlternateContent xmlns:mc="http://schemas.openxmlformats.org/markup-compatibility/2006">
-    <mc:Choice xmlns="" xmlns:p14="http://schemas.microsoft.com/office/powerpoint/2010/main" Requires="p14">
+    <mc:Choice xmlns:p14="http://schemas.microsoft.com/office/powerpoint/2010/main" xmlns="" Requires="p14">
       <p:transition spd="slow" p14:dur="2000"/>
     </mc:Choice>
     <mc:Fallback>
@@ -8421,17 +9226,8 @@
               <a:rPr lang="it-IT" sz="4800" b="1" dirty="0" smtClean="0">
                 <a:latin typeface="+mj-lt"/>
               </a:rPr>
-              <a:t>Sottosistema </a:t>
-            </a:r>
-            <a:r>
-              <a:rPr lang="it-IT" sz="4800" b="1" dirty="0" smtClean="0">
-                <a:latin typeface="+mj-lt"/>
-              </a:rPr>
-              <a:t>Accessi </a:t>
-            </a:r>
-            <a:endParaRPr lang="it-IT" sz="4800" b="1" dirty="0" smtClean="0">
-              <a:latin typeface="+mj-lt"/>
-            </a:endParaRPr>
+              <a:t>Sottosistema Accessi </a:t>
+            </a:r>
           </a:p>
           <a:p>
             <a:pPr algn="ctr"/>
@@ -8720,7 +9516,7 @@
     </p:spTree>
     <p:extLst>
       <p:ext uri="{BB962C8B-B14F-4D97-AF65-F5344CB8AC3E}">
-        <p14:creationId xmlns="" xmlns:p14="http://schemas.microsoft.com/office/powerpoint/2010/main" val="155874689"/>
+        <p14:creationId xmlns:p14="http://schemas.microsoft.com/office/powerpoint/2010/main" xmlns="" val="155874689"/>
       </p:ext>
     </p:extLst>
   </p:cSld>
@@ -8728,7 +9524,7 @@
     <a:masterClrMapping/>
   </p:clrMapOvr>
   <mc:AlternateContent xmlns:mc="http://schemas.openxmlformats.org/markup-compatibility/2006">
-    <mc:Choice xmlns="" xmlns:p14="http://schemas.microsoft.com/office/powerpoint/2010/main" Requires="p14">
+    <mc:Choice xmlns:p14="http://schemas.microsoft.com/office/powerpoint/2010/main" xmlns="" Requires="p14">
       <p:transition spd="slow" p14:dur="2000"/>
     </mc:Choice>
     <mc:Fallback>
@@ -8789,23 +9585,8 @@
               <a:rPr lang="it-IT" sz="4800" b="1" dirty="0" smtClean="0">
                 <a:latin typeface="+mj-lt"/>
               </a:rPr>
-              <a:t>Sottosistema </a:t>
-            </a:r>
-            <a:r>
-              <a:rPr lang="it-IT" sz="4800" b="1" dirty="0" smtClean="0">
-                <a:latin typeface="+mj-lt"/>
-              </a:rPr>
-              <a:t>Accessi</a:t>
-            </a:r>
-            <a:r>
-              <a:rPr lang="it-IT" sz="4800" b="1" dirty="0" smtClean="0">
-                <a:latin typeface="+mj-lt"/>
-              </a:rPr>
-              <a:t> </a:t>
-            </a:r>
-            <a:endParaRPr lang="it-IT" sz="4800" b="1" dirty="0" smtClean="0">
-              <a:latin typeface="+mj-lt"/>
-            </a:endParaRPr>
+              <a:t>Sottosistema Accessi </a:t>
+            </a:r>
           </a:p>
           <a:p>
             <a:pPr algn="ctr"/>
@@ -9095,7 +9876,7 @@
     </p:spTree>
     <p:extLst>
       <p:ext uri="{BB962C8B-B14F-4D97-AF65-F5344CB8AC3E}">
-        <p14:creationId xmlns="" xmlns:p14="http://schemas.microsoft.com/office/powerpoint/2010/main" val="155874689"/>
+        <p14:creationId xmlns:p14="http://schemas.microsoft.com/office/powerpoint/2010/main" xmlns="" val="155874689"/>
       </p:ext>
     </p:extLst>
   </p:cSld>
@@ -9103,7 +9884,7 @@
     <a:masterClrMapping/>
   </p:clrMapOvr>
   <mc:AlternateContent xmlns:mc="http://schemas.openxmlformats.org/markup-compatibility/2006">
-    <mc:Choice xmlns="" xmlns:p14="http://schemas.microsoft.com/office/powerpoint/2010/main" Requires="p14">
+    <mc:Choice xmlns:p14="http://schemas.microsoft.com/office/powerpoint/2010/main" xmlns="" Requires="p14">
       <p:transition spd="slow" p14:dur="2000"/>
     </mc:Choice>
     <mc:Fallback>
@@ -9164,23 +9945,8 @@
               <a:rPr lang="it-IT" sz="4800" b="1" dirty="0" smtClean="0">
                 <a:latin typeface="+mj-lt"/>
               </a:rPr>
-              <a:t>Sottosistema </a:t>
-            </a:r>
-            <a:r>
-              <a:rPr lang="it-IT" sz="4800" b="1" dirty="0" smtClean="0">
-                <a:latin typeface="+mj-lt"/>
-              </a:rPr>
-              <a:t>Accessi</a:t>
-            </a:r>
-            <a:r>
-              <a:rPr lang="it-IT" sz="4800" b="1" dirty="0" smtClean="0">
-                <a:latin typeface="+mj-lt"/>
-              </a:rPr>
-              <a:t> </a:t>
-            </a:r>
-            <a:endParaRPr lang="it-IT" sz="4800" b="1" dirty="0" smtClean="0">
-              <a:latin typeface="+mj-lt"/>
-            </a:endParaRPr>
+              <a:t>Sottosistema Accessi </a:t>
+            </a:r>
           </a:p>
           <a:p>
             <a:pPr algn="ctr"/>
@@ -9469,7 +10235,7 @@
     </p:spTree>
     <p:extLst>
       <p:ext uri="{BB962C8B-B14F-4D97-AF65-F5344CB8AC3E}">
-        <p14:creationId xmlns="" xmlns:p14="http://schemas.microsoft.com/office/powerpoint/2010/main" val="155874689"/>
+        <p14:creationId xmlns:p14="http://schemas.microsoft.com/office/powerpoint/2010/main" xmlns="" val="155874689"/>
       </p:ext>
     </p:extLst>
   </p:cSld>
@@ -9477,7 +10243,7 @@
     <a:masterClrMapping/>
   </p:clrMapOvr>
   <mc:AlternateContent xmlns:mc="http://schemas.openxmlformats.org/markup-compatibility/2006">
-    <mc:Choice xmlns="" xmlns:p14="http://schemas.microsoft.com/office/powerpoint/2010/main" Requires="p14">
+    <mc:Choice xmlns:p14="http://schemas.microsoft.com/office/powerpoint/2010/main" xmlns="" Requires="p14">
       <p:transition spd="slow" p14:dur="2000"/>
     </mc:Choice>
     <mc:Fallback>
@@ -9538,23 +10304,8 @@
               <a:rPr lang="it-IT" sz="4800" b="1" dirty="0" smtClean="0">
                 <a:latin typeface="+mj-lt"/>
               </a:rPr>
-              <a:t>Sottosistema </a:t>
-            </a:r>
-            <a:r>
-              <a:rPr lang="it-IT" sz="4800" b="1" dirty="0" smtClean="0">
-                <a:latin typeface="+mj-lt"/>
-              </a:rPr>
-              <a:t>Accessi</a:t>
-            </a:r>
-            <a:r>
-              <a:rPr lang="it-IT" sz="4800" b="1" dirty="0" smtClean="0">
-                <a:latin typeface="+mj-lt"/>
-              </a:rPr>
-              <a:t> </a:t>
-            </a:r>
-            <a:endParaRPr lang="it-IT" sz="4800" b="1" dirty="0" smtClean="0">
-              <a:latin typeface="+mj-lt"/>
-            </a:endParaRPr>
+              <a:t>Sottosistema Accessi </a:t>
+            </a:r>
           </a:p>
           <a:p>
             <a:pPr algn="ctr"/>
@@ -9853,7 +10604,7 @@
     </p:spTree>
     <p:extLst>
       <p:ext uri="{BB962C8B-B14F-4D97-AF65-F5344CB8AC3E}">
-        <p14:creationId xmlns="" xmlns:p14="http://schemas.microsoft.com/office/powerpoint/2010/main" val="155874689"/>
+        <p14:creationId xmlns:p14="http://schemas.microsoft.com/office/powerpoint/2010/main" xmlns="" val="155874689"/>
       </p:ext>
     </p:extLst>
   </p:cSld>
@@ -9861,7 +10612,7 @@
     <a:masterClrMapping/>
   </p:clrMapOvr>
   <mc:AlternateContent xmlns:mc="http://schemas.openxmlformats.org/markup-compatibility/2006">
-    <mc:Choice xmlns="" xmlns:p14="http://schemas.microsoft.com/office/powerpoint/2010/main" Requires="p14">
+    <mc:Choice xmlns:p14="http://schemas.microsoft.com/office/powerpoint/2010/main" xmlns="" Requires="p14">
       <p:transition spd="slow" p14:dur="2000"/>
     </mc:Choice>
     <mc:Fallback>
@@ -9922,23 +10673,8 @@
               <a:rPr lang="it-IT" sz="4800" b="1" dirty="0" smtClean="0">
                 <a:latin typeface="+mj-lt"/>
               </a:rPr>
-              <a:t>Sottosistema </a:t>
-            </a:r>
-            <a:r>
-              <a:rPr lang="it-IT" sz="4800" b="1" dirty="0" smtClean="0">
-                <a:latin typeface="+mj-lt"/>
-              </a:rPr>
-              <a:t>Accessi</a:t>
-            </a:r>
-            <a:r>
-              <a:rPr lang="it-IT" sz="4800" b="1" dirty="0" smtClean="0">
-                <a:latin typeface="+mj-lt"/>
-              </a:rPr>
-              <a:t> </a:t>
-            </a:r>
-            <a:endParaRPr lang="it-IT" sz="4800" b="1" dirty="0" smtClean="0">
-              <a:latin typeface="+mj-lt"/>
-            </a:endParaRPr>
+              <a:t>Sottosistema Accessi </a:t>
+            </a:r>
           </a:p>
           <a:p>
             <a:pPr algn="ctr"/>
@@ -10231,7 +10967,7 @@
     </p:spTree>
     <p:extLst>
       <p:ext uri="{BB962C8B-B14F-4D97-AF65-F5344CB8AC3E}">
-        <p14:creationId xmlns="" xmlns:p14="http://schemas.microsoft.com/office/powerpoint/2010/main" val="155874689"/>
+        <p14:creationId xmlns:p14="http://schemas.microsoft.com/office/powerpoint/2010/main" xmlns="" val="155874689"/>
       </p:ext>
     </p:extLst>
   </p:cSld>
@@ -10239,7 +10975,7 @@
     <a:masterClrMapping/>
   </p:clrMapOvr>
   <mc:AlternateContent xmlns:mc="http://schemas.openxmlformats.org/markup-compatibility/2006">
-    <mc:Choice xmlns="" xmlns:p14="http://schemas.microsoft.com/office/powerpoint/2010/main" Requires="p14">
+    <mc:Choice xmlns:p14="http://schemas.microsoft.com/office/powerpoint/2010/main" xmlns="" Requires="p14">
       <p:transition spd="slow" p14:dur="2000"/>
     </mc:Choice>
     <mc:Fallback>
@@ -10300,23 +11036,8 @@
               <a:rPr lang="it-IT" sz="4800" b="1" dirty="0" smtClean="0">
                 <a:latin typeface="+mj-lt"/>
               </a:rPr>
-              <a:t>Sottosistema </a:t>
-            </a:r>
-            <a:r>
-              <a:rPr lang="it-IT" sz="4800" b="1" dirty="0" smtClean="0">
-                <a:latin typeface="+mj-lt"/>
-              </a:rPr>
-              <a:t>Accessi</a:t>
-            </a:r>
-            <a:r>
-              <a:rPr lang="it-IT" sz="4800" b="1" dirty="0" smtClean="0">
-                <a:latin typeface="+mj-lt"/>
-              </a:rPr>
-              <a:t> </a:t>
-            </a:r>
-            <a:endParaRPr lang="it-IT" sz="4800" b="1" dirty="0" smtClean="0">
-              <a:latin typeface="+mj-lt"/>
-            </a:endParaRPr>
+              <a:t>Sottosistema Accessi </a:t>
+            </a:r>
           </a:p>
           <a:p>
             <a:pPr algn="ctr"/>
@@ -10560,7 +11281,7 @@
     </p:spTree>
     <p:extLst>
       <p:ext uri="{BB962C8B-B14F-4D97-AF65-F5344CB8AC3E}">
-        <p14:creationId xmlns="" xmlns:p14="http://schemas.microsoft.com/office/powerpoint/2010/main" val="155874689"/>
+        <p14:creationId xmlns:p14="http://schemas.microsoft.com/office/powerpoint/2010/main" xmlns="" val="155874689"/>
       </p:ext>
     </p:extLst>
   </p:cSld>
@@ -10568,7 +11289,7 @@
     <a:masterClrMapping/>
   </p:clrMapOvr>
   <mc:AlternateContent xmlns:mc="http://schemas.openxmlformats.org/markup-compatibility/2006">
-    <mc:Choice xmlns="" xmlns:p14="http://schemas.microsoft.com/office/powerpoint/2010/main" Requires="p14">
+    <mc:Choice xmlns:p14="http://schemas.microsoft.com/office/powerpoint/2010/main" xmlns="" Requires="p14">
       <p:transition spd="slow" p14:dur="2000"/>
     </mc:Choice>
     <mc:Fallback>

</xml_diff>